<commit_message>
added missing plots for weather data
</commit_message>
<xml_diff>
--- a/Project 1 - Group 6 Presentation.pptx
+++ b/Project 1 - Group 6 Presentation.pptx
@@ -223,7 +223,7 @@
           <a:p>
             <a:fld id="{6CAD0379-14E3-4838-AC13-330CAFD02963}" type="datetimeFigureOut">
               <a:rPr lang="en-CA" smtClean="0"/>
-              <a:t>2019-11-12</a:t>
+              <a:t>2019-11-14</a:t>
             </a:fld>
             <a:endParaRPr lang="en-CA"/>
           </a:p>
@@ -2774,7 +2774,7 @@
             <a:fld id="{B61BEF0D-F0BB-DE4B-95CE-6DB70DBA9567}" type="datetimeFigureOut">
               <a:rPr lang="en-US" smtClean="0"/>
               <a:pPr/>
-              <a:t>11/12/2019</a:t>
+              <a:t>11/14/2019</a:t>
             </a:fld>
             <a:endParaRPr lang="en-US" dirty="0"/>
           </a:p>
@@ -3114,7 +3114,7 @@
             <a:fld id="{B61BEF0D-F0BB-DE4B-95CE-6DB70DBA9567}" type="datetimeFigureOut">
               <a:rPr lang="en-US" smtClean="0"/>
               <a:pPr/>
-              <a:t>11/12/2019</a:t>
+              <a:t>11/14/2019</a:t>
             </a:fld>
             <a:endParaRPr lang="en-US" dirty="0"/>
           </a:p>
@@ -3517,7 +3517,7 @@
             <a:fld id="{B61BEF0D-F0BB-DE4B-95CE-6DB70DBA9567}" type="datetimeFigureOut">
               <a:rPr lang="en-US" smtClean="0"/>
               <a:pPr/>
-              <a:t>11/12/2019</a:t>
+              <a:t>11/14/2019</a:t>
             </a:fld>
             <a:endParaRPr lang="en-US" dirty="0"/>
           </a:p>
@@ -3855,7 +3855,7 @@
             <a:fld id="{B61BEF0D-F0BB-DE4B-95CE-6DB70DBA9567}" type="datetimeFigureOut">
               <a:rPr lang="en-US" smtClean="0"/>
               <a:pPr/>
-              <a:t>11/12/2019</a:t>
+              <a:t>11/14/2019</a:t>
             </a:fld>
             <a:endParaRPr lang="en-US" dirty="0"/>
           </a:p>
@@ -4177,7 +4177,7 @@
             <a:fld id="{B61BEF0D-F0BB-DE4B-95CE-6DB70DBA9567}" type="datetimeFigureOut">
               <a:rPr lang="en-US" smtClean="0"/>
               <a:pPr/>
-              <a:t>11/12/2019</a:t>
+              <a:t>11/14/2019</a:t>
             </a:fld>
             <a:endParaRPr lang="en-US" dirty="0"/>
           </a:p>
@@ -4575,7 +4575,7 @@
             <a:fld id="{B61BEF0D-F0BB-DE4B-95CE-6DB70DBA9567}" type="datetimeFigureOut">
               <a:rPr lang="en-US" smtClean="0"/>
               <a:pPr/>
-              <a:t>11/12/2019</a:t>
+              <a:t>11/14/2019</a:t>
             </a:fld>
             <a:endParaRPr lang="en-US" dirty="0"/>
           </a:p>
@@ -4834,7 +4834,7 @@
             <a:fld id="{B61BEF0D-F0BB-DE4B-95CE-6DB70DBA9567}" type="datetimeFigureOut">
               <a:rPr lang="en-US" smtClean="0"/>
               <a:pPr/>
-              <a:t>11/12/2019</a:t>
+              <a:t>11/14/2019</a:t>
             </a:fld>
             <a:endParaRPr lang="en-US" dirty="0"/>
           </a:p>
@@ -5098,7 +5098,7 @@
             <a:fld id="{B61BEF0D-F0BB-DE4B-95CE-6DB70DBA9567}" type="datetimeFigureOut">
               <a:rPr lang="en-US" smtClean="0"/>
               <a:pPr/>
-              <a:t>11/12/2019</a:t>
+              <a:t>11/14/2019</a:t>
             </a:fld>
             <a:endParaRPr lang="en-US" dirty="0"/>
           </a:p>
@@ -5362,7 +5362,7 @@
             <a:fld id="{B61BEF0D-F0BB-DE4B-95CE-6DB70DBA9567}" type="datetimeFigureOut">
               <a:rPr lang="en-US" smtClean="0"/>
               <a:pPr/>
-              <a:t>11/12/2019</a:t>
+              <a:t>11/14/2019</a:t>
             </a:fld>
             <a:endParaRPr lang="en-US" dirty="0"/>
           </a:p>
@@ -5693,7 +5693,7 @@
             <a:fld id="{B61BEF0D-F0BB-DE4B-95CE-6DB70DBA9567}" type="datetimeFigureOut">
               <a:rPr lang="en-US" smtClean="0"/>
               <a:pPr/>
-              <a:t>11/12/2019</a:t>
+              <a:t>11/14/2019</a:t>
             </a:fld>
             <a:endParaRPr lang="en-US" dirty="0"/>
           </a:p>
@@ -6018,7 +6018,7 @@
             <a:fld id="{B61BEF0D-F0BB-DE4B-95CE-6DB70DBA9567}" type="datetimeFigureOut">
               <a:rPr lang="en-US" smtClean="0"/>
               <a:pPr/>
-              <a:t>11/12/2019</a:t>
+              <a:t>11/14/2019</a:t>
             </a:fld>
             <a:endParaRPr lang="en-US" dirty="0"/>
           </a:p>
@@ -6477,7 +6477,7 @@
             <a:fld id="{B61BEF0D-F0BB-DE4B-95CE-6DB70DBA9567}" type="datetimeFigureOut">
               <a:rPr lang="en-US" smtClean="0"/>
               <a:pPr/>
-              <a:t>11/12/2019</a:t>
+              <a:t>11/14/2019</a:t>
             </a:fld>
             <a:endParaRPr lang="en-US" dirty="0"/>
           </a:p>
@@ -6684,7 +6684,7 @@
             <a:fld id="{B61BEF0D-F0BB-DE4B-95CE-6DB70DBA9567}" type="datetimeFigureOut">
               <a:rPr lang="en-US" smtClean="0"/>
               <a:pPr/>
-              <a:t>11/12/2019</a:t>
+              <a:t>11/14/2019</a:t>
             </a:fld>
             <a:endParaRPr lang="en-US" dirty="0"/>
           </a:p>
@@ -6863,7 +6863,7 @@
             <a:fld id="{B61BEF0D-F0BB-DE4B-95CE-6DB70DBA9567}" type="datetimeFigureOut">
               <a:rPr lang="en-US" smtClean="0"/>
               <a:pPr/>
-              <a:t>11/12/2019</a:t>
+              <a:t>11/14/2019</a:t>
             </a:fld>
             <a:endParaRPr lang="en-US" dirty="0"/>
           </a:p>
@@ -7198,7 +7198,7 @@
             <a:fld id="{B61BEF0D-F0BB-DE4B-95CE-6DB70DBA9567}" type="datetimeFigureOut">
               <a:rPr lang="en-US" smtClean="0"/>
               <a:pPr/>
-              <a:t>11/12/2019</a:t>
+              <a:t>11/14/2019</a:t>
             </a:fld>
             <a:endParaRPr lang="en-US" dirty="0"/>
           </a:p>
@@ -7545,7 +7545,7 @@
             <a:fld id="{B61BEF0D-F0BB-DE4B-95CE-6DB70DBA9567}" type="datetimeFigureOut">
               <a:rPr lang="en-US" smtClean="0"/>
               <a:pPr/>
-              <a:t>11/12/2019</a:t>
+              <a:t>11/14/2019</a:t>
             </a:fld>
             <a:endParaRPr lang="en-US" dirty="0"/>
           </a:p>
@@ -9664,7 +9664,7 @@
             <a:fld id="{B61BEF0D-F0BB-DE4B-95CE-6DB70DBA9567}" type="datetimeFigureOut">
               <a:rPr lang="en-US" smtClean="0"/>
               <a:pPr/>
-              <a:t>11/12/2019</a:t>
+              <a:t>11/14/2019</a:t>
             </a:fld>
             <a:endParaRPr lang="en-US" dirty="0"/>
           </a:p>
@@ -10254,6 +10254,32 @@
 <file path=ppt/slides/slide10.xml><?xml version="1.0" encoding="utf-8"?>
 <p:sld xmlns:a="http://schemas.openxmlformats.org/drawingml/2006/main" xmlns:r="http://schemas.openxmlformats.org/officeDocument/2006/relationships" xmlns:p="http://schemas.openxmlformats.org/presentationml/2006/main">
   <p:cSld>
+    <p:bg>
+      <p:bgPr>
+        <a:gradFill rotWithShape="1">
+          <a:gsLst>
+            <a:gs pos="0">
+              <a:schemeClr val="bg1">
+                <a:tint val="90000"/>
+                <a:satMod val="92000"/>
+                <a:lumMod val="120000"/>
+              </a:schemeClr>
+            </a:gs>
+            <a:gs pos="100000">
+              <a:schemeClr val="bg1">
+                <a:shade val="98000"/>
+                <a:satMod val="120000"/>
+                <a:lumMod val="98000"/>
+              </a:schemeClr>
+            </a:gs>
+          </a:gsLst>
+          <a:path path="circle">
+            <a:fillToRect l="50000" t="50000" r="100000" b="100000"/>
+          </a:path>
+        </a:gradFill>
+        <a:effectLst/>
+      </p:bgPr>
+    </p:bg>
     <p:spTree>
       <p:nvGrpSpPr>
         <p:cNvPr id="1" name=""/>
@@ -10268,6 +10294,2549 @@
           <a:chExt cx="0" cy="0"/>
         </a:xfrm>
       </p:grpSpPr>
+      <p:grpSp>
+        <p:nvGrpSpPr>
+          <p:cNvPr id="14" name="Group 13">
+            <a:extLst>
+              <a:ext uri="{FF2B5EF4-FFF2-40B4-BE49-F238E27FC236}">
+                <a16:creationId xmlns:a16="http://schemas.microsoft.com/office/drawing/2014/main" id="{7B7EFD05-5F12-420E-8AEF-74D5EF9D58BC}"/>
+              </a:ext>
+              <a:ext uri="{C183D7F6-B498-43B3-948B-1728B52AA6E4}">
+                <adec:decorative xmlns:adec="http://schemas.microsoft.com/office/drawing/2017/decorative" val="1"/>
+              </a:ext>
+            </a:extLst>
+          </p:cNvPr>
+          <p:cNvGrpSpPr>
+            <a:grpSpLocks noGrp="1" noUngrp="1" noRot="1" noChangeAspect="1" noMove="1" noResize="1"/>
+          </p:cNvGrpSpPr>
+          <p:nvPr>
+            <p:extLst>
+              <p:ext uri="{386F3935-93C4-4BCD-93E2-E3B085C9AB24}">
+                <p16:designElem xmlns:p16="http://schemas.microsoft.com/office/powerpoint/2015/main" val="1"/>
+              </p:ext>
+            </p:extLst>
+          </p:nvPr>
+        </p:nvGrpSpPr>
+        <p:grpSpPr>
+          <a:xfrm>
+            <a:off x="9" y="228600"/>
+            <a:ext cx="2851523" cy="6638625"/>
+            <a:chOff x="2487613" y="285750"/>
+            <a:chExt cx="2428875" cy="5654676"/>
+          </a:xfrm>
+        </p:grpSpPr>
+        <p:sp>
+          <p:nvSpPr>
+            <p:cNvPr id="15" name="Freeform 11">
+              <a:extLst>
+                <a:ext uri="{FF2B5EF4-FFF2-40B4-BE49-F238E27FC236}">
+                  <a16:creationId xmlns:a16="http://schemas.microsoft.com/office/drawing/2014/main" id="{6B6786B7-9BA0-488B-8C6B-1C5BB4E2A5A4}"/>
+                </a:ext>
+                <a:ext uri="{C183D7F6-B498-43B3-948B-1728B52AA6E4}">
+                  <adec:decorative xmlns:adec="http://schemas.microsoft.com/office/drawing/2017/decorative" val="1"/>
+                </a:ext>
+              </a:extLst>
+            </p:cNvPr>
+            <p:cNvSpPr/>
+            <p:nvPr>
+              <p:extLst>
+                <p:ext uri="{386F3935-93C4-4BCD-93E2-E3B085C9AB24}">
+                  <p16:designElem xmlns:p16="http://schemas.microsoft.com/office/powerpoint/2015/main" val="1"/>
+                </p:ext>
+              </p:extLst>
+            </p:nvPr>
+          </p:nvSpPr>
+          <p:spPr bwMode="auto">
+            <a:xfrm>
+              <a:off x="2487613" y="2284413"/>
+              <a:ext cx="85725" cy="533400"/>
+            </a:xfrm>
+            <a:custGeom>
+              <a:avLst/>
+              <a:gdLst/>
+              <a:ahLst/>
+              <a:cxnLst/>
+              <a:rect l="0" t="0" r="r" b="b"/>
+              <a:pathLst>
+                <a:path w="22" h="136">
+                  <a:moveTo>
+                    <a:pt x="22" y="136"/>
+                  </a:moveTo>
+                  <a:cubicBezTo>
+                    <a:pt x="20" y="117"/>
+                    <a:pt x="19" y="99"/>
+                    <a:pt x="17" y="80"/>
+                  </a:cubicBezTo>
+                  <a:cubicBezTo>
+                    <a:pt x="11" y="54"/>
+                    <a:pt x="6" y="27"/>
+                    <a:pt x="0" y="0"/>
+                  </a:cubicBezTo>
+                  <a:cubicBezTo>
+                    <a:pt x="0" y="35"/>
+                    <a:pt x="0" y="35"/>
+                    <a:pt x="0" y="35"/>
+                  </a:cubicBezTo>
+                  <a:cubicBezTo>
+                    <a:pt x="6" y="64"/>
+                    <a:pt x="13" y="94"/>
+                    <a:pt x="20" y="124"/>
+                  </a:cubicBezTo>
+                  <a:cubicBezTo>
+                    <a:pt x="20" y="128"/>
+                    <a:pt x="21" y="132"/>
+                    <a:pt x="22" y="136"/>
+                  </a:cubicBezTo>
+                  <a:close/>
+                </a:path>
+              </a:pathLst>
+            </a:custGeom>
+            <a:solidFill>
+              <a:schemeClr val="tx2">
+                <a:alpha val="20000"/>
+              </a:schemeClr>
+            </a:solidFill>
+            <a:ln>
+              <a:noFill/>
+            </a:ln>
+          </p:spPr>
+        </p:sp>
+        <p:sp>
+          <p:nvSpPr>
+            <p:cNvPr id="16" name="Freeform 12">
+              <a:extLst>
+                <a:ext uri="{FF2B5EF4-FFF2-40B4-BE49-F238E27FC236}">
+                  <a16:creationId xmlns:a16="http://schemas.microsoft.com/office/drawing/2014/main" id="{ACF6C842-D596-43D3-B584-5672E0D33134}"/>
+                </a:ext>
+                <a:ext uri="{C183D7F6-B498-43B3-948B-1728B52AA6E4}">
+                  <adec:decorative xmlns:adec="http://schemas.microsoft.com/office/drawing/2017/decorative" val="1"/>
+                </a:ext>
+              </a:extLst>
+            </p:cNvPr>
+            <p:cNvSpPr/>
+            <p:nvPr>
+              <p:extLst>
+                <p:ext uri="{386F3935-93C4-4BCD-93E2-E3B085C9AB24}">
+                  <p16:designElem xmlns:p16="http://schemas.microsoft.com/office/powerpoint/2015/main" val="1"/>
+                </p:ext>
+              </p:extLst>
+            </p:nvPr>
+          </p:nvSpPr>
+          <p:spPr bwMode="auto">
+            <a:xfrm>
+              <a:off x="2597151" y="2779713"/>
+              <a:ext cx="550863" cy="1978025"/>
+            </a:xfrm>
+            <a:custGeom>
+              <a:avLst/>
+              <a:gdLst/>
+              <a:ahLst/>
+              <a:cxnLst/>
+              <a:rect l="0" t="0" r="r" b="b"/>
+              <a:pathLst>
+                <a:path w="140" h="504">
+                  <a:moveTo>
+                    <a:pt x="86" y="350"/>
+                  </a:moveTo>
+                  <a:cubicBezTo>
+                    <a:pt x="103" y="402"/>
+                    <a:pt x="120" y="453"/>
+                    <a:pt x="139" y="504"/>
+                  </a:cubicBezTo>
+                  <a:cubicBezTo>
+                    <a:pt x="139" y="495"/>
+                    <a:pt x="139" y="487"/>
+                    <a:pt x="140" y="478"/>
+                  </a:cubicBezTo>
+                  <a:cubicBezTo>
+                    <a:pt x="124" y="435"/>
+                    <a:pt x="109" y="391"/>
+                    <a:pt x="95" y="347"/>
+                  </a:cubicBezTo>
+                  <a:cubicBezTo>
+                    <a:pt x="58" y="233"/>
+                    <a:pt x="27" y="117"/>
+                    <a:pt x="0" y="0"/>
+                  </a:cubicBezTo>
+                  <a:cubicBezTo>
+                    <a:pt x="2" y="20"/>
+                    <a:pt x="4" y="41"/>
+                    <a:pt x="6" y="61"/>
+                  </a:cubicBezTo>
+                  <a:cubicBezTo>
+                    <a:pt x="30" y="158"/>
+                    <a:pt x="56" y="255"/>
+                    <a:pt x="86" y="350"/>
+                  </a:cubicBezTo>
+                  <a:close/>
+                </a:path>
+              </a:pathLst>
+            </a:custGeom>
+            <a:solidFill>
+              <a:schemeClr val="tx2">
+                <a:alpha val="20000"/>
+              </a:schemeClr>
+            </a:solidFill>
+            <a:ln>
+              <a:noFill/>
+            </a:ln>
+          </p:spPr>
+        </p:sp>
+        <p:sp>
+          <p:nvSpPr>
+            <p:cNvPr id="17" name="Freeform 13">
+              <a:extLst>
+                <a:ext uri="{FF2B5EF4-FFF2-40B4-BE49-F238E27FC236}">
+                  <a16:creationId xmlns:a16="http://schemas.microsoft.com/office/drawing/2014/main" id="{6DF84F3E-35FA-497B-B6FA-F453E82F325D}"/>
+                </a:ext>
+                <a:ext uri="{C183D7F6-B498-43B3-948B-1728B52AA6E4}">
+                  <adec:decorative xmlns:adec="http://schemas.microsoft.com/office/drawing/2017/decorative" val="1"/>
+                </a:ext>
+              </a:extLst>
+            </p:cNvPr>
+            <p:cNvSpPr/>
+            <p:nvPr>
+              <p:extLst>
+                <p:ext uri="{386F3935-93C4-4BCD-93E2-E3B085C9AB24}">
+                  <p16:designElem xmlns:p16="http://schemas.microsoft.com/office/powerpoint/2015/main" val="1"/>
+                </p:ext>
+              </p:extLst>
+            </p:nvPr>
+          </p:nvSpPr>
+          <p:spPr bwMode="auto">
+            <a:xfrm>
+              <a:off x="3175001" y="4730750"/>
+              <a:ext cx="519113" cy="1209675"/>
+            </a:xfrm>
+            <a:custGeom>
+              <a:avLst/>
+              <a:gdLst/>
+              <a:ahLst/>
+              <a:cxnLst/>
+              <a:rect l="0" t="0" r="r" b="b"/>
+              <a:pathLst>
+                <a:path w="132" h="308">
+                  <a:moveTo>
+                    <a:pt x="8" y="22"/>
+                  </a:moveTo>
+                  <a:cubicBezTo>
+                    <a:pt x="5" y="15"/>
+                    <a:pt x="2" y="8"/>
+                    <a:pt x="0" y="0"/>
+                  </a:cubicBezTo>
+                  <a:cubicBezTo>
+                    <a:pt x="0" y="10"/>
+                    <a:pt x="0" y="19"/>
+                    <a:pt x="0" y="29"/>
+                  </a:cubicBezTo>
+                  <a:cubicBezTo>
+                    <a:pt x="21" y="85"/>
+                    <a:pt x="44" y="140"/>
+                    <a:pt x="68" y="194"/>
+                  </a:cubicBezTo>
+                  <a:cubicBezTo>
+                    <a:pt x="85" y="232"/>
+                    <a:pt x="104" y="270"/>
+                    <a:pt x="123" y="308"/>
+                  </a:cubicBezTo>
+                  <a:cubicBezTo>
+                    <a:pt x="132" y="308"/>
+                    <a:pt x="132" y="308"/>
+                    <a:pt x="132" y="308"/>
+                  </a:cubicBezTo>
+                  <a:cubicBezTo>
+                    <a:pt x="113" y="269"/>
+                    <a:pt x="94" y="230"/>
+                    <a:pt x="77" y="190"/>
+                  </a:cubicBezTo>
+                  <a:cubicBezTo>
+                    <a:pt x="52" y="135"/>
+                    <a:pt x="29" y="79"/>
+                    <a:pt x="8" y="22"/>
+                  </a:cubicBezTo>
+                  <a:close/>
+                </a:path>
+              </a:pathLst>
+            </a:custGeom>
+            <a:solidFill>
+              <a:schemeClr val="tx2">
+                <a:alpha val="20000"/>
+              </a:schemeClr>
+            </a:solidFill>
+            <a:ln>
+              <a:noFill/>
+            </a:ln>
+          </p:spPr>
+        </p:sp>
+        <p:sp>
+          <p:nvSpPr>
+            <p:cNvPr id="18" name="Freeform 14">
+              <a:extLst>
+                <a:ext uri="{FF2B5EF4-FFF2-40B4-BE49-F238E27FC236}">
+                  <a16:creationId xmlns:a16="http://schemas.microsoft.com/office/drawing/2014/main" id="{2846D7FA-E05C-448E-B156-F77C205A14B4}"/>
+                </a:ext>
+                <a:ext uri="{C183D7F6-B498-43B3-948B-1728B52AA6E4}">
+                  <adec:decorative xmlns:adec="http://schemas.microsoft.com/office/drawing/2017/decorative" val="1"/>
+                </a:ext>
+              </a:extLst>
+            </p:cNvPr>
+            <p:cNvSpPr/>
+            <p:nvPr>
+              <p:extLst>
+                <p:ext uri="{386F3935-93C4-4BCD-93E2-E3B085C9AB24}">
+                  <p16:designElem xmlns:p16="http://schemas.microsoft.com/office/powerpoint/2015/main" val="1"/>
+                </p:ext>
+              </p:extLst>
+            </p:nvPr>
+          </p:nvSpPr>
+          <p:spPr bwMode="auto">
+            <a:xfrm>
+              <a:off x="3305176" y="5630863"/>
+              <a:ext cx="146050" cy="309563"/>
+            </a:xfrm>
+            <a:custGeom>
+              <a:avLst/>
+              <a:gdLst/>
+              <a:ahLst/>
+              <a:cxnLst/>
+              <a:rect l="0" t="0" r="r" b="b"/>
+              <a:pathLst>
+                <a:path w="37" h="79">
+                  <a:moveTo>
+                    <a:pt x="28" y="79"/>
+                  </a:moveTo>
+                  <a:cubicBezTo>
+                    <a:pt x="37" y="79"/>
+                    <a:pt x="37" y="79"/>
+                    <a:pt x="37" y="79"/>
+                  </a:cubicBezTo>
+                  <a:cubicBezTo>
+                    <a:pt x="24" y="53"/>
+                    <a:pt x="12" y="27"/>
+                    <a:pt x="0" y="0"/>
+                  </a:cubicBezTo>
+                  <a:cubicBezTo>
+                    <a:pt x="8" y="27"/>
+                    <a:pt x="17" y="53"/>
+                    <a:pt x="28" y="79"/>
+                  </a:cubicBezTo>
+                  <a:close/>
+                </a:path>
+              </a:pathLst>
+            </a:custGeom>
+            <a:solidFill>
+              <a:schemeClr val="tx2">
+                <a:alpha val="20000"/>
+              </a:schemeClr>
+            </a:solidFill>
+            <a:ln>
+              <a:noFill/>
+            </a:ln>
+          </p:spPr>
+        </p:sp>
+        <p:sp>
+          <p:nvSpPr>
+            <p:cNvPr id="19" name="Freeform 15">
+              <a:extLst>
+                <a:ext uri="{FF2B5EF4-FFF2-40B4-BE49-F238E27FC236}">
+                  <a16:creationId xmlns:a16="http://schemas.microsoft.com/office/drawing/2014/main" id="{E269AD3A-E6B6-4322-A013-276CBC1B084D}"/>
+                </a:ext>
+                <a:ext uri="{C183D7F6-B498-43B3-948B-1728B52AA6E4}">
+                  <adec:decorative xmlns:adec="http://schemas.microsoft.com/office/drawing/2017/decorative" val="1"/>
+                </a:ext>
+              </a:extLst>
+            </p:cNvPr>
+            <p:cNvSpPr/>
+            <p:nvPr>
+              <p:extLst>
+                <p:ext uri="{386F3935-93C4-4BCD-93E2-E3B085C9AB24}">
+                  <p16:designElem xmlns:p16="http://schemas.microsoft.com/office/powerpoint/2015/main" val="1"/>
+                </p:ext>
+              </p:extLst>
+            </p:nvPr>
+          </p:nvSpPr>
+          <p:spPr bwMode="auto">
+            <a:xfrm>
+              <a:off x="2573338" y="2817813"/>
+              <a:ext cx="700088" cy="2835275"/>
+            </a:xfrm>
+            <a:custGeom>
+              <a:avLst/>
+              <a:gdLst/>
+              <a:ahLst/>
+              <a:cxnLst/>
+              <a:rect l="0" t="0" r="r" b="b"/>
+              <a:pathLst>
+                <a:path w="178" h="722">
+                  <a:moveTo>
+                    <a:pt x="162" y="660"/>
+                  </a:moveTo>
+                  <a:cubicBezTo>
+                    <a:pt x="145" y="618"/>
+                    <a:pt x="130" y="576"/>
+                    <a:pt x="116" y="534"/>
+                  </a:cubicBezTo>
+                  <a:cubicBezTo>
+                    <a:pt x="84" y="437"/>
+                    <a:pt x="59" y="337"/>
+                    <a:pt x="40" y="236"/>
+                  </a:cubicBezTo>
+                  <a:cubicBezTo>
+                    <a:pt x="29" y="175"/>
+                    <a:pt x="20" y="113"/>
+                    <a:pt x="12" y="51"/>
+                  </a:cubicBezTo>
+                  <a:cubicBezTo>
+                    <a:pt x="8" y="34"/>
+                    <a:pt x="4" y="17"/>
+                    <a:pt x="0" y="0"/>
+                  </a:cubicBezTo>
+                  <a:cubicBezTo>
+                    <a:pt x="8" y="79"/>
+                    <a:pt x="19" y="159"/>
+                    <a:pt x="33" y="237"/>
+                  </a:cubicBezTo>
+                  <a:cubicBezTo>
+                    <a:pt x="51" y="339"/>
+                    <a:pt x="76" y="439"/>
+                    <a:pt x="107" y="537"/>
+                  </a:cubicBezTo>
+                  <a:cubicBezTo>
+                    <a:pt x="123" y="586"/>
+                    <a:pt x="141" y="634"/>
+                    <a:pt x="160" y="681"/>
+                  </a:cubicBezTo>
+                  <a:cubicBezTo>
+                    <a:pt x="166" y="695"/>
+                    <a:pt x="172" y="708"/>
+                    <a:pt x="178" y="722"/>
+                  </a:cubicBezTo>
+                  <a:cubicBezTo>
+                    <a:pt x="176" y="717"/>
+                    <a:pt x="175" y="713"/>
+                    <a:pt x="174" y="708"/>
+                  </a:cubicBezTo>
+                  <a:cubicBezTo>
+                    <a:pt x="169" y="692"/>
+                    <a:pt x="165" y="676"/>
+                    <a:pt x="162" y="660"/>
+                  </a:cubicBezTo>
+                  <a:close/>
+                </a:path>
+              </a:pathLst>
+            </a:custGeom>
+            <a:solidFill>
+              <a:schemeClr val="tx2">
+                <a:alpha val="20000"/>
+              </a:schemeClr>
+            </a:solidFill>
+            <a:ln>
+              <a:noFill/>
+            </a:ln>
+          </p:spPr>
+        </p:sp>
+        <p:sp>
+          <p:nvSpPr>
+            <p:cNvPr id="20" name="Freeform 16">
+              <a:extLst>
+                <a:ext uri="{FF2B5EF4-FFF2-40B4-BE49-F238E27FC236}">
+                  <a16:creationId xmlns:a16="http://schemas.microsoft.com/office/drawing/2014/main" id="{CEFB9F00-6239-4BF6-B439-D16231B240A9}"/>
+                </a:ext>
+                <a:ext uri="{C183D7F6-B498-43B3-948B-1728B52AA6E4}">
+                  <adec:decorative xmlns:adec="http://schemas.microsoft.com/office/drawing/2017/decorative" val="1"/>
+                </a:ext>
+              </a:extLst>
+            </p:cNvPr>
+            <p:cNvSpPr/>
+            <p:nvPr>
+              <p:extLst>
+                <p:ext uri="{386F3935-93C4-4BCD-93E2-E3B085C9AB24}">
+                  <p16:designElem xmlns:p16="http://schemas.microsoft.com/office/powerpoint/2015/main" val="1"/>
+                </p:ext>
+              </p:extLst>
+            </p:nvPr>
+          </p:nvSpPr>
+          <p:spPr bwMode="auto">
+            <a:xfrm>
+              <a:off x="2506663" y="285750"/>
+              <a:ext cx="90488" cy="2493963"/>
+            </a:xfrm>
+            <a:custGeom>
+              <a:avLst/>
+              <a:gdLst/>
+              <a:ahLst/>
+              <a:cxnLst/>
+              <a:rect l="0" t="0" r="r" b="b"/>
+              <a:pathLst>
+                <a:path w="23" h="635">
+                  <a:moveTo>
+                    <a:pt x="11" y="577"/>
+                  </a:moveTo>
+                  <a:cubicBezTo>
+                    <a:pt x="12" y="581"/>
+                    <a:pt x="12" y="585"/>
+                    <a:pt x="12" y="589"/>
+                  </a:cubicBezTo>
+                  <a:cubicBezTo>
+                    <a:pt x="15" y="603"/>
+                    <a:pt x="19" y="617"/>
+                    <a:pt x="22" y="632"/>
+                  </a:cubicBezTo>
+                  <a:cubicBezTo>
+                    <a:pt x="22" y="633"/>
+                    <a:pt x="22" y="634"/>
+                    <a:pt x="23" y="635"/>
+                  </a:cubicBezTo>
+                  <a:cubicBezTo>
+                    <a:pt x="21" y="615"/>
+                    <a:pt x="19" y="596"/>
+                    <a:pt x="17" y="576"/>
+                  </a:cubicBezTo>
+                  <a:cubicBezTo>
+                    <a:pt x="9" y="474"/>
+                    <a:pt x="5" y="372"/>
+                    <a:pt x="5" y="269"/>
+                  </a:cubicBezTo>
+                  <a:cubicBezTo>
+                    <a:pt x="6" y="179"/>
+                    <a:pt x="9" y="90"/>
+                    <a:pt x="15" y="0"/>
+                  </a:cubicBezTo>
+                  <a:cubicBezTo>
+                    <a:pt x="12" y="0"/>
+                    <a:pt x="12" y="0"/>
+                    <a:pt x="12" y="0"/>
+                  </a:cubicBezTo>
+                  <a:cubicBezTo>
+                    <a:pt x="5" y="89"/>
+                    <a:pt x="2" y="179"/>
+                    <a:pt x="1" y="269"/>
+                  </a:cubicBezTo>
+                  <a:cubicBezTo>
+                    <a:pt x="0" y="372"/>
+                    <a:pt x="3" y="474"/>
+                    <a:pt x="11" y="577"/>
+                  </a:cubicBezTo>
+                  <a:close/>
+                </a:path>
+              </a:pathLst>
+            </a:custGeom>
+            <a:solidFill>
+              <a:schemeClr val="tx2">
+                <a:alpha val="20000"/>
+              </a:schemeClr>
+            </a:solidFill>
+            <a:ln>
+              <a:noFill/>
+            </a:ln>
+          </p:spPr>
+        </p:sp>
+        <p:sp>
+          <p:nvSpPr>
+            <p:cNvPr id="21" name="Freeform 17">
+              <a:extLst>
+                <a:ext uri="{FF2B5EF4-FFF2-40B4-BE49-F238E27FC236}">
+                  <a16:creationId xmlns:a16="http://schemas.microsoft.com/office/drawing/2014/main" id="{74D1DDDB-FC85-40C5-9225-06312C4515FA}"/>
+                </a:ext>
+                <a:ext uri="{C183D7F6-B498-43B3-948B-1728B52AA6E4}">
+                  <adec:decorative xmlns:adec="http://schemas.microsoft.com/office/drawing/2017/decorative" val="1"/>
+                </a:ext>
+              </a:extLst>
+            </p:cNvPr>
+            <p:cNvSpPr/>
+            <p:nvPr>
+              <p:extLst>
+                <p:ext uri="{386F3935-93C4-4BCD-93E2-E3B085C9AB24}">
+                  <p16:designElem xmlns:p16="http://schemas.microsoft.com/office/powerpoint/2015/main" val="1"/>
+                </p:ext>
+              </p:extLst>
+            </p:nvPr>
+          </p:nvSpPr>
+          <p:spPr bwMode="auto">
+            <a:xfrm>
+              <a:off x="2554288" y="2598738"/>
+              <a:ext cx="66675" cy="420688"/>
+            </a:xfrm>
+            <a:custGeom>
+              <a:avLst/>
+              <a:gdLst/>
+              <a:ahLst/>
+              <a:cxnLst/>
+              <a:rect l="0" t="0" r="r" b="b"/>
+              <a:pathLst>
+                <a:path w="17" h="107">
+                  <a:moveTo>
+                    <a:pt x="0" y="0"/>
+                  </a:moveTo>
+                  <a:cubicBezTo>
+                    <a:pt x="2" y="19"/>
+                    <a:pt x="3" y="37"/>
+                    <a:pt x="5" y="56"/>
+                  </a:cubicBezTo>
+                  <a:cubicBezTo>
+                    <a:pt x="9" y="73"/>
+                    <a:pt x="13" y="90"/>
+                    <a:pt x="17" y="107"/>
+                  </a:cubicBezTo>
+                  <a:cubicBezTo>
+                    <a:pt x="15" y="87"/>
+                    <a:pt x="13" y="66"/>
+                    <a:pt x="11" y="46"/>
+                  </a:cubicBezTo>
+                  <a:cubicBezTo>
+                    <a:pt x="10" y="45"/>
+                    <a:pt x="10" y="44"/>
+                    <a:pt x="10" y="43"/>
+                  </a:cubicBezTo>
+                  <a:cubicBezTo>
+                    <a:pt x="7" y="28"/>
+                    <a:pt x="3" y="14"/>
+                    <a:pt x="0" y="0"/>
+                  </a:cubicBezTo>
+                  <a:close/>
+                </a:path>
+              </a:pathLst>
+            </a:custGeom>
+            <a:solidFill>
+              <a:schemeClr val="tx2">
+                <a:alpha val="20000"/>
+              </a:schemeClr>
+            </a:solidFill>
+            <a:ln>
+              <a:noFill/>
+            </a:ln>
+          </p:spPr>
+        </p:sp>
+        <p:sp>
+          <p:nvSpPr>
+            <p:cNvPr id="22" name="Freeform 18">
+              <a:extLst>
+                <a:ext uri="{FF2B5EF4-FFF2-40B4-BE49-F238E27FC236}">
+                  <a16:creationId xmlns:a16="http://schemas.microsoft.com/office/drawing/2014/main" id="{E9217709-40C1-4F4A-AB69-8A693608ABA3}"/>
+                </a:ext>
+                <a:ext uri="{C183D7F6-B498-43B3-948B-1728B52AA6E4}">
+                  <adec:decorative xmlns:adec="http://schemas.microsoft.com/office/drawing/2017/decorative" val="1"/>
+                </a:ext>
+              </a:extLst>
+            </p:cNvPr>
+            <p:cNvSpPr/>
+            <p:nvPr>
+              <p:extLst>
+                <p:ext uri="{386F3935-93C4-4BCD-93E2-E3B085C9AB24}">
+                  <p16:designElem xmlns:p16="http://schemas.microsoft.com/office/powerpoint/2015/main" val="1"/>
+                </p:ext>
+              </p:extLst>
+            </p:nvPr>
+          </p:nvSpPr>
+          <p:spPr bwMode="auto">
+            <a:xfrm>
+              <a:off x="3143251" y="4757738"/>
+              <a:ext cx="161925" cy="873125"/>
+            </a:xfrm>
+            <a:custGeom>
+              <a:avLst/>
+              <a:gdLst/>
+              <a:ahLst/>
+              <a:cxnLst/>
+              <a:rect l="0" t="0" r="r" b="b"/>
+              <a:pathLst>
+                <a:path w="41" h="222">
+                  <a:moveTo>
+                    <a:pt x="0" y="0"/>
+                  </a:moveTo>
+                  <a:cubicBezTo>
+                    <a:pt x="0" y="31"/>
+                    <a:pt x="2" y="62"/>
+                    <a:pt x="5" y="93"/>
+                  </a:cubicBezTo>
+                  <a:cubicBezTo>
+                    <a:pt x="8" y="117"/>
+                    <a:pt x="12" y="142"/>
+                    <a:pt x="17" y="166"/>
+                  </a:cubicBezTo>
+                  <a:cubicBezTo>
+                    <a:pt x="19" y="172"/>
+                    <a:pt x="22" y="178"/>
+                    <a:pt x="24" y="184"/>
+                  </a:cubicBezTo>
+                  <a:cubicBezTo>
+                    <a:pt x="30" y="197"/>
+                    <a:pt x="35" y="209"/>
+                    <a:pt x="41" y="222"/>
+                  </a:cubicBezTo>
+                  <a:cubicBezTo>
+                    <a:pt x="40" y="219"/>
+                    <a:pt x="39" y="215"/>
+                    <a:pt x="38" y="212"/>
+                  </a:cubicBezTo>
+                  <a:cubicBezTo>
+                    <a:pt x="26" y="172"/>
+                    <a:pt x="18" y="132"/>
+                    <a:pt x="13" y="92"/>
+                  </a:cubicBezTo>
+                  <a:cubicBezTo>
+                    <a:pt x="11" y="68"/>
+                    <a:pt x="9" y="45"/>
+                    <a:pt x="8" y="22"/>
+                  </a:cubicBezTo>
+                  <a:cubicBezTo>
+                    <a:pt x="8" y="21"/>
+                    <a:pt x="7" y="20"/>
+                    <a:pt x="7" y="18"/>
+                  </a:cubicBezTo>
+                  <a:cubicBezTo>
+                    <a:pt x="5" y="12"/>
+                    <a:pt x="2" y="6"/>
+                    <a:pt x="0" y="0"/>
+                  </a:cubicBezTo>
+                  <a:close/>
+                </a:path>
+              </a:pathLst>
+            </a:custGeom>
+            <a:solidFill>
+              <a:schemeClr val="tx2">
+                <a:alpha val="20000"/>
+              </a:schemeClr>
+            </a:solidFill>
+            <a:ln>
+              <a:noFill/>
+            </a:ln>
+          </p:spPr>
+        </p:sp>
+        <p:sp>
+          <p:nvSpPr>
+            <p:cNvPr id="23" name="Freeform 19">
+              <a:extLst>
+                <a:ext uri="{FF2B5EF4-FFF2-40B4-BE49-F238E27FC236}">
+                  <a16:creationId xmlns:a16="http://schemas.microsoft.com/office/drawing/2014/main" id="{ACCD26D6-BC97-43F5-B803-5838985FCCEF}"/>
+                </a:ext>
+                <a:ext uri="{C183D7F6-B498-43B3-948B-1728B52AA6E4}">
+                  <adec:decorative xmlns:adec="http://schemas.microsoft.com/office/drawing/2017/decorative" val="1"/>
+                </a:ext>
+              </a:extLst>
+            </p:cNvPr>
+            <p:cNvSpPr/>
+            <p:nvPr>
+              <p:extLst>
+                <p:ext uri="{386F3935-93C4-4BCD-93E2-E3B085C9AB24}">
+                  <p16:designElem xmlns:p16="http://schemas.microsoft.com/office/powerpoint/2015/main" val="1"/>
+                </p:ext>
+              </p:extLst>
+            </p:nvPr>
+          </p:nvSpPr>
+          <p:spPr bwMode="auto">
+            <a:xfrm>
+              <a:off x="3148013" y="1282700"/>
+              <a:ext cx="1768475" cy="3448050"/>
+            </a:xfrm>
+            <a:custGeom>
+              <a:avLst/>
+              <a:gdLst/>
+              <a:ahLst/>
+              <a:cxnLst/>
+              <a:rect l="0" t="0" r="r" b="b"/>
+              <a:pathLst>
+                <a:path w="450" h="878">
+                  <a:moveTo>
+                    <a:pt x="7" y="854"/>
+                  </a:moveTo>
+                  <a:cubicBezTo>
+                    <a:pt x="10" y="772"/>
+                    <a:pt x="26" y="691"/>
+                    <a:pt x="50" y="613"/>
+                  </a:cubicBezTo>
+                  <a:cubicBezTo>
+                    <a:pt x="75" y="535"/>
+                    <a:pt x="109" y="460"/>
+                    <a:pt x="149" y="388"/>
+                  </a:cubicBezTo>
+                  <a:cubicBezTo>
+                    <a:pt x="189" y="316"/>
+                    <a:pt x="235" y="248"/>
+                    <a:pt x="285" y="183"/>
+                  </a:cubicBezTo>
+                  <a:cubicBezTo>
+                    <a:pt x="310" y="151"/>
+                    <a:pt x="337" y="119"/>
+                    <a:pt x="364" y="89"/>
+                  </a:cubicBezTo>
+                  <a:cubicBezTo>
+                    <a:pt x="378" y="74"/>
+                    <a:pt x="392" y="58"/>
+                    <a:pt x="406" y="44"/>
+                  </a:cubicBezTo>
+                  <a:cubicBezTo>
+                    <a:pt x="421" y="29"/>
+                    <a:pt x="435" y="15"/>
+                    <a:pt x="450" y="1"/>
+                  </a:cubicBezTo>
+                  <a:cubicBezTo>
+                    <a:pt x="450" y="0"/>
+                    <a:pt x="450" y="0"/>
+                    <a:pt x="450" y="0"/>
+                  </a:cubicBezTo>
+                  <a:cubicBezTo>
+                    <a:pt x="434" y="14"/>
+                    <a:pt x="420" y="28"/>
+                    <a:pt x="405" y="43"/>
+                  </a:cubicBezTo>
+                  <a:cubicBezTo>
+                    <a:pt x="391" y="57"/>
+                    <a:pt x="377" y="72"/>
+                    <a:pt x="363" y="88"/>
+                  </a:cubicBezTo>
+                  <a:cubicBezTo>
+                    <a:pt x="335" y="118"/>
+                    <a:pt x="308" y="149"/>
+                    <a:pt x="283" y="181"/>
+                  </a:cubicBezTo>
+                  <a:cubicBezTo>
+                    <a:pt x="232" y="246"/>
+                    <a:pt x="185" y="314"/>
+                    <a:pt x="145" y="386"/>
+                  </a:cubicBezTo>
+                  <a:cubicBezTo>
+                    <a:pt x="104" y="457"/>
+                    <a:pt x="70" y="533"/>
+                    <a:pt x="45" y="611"/>
+                  </a:cubicBezTo>
+                  <a:cubicBezTo>
+                    <a:pt x="19" y="690"/>
+                    <a:pt x="3" y="771"/>
+                    <a:pt x="0" y="854"/>
+                  </a:cubicBezTo>
+                  <a:cubicBezTo>
+                    <a:pt x="0" y="856"/>
+                    <a:pt x="0" y="857"/>
+                    <a:pt x="0" y="859"/>
+                  </a:cubicBezTo>
+                  <a:cubicBezTo>
+                    <a:pt x="2" y="865"/>
+                    <a:pt x="4" y="872"/>
+                    <a:pt x="7" y="878"/>
+                  </a:cubicBezTo>
+                  <a:cubicBezTo>
+                    <a:pt x="7" y="870"/>
+                    <a:pt x="7" y="862"/>
+                    <a:pt x="7" y="854"/>
+                  </a:cubicBezTo>
+                  <a:close/>
+                </a:path>
+              </a:pathLst>
+            </a:custGeom>
+            <a:solidFill>
+              <a:schemeClr val="tx2">
+                <a:alpha val="20000"/>
+              </a:schemeClr>
+            </a:solidFill>
+            <a:ln>
+              <a:noFill/>
+            </a:ln>
+          </p:spPr>
+        </p:sp>
+        <p:sp>
+          <p:nvSpPr>
+            <p:cNvPr id="24" name="Freeform 20">
+              <a:extLst>
+                <a:ext uri="{FF2B5EF4-FFF2-40B4-BE49-F238E27FC236}">
+                  <a16:creationId xmlns:a16="http://schemas.microsoft.com/office/drawing/2014/main" id="{8136022F-2988-42E2-90E1-617D189FF18C}"/>
+                </a:ext>
+                <a:ext uri="{C183D7F6-B498-43B3-948B-1728B52AA6E4}">
+                  <adec:decorative xmlns:adec="http://schemas.microsoft.com/office/drawing/2017/decorative" val="1"/>
+                </a:ext>
+              </a:extLst>
+            </p:cNvPr>
+            <p:cNvSpPr/>
+            <p:nvPr>
+              <p:extLst>
+                <p:ext uri="{386F3935-93C4-4BCD-93E2-E3B085C9AB24}">
+                  <p16:designElem xmlns:p16="http://schemas.microsoft.com/office/powerpoint/2015/main" val="1"/>
+                </p:ext>
+              </p:extLst>
+            </p:nvPr>
+          </p:nvSpPr>
+          <p:spPr bwMode="auto">
+            <a:xfrm>
+              <a:off x="3273426" y="5653088"/>
+              <a:ext cx="138113" cy="287338"/>
+            </a:xfrm>
+            <a:custGeom>
+              <a:avLst/>
+              <a:gdLst/>
+              <a:ahLst/>
+              <a:cxnLst/>
+              <a:rect l="0" t="0" r="r" b="b"/>
+              <a:pathLst>
+                <a:path w="35" h="73">
+                  <a:moveTo>
+                    <a:pt x="0" y="0"/>
+                  </a:moveTo>
+                  <a:cubicBezTo>
+                    <a:pt x="7" y="24"/>
+                    <a:pt x="16" y="49"/>
+                    <a:pt x="26" y="73"/>
+                  </a:cubicBezTo>
+                  <a:cubicBezTo>
+                    <a:pt x="35" y="73"/>
+                    <a:pt x="35" y="73"/>
+                    <a:pt x="35" y="73"/>
+                  </a:cubicBezTo>
+                  <a:cubicBezTo>
+                    <a:pt x="23" y="49"/>
+                    <a:pt x="11" y="24"/>
+                    <a:pt x="0" y="0"/>
+                  </a:cubicBezTo>
+                  <a:close/>
+                </a:path>
+              </a:pathLst>
+            </a:custGeom>
+            <a:solidFill>
+              <a:schemeClr val="tx2">
+                <a:alpha val="20000"/>
+              </a:schemeClr>
+            </a:solidFill>
+            <a:ln>
+              <a:noFill/>
+            </a:ln>
+          </p:spPr>
+        </p:sp>
+        <p:sp>
+          <p:nvSpPr>
+            <p:cNvPr id="25" name="Freeform 21">
+              <a:extLst>
+                <a:ext uri="{FF2B5EF4-FFF2-40B4-BE49-F238E27FC236}">
+                  <a16:creationId xmlns:a16="http://schemas.microsoft.com/office/drawing/2014/main" id="{03859925-85FA-4D69-A0AB-6F827E3B5CBB}"/>
+                </a:ext>
+                <a:ext uri="{C183D7F6-B498-43B3-948B-1728B52AA6E4}">
+                  <adec:decorative xmlns:adec="http://schemas.microsoft.com/office/drawing/2017/decorative" val="1"/>
+                </a:ext>
+              </a:extLst>
+            </p:cNvPr>
+            <p:cNvSpPr/>
+            <p:nvPr>
+              <p:extLst>
+                <p:ext uri="{386F3935-93C4-4BCD-93E2-E3B085C9AB24}">
+                  <p16:designElem xmlns:p16="http://schemas.microsoft.com/office/powerpoint/2015/main" val="1"/>
+                </p:ext>
+              </p:extLst>
+            </p:nvPr>
+          </p:nvSpPr>
+          <p:spPr bwMode="auto">
+            <a:xfrm>
+              <a:off x="3143251" y="4656138"/>
+              <a:ext cx="31750" cy="188913"/>
+            </a:xfrm>
+            <a:custGeom>
+              <a:avLst/>
+              <a:gdLst/>
+              <a:ahLst/>
+              <a:cxnLst/>
+              <a:rect l="0" t="0" r="r" b="b"/>
+              <a:pathLst>
+                <a:path w="8" h="48">
+                  <a:moveTo>
+                    <a:pt x="7" y="44"/>
+                  </a:moveTo>
+                  <a:cubicBezTo>
+                    <a:pt x="7" y="46"/>
+                    <a:pt x="8" y="47"/>
+                    <a:pt x="8" y="48"/>
+                  </a:cubicBezTo>
+                  <a:cubicBezTo>
+                    <a:pt x="8" y="38"/>
+                    <a:pt x="8" y="29"/>
+                    <a:pt x="8" y="19"/>
+                  </a:cubicBezTo>
+                  <a:cubicBezTo>
+                    <a:pt x="5" y="13"/>
+                    <a:pt x="3" y="6"/>
+                    <a:pt x="1" y="0"/>
+                  </a:cubicBezTo>
+                  <a:cubicBezTo>
+                    <a:pt x="0" y="9"/>
+                    <a:pt x="0" y="17"/>
+                    <a:pt x="0" y="26"/>
+                  </a:cubicBezTo>
+                  <a:cubicBezTo>
+                    <a:pt x="2" y="32"/>
+                    <a:pt x="5" y="38"/>
+                    <a:pt x="7" y="44"/>
+                  </a:cubicBezTo>
+                  <a:close/>
+                </a:path>
+              </a:pathLst>
+            </a:custGeom>
+            <a:solidFill>
+              <a:schemeClr val="tx2">
+                <a:alpha val="20000"/>
+              </a:schemeClr>
+            </a:solidFill>
+            <a:ln>
+              <a:noFill/>
+            </a:ln>
+          </p:spPr>
+        </p:sp>
+        <p:sp>
+          <p:nvSpPr>
+            <p:cNvPr id="26" name="Freeform 22">
+              <a:extLst>
+                <a:ext uri="{FF2B5EF4-FFF2-40B4-BE49-F238E27FC236}">
+                  <a16:creationId xmlns:a16="http://schemas.microsoft.com/office/drawing/2014/main" id="{BAE65FC7-970A-4DCC-9FB4-CF0F7496A9E8}"/>
+                </a:ext>
+                <a:ext uri="{C183D7F6-B498-43B3-948B-1728B52AA6E4}">
+                  <adec:decorative xmlns:adec="http://schemas.microsoft.com/office/drawing/2017/decorative" val="1"/>
+                </a:ext>
+              </a:extLst>
+            </p:cNvPr>
+            <p:cNvSpPr/>
+            <p:nvPr>
+              <p:extLst>
+                <p:ext uri="{386F3935-93C4-4BCD-93E2-E3B085C9AB24}">
+                  <p16:designElem xmlns:p16="http://schemas.microsoft.com/office/powerpoint/2015/main" val="1"/>
+                </p:ext>
+              </p:extLst>
+            </p:nvPr>
+          </p:nvSpPr>
+          <p:spPr bwMode="auto">
+            <a:xfrm>
+              <a:off x="3211513" y="5410200"/>
+              <a:ext cx="203200" cy="530225"/>
+            </a:xfrm>
+            <a:custGeom>
+              <a:avLst/>
+              <a:gdLst/>
+              <a:ahLst/>
+              <a:cxnLst/>
+              <a:rect l="0" t="0" r="r" b="b"/>
+              <a:pathLst>
+                <a:path w="52" h="135">
+                  <a:moveTo>
+                    <a:pt x="7" y="18"/>
+                  </a:moveTo>
+                  <a:cubicBezTo>
+                    <a:pt x="5" y="12"/>
+                    <a:pt x="2" y="6"/>
+                    <a:pt x="0" y="0"/>
+                  </a:cubicBezTo>
+                  <a:cubicBezTo>
+                    <a:pt x="3" y="16"/>
+                    <a:pt x="7" y="32"/>
+                    <a:pt x="12" y="48"/>
+                  </a:cubicBezTo>
+                  <a:cubicBezTo>
+                    <a:pt x="13" y="53"/>
+                    <a:pt x="14" y="57"/>
+                    <a:pt x="16" y="62"/>
+                  </a:cubicBezTo>
+                  <a:cubicBezTo>
+                    <a:pt x="27" y="86"/>
+                    <a:pt x="39" y="111"/>
+                    <a:pt x="51" y="135"/>
+                  </a:cubicBezTo>
+                  <a:cubicBezTo>
+                    <a:pt x="52" y="135"/>
+                    <a:pt x="52" y="135"/>
+                    <a:pt x="52" y="135"/>
+                  </a:cubicBezTo>
+                  <a:cubicBezTo>
+                    <a:pt x="41" y="109"/>
+                    <a:pt x="32" y="83"/>
+                    <a:pt x="24" y="56"/>
+                  </a:cubicBezTo>
+                  <a:cubicBezTo>
+                    <a:pt x="18" y="43"/>
+                    <a:pt x="13" y="31"/>
+                    <a:pt x="7" y="18"/>
+                  </a:cubicBezTo>
+                  <a:close/>
+                </a:path>
+              </a:pathLst>
+            </a:custGeom>
+            <a:solidFill>
+              <a:schemeClr val="tx2">
+                <a:alpha val="20000"/>
+              </a:schemeClr>
+            </a:solidFill>
+            <a:ln>
+              <a:noFill/>
+            </a:ln>
+          </p:spPr>
+        </p:sp>
+      </p:grpSp>
+      <p:grpSp>
+        <p:nvGrpSpPr>
+          <p:cNvPr id="28" name="Group 27">
+            <a:extLst>
+              <a:ext uri="{FF2B5EF4-FFF2-40B4-BE49-F238E27FC236}">
+                <a16:creationId xmlns:a16="http://schemas.microsoft.com/office/drawing/2014/main" id="{B64F33C7-E158-4057-87E7-6F42AA6D034A}"/>
+              </a:ext>
+              <a:ext uri="{C183D7F6-B498-43B3-948B-1728B52AA6E4}">
+                <adec:decorative xmlns:adec="http://schemas.microsoft.com/office/drawing/2017/decorative" val="1"/>
+              </a:ext>
+            </a:extLst>
+          </p:cNvPr>
+          <p:cNvGrpSpPr>
+            <a:grpSpLocks noGrp="1" noUngrp="1" noRot="1" noChangeAspect="1" noMove="1" noResize="1"/>
+          </p:cNvGrpSpPr>
+          <p:nvPr>
+            <p:extLst>
+              <p:ext uri="{386F3935-93C4-4BCD-93E2-E3B085C9AB24}">
+                <p16:designElem xmlns:p16="http://schemas.microsoft.com/office/powerpoint/2015/main" val="1"/>
+              </p:ext>
+            </p:extLst>
+          </p:nvPr>
+        </p:nvGrpSpPr>
+        <p:grpSpPr>
+          <a:xfrm>
+            <a:off x="27224" y="157"/>
+            <a:ext cx="2356675" cy="6853096"/>
+            <a:chOff x="6627813" y="195610"/>
+            <a:chExt cx="1952625" cy="5678141"/>
+          </a:xfrm>
+        </p:grpSpPr>
+        <p:sp>
+          <p:nvSpPr>
+            <p:cNvPr id="29" name="Freeform 27">
+              <a:extLst>
+                <a:ext uri="{FF2B5EF4-FFF2-40B4-BE49-F238E27FC236}">
+                  <a16:creationId xmlns:a16="http://schemas.microsoft.com/office/drawing/2014/main" id="{26714E66-FCC0-42F6-B127-0F91203BC527}"/>
+                </a:ext>
+                <a:ext uri="{C183D7F6-B498-43B3-948B-1728B52AA6E4}">
+                  <adec:decorative xmlns:adec="http://schemas.microsoft.com/office/drawing/2017/decorative" val="1"/>
+                </a:ext>
+              </a:extLst>
+            </p:cNvPr>
+            <p:cNvSpPr/>
+            <p:nvPr>
+              <p:extLst>
+                <p:ext uri="{386F3935-93C4-4BCD-93E2-E3B085C9AB24}">
+                  <p16:designElem xmlns:p16="http://schemas.microsoft.com/office/powerpoint/2015/main" val="1"/>
+                </p:ext>
+              </p:extLst>
+            </p:nvPr>
+          </p:nvSpPr>
+          <p:spPr bwMode="auto">
+            <a:xfrm>
+              <a:off x="6627813" y="195610"/>
+              <a:ext cx="409575" cy="3646488"/>
+            </a:xfrm>
+            <a:custGeom>
+              <a:avLst/>
+              <a:gdLst/>
+              <a:ahLst/>
+              <a:cxnLst/>
+              <a:rect l="0" t="0" r="r" b="b"/>
+              <a:pathLst>
+                <a:path w="103" h="920">
+                  <a:moveTo>
+                    <a:pt x="7" y="210"/>
+                  </a:moveTo>
+                  <a:cubicBezTo>
+                    <a:pt x="11" y="288"/>
+                    <a:pt x="17" y="367"/>
+                    <a:pt x="26" y="445"/>
+                  </a:cubicBezTo>
+                  <a:cubicBezTo>
+                    <a:pt x="34" y="523"/>
+                    <a:pt x="44" y="601"/>
+                    <a:pt x="57" y="679"/>
+                  </a:cubicBezTo>
+                  <a:cubicBezTo>
+                    <a:pt x="69" y="757"/>
+                    <a:pt x="84" y="834"/>
+                    <a:pt x="101" y="911"/>
+                  </a:cubicBezTo>
+                  <a:cubicBezTo>
+                    <a:pt x="102" y="914"/>
+                    <a:pt x="103" y="917"/>
+                    <a:pt x="103" y="920"/>
+                  </a:cubicBezTo>
+                  <a:cubicBezTo>
+                    <a:pt x="102" y="905"/>
+                    <a:pt x="100" y="889"/>
+                    <a:pt x="99" y="874"/>
+                  </a:cubicBezTo>
+                  <a:cubicBezTo>
+                    <a:pt x="99" y="871"/>
+                    <a:pt x="99" y="868"/>
+                    <a:pt x="99" y="866"/>
+                  </a:cubicBezTo>
+                  <a:cubicBezTo>
+                    <a:pt x="85" y="803"/>
+                    <a:pt x="73" y="741"/>
+                    <a:pt x="63" y="678"/>
+                  </a:cubicBezTo>
+                  <a:cubicBezTo>
+                    <a:pt x="50" y="600"/>
+                    <a:pt x="39" y="523"/>
+                    <a:pt x="30" y="444"/>
+                  </a:cubicBezTo>
+                  <a:cubicBezTo>
+                    <a:pt x="21" y="366"/>
+                    <a:pt x="14" y="288"/>
+                    <a:pt x="9" y="209"/>
+                  </a:cubicBezTo>
+                  <a:cubicBezTo>
+                    <a:pt x="7" y="170"/>
+                    <a:pt x="5" y="131"/>
+                    <a:pt x="3" y="92"/>
+                  </a:cubicBezTo>
+                  <a:cubicBezTo>
+                    <a:pt x="2" y="61"/>
+                    <a:pt x="1" y="31"/>
+                    <a:pt x="1" y="0"/>
+                  </a:cubicBezTo>
+                  <a:cubicBezTo>
+                    <a:pt x="0" y="0"/>
+                    <a:pt x="0" y="0"/>
+                    <a:pt x="0" y="0"/>
+                  </a:cubicBezTo>
+                  <a:cubicBezTo>
+                    <a:pt x="0" y="31"/>
+                    <a:pt x="1" y="61"/>
+                    <a:pt x="1" y="92"/>
+                  </a:cubicBezTo>
+                  <a:cubicBezTo>
+                    <a:pt x="3" y="131"/>
+                    <a:pt x="4" y="170"/>
+                    <a:pt x="7" y="210"/>
+                  </a:cubicBezTo>
+                  <a:close/>
+                </a:path>
+              </a:pathLst>
+            </a:custGeom>
+            <a:solidFill>
+              <a:schemeClr val="tx2"/>
+            </a:solidFill>
+            <a:ln>
+              <a:noFill/>
+            </a:ln>
+          </p:spPr>
+        </p:sp>
+        <p:sp>
+          <p:nvSpPr>
+            <p:cNvPr id="30" name="Freeform 28">
+              <a:extLst>
+                <a:ext uri="{FF2B5EF4-FFF2-40B4-BE49-F238E27FC236}">
+                  <a16:creationId xmlns:a16="http://schemas.microsoft.com/office/drawing/2014/main" id="{7E0BD3C9-F0D9-4A53-87DF-71D17D328DA8}"/>
+                </a:ext>
+                <a:ext uri="{C183D7F6-B498-43B3-948B-1728B52AA6E4}">
+                  <adec:decorative xmlns:adec="http://schemas.microsoft.com/office/drawing/2017/decorative" val="1"/>
+                </a:ext>
+              </a:extLst>
+            </p:cNvPr>
+            <p:cNvSpPr/>
+            <p:nvPr>
+              <p:extLst>
+                <p:ext uri="{386F3935-93C4-4BCD-93E2-E3B085C9AB24}">
+                  <p16:designElem xmlns:p16="http://schemas.microsoft.com/office/powerpoint/2015/main" val="1"/>
+                </p:ext>
+              </p:extLst>
+            </p:nvPr>
+          </p:nvSpPr>
+          <p:spPr bwMode="auto">
+            <a:xfrm>
+              <a:off x="7061201" y="3771900"/>
+              <a:ext cx="350838" cy="1309688"/>
+            </a:xfrm>
+            <a:custGeom>
+              <a:avLst/>
+              <a:gdLst/>
+              <a:ahLst/>
+              <a:cxnLst/>
+              <a:rect l="0" t="0" r="r" b="b"/>
+              <a:pathLst>
+                <a:path w="88" h="330">
+                  <a:moveTo>
+                    <a:pt x="53" y="229"/>
+                  </a:moveTo>
+                  <a:cubicBezTo>
+                    <a:pt x="64" y="263"/>
+                    <a:pt x="75" y="297"/>
+                    <a:pt x="88" y="330"/>
+                  </a:cubicBezTo>
+                  <a:cubicBezTo>
+                    <a:pt x="88" y="323"/>
+                    <a:pt x="88" y="315"/>
+                    <a:pt x="88" y="308"/>
+                  </a:cubicBezTo>
+                  <a:cubicBezTo>
+                    <a:pt x="88" y="307"/>
+                    <a:pt x="88" y="305"/>
+                    <a:pt x="88" y="304"/>
+                  </a:cubicBezTo>
+                  <a:cubicBezTo>
+                    <a:pt x="79" y="278"/>
+                    <a:pt x="70" y="252"/>
+                    <a:pt x="62" y="226"/>
+                  </a:cubicBezTo>
+                  <a:cubicBezTo>
+                    <a:pt x="38" y="152"/>
+                    <a:pt x="17" y="76"/>
+                    <a:pt x="0" y="0"/>
+                  </a:cubicBezTo>
+                  <a:cubicBezTo>
+                    <a:pt x="2" y="21"/>
+                    <a:pt x="4" y="42"/>
+                    <a:pt x="7" y="63"/>
+                  </a:cubicBezTo>
+                  <a:cubicBezTo>
+                    <a:pt x="21" y="119"/>
+                    <a:pt x="36" y="174"/>
+                    <a:pt x="53" y="229"/>
+                  </a:cubicBezTo>
+                  <a:close/>
+                </a:path>
+              </a:pathLst>
+            </a:custGeom>
+            <a:solidFill>
+              <a:schemeClr val="tx2"/>
+            </a:solidFill>
+            <a:ln>
+              <a:noFill/>
+            </a:ln>
+          </p:spPr>
+        </p:sp>
+        <p:sp>
+          <p:nvSpPr>
+            <p:cNvPr id="31" name="Freeform 29">
+              <a:extLst>
+                <a:ext uri="{FF2B5EF4-FFF2-40B4-BE49-F238E27FC236}">
+                  <a16:creationId xmlns:a16="http://schemas.microsoft.com/office/drawing/2014/main" id="{DFA9FE4C-FCED-4A9A-9E43-358EB75011ED}"/>
+                </a:ext>
+                <a:ext uri="{C183D7F6-B498-43B3-948B-1728B52AA6E4}">
+                  <adec:decorative xmlns:adec="http://schemas.microsoft.com/office/drawing/2017/decorative" val="1"/>
+                </a:ext>
+              </a:extLst>
+            </p:cNvPr>
+            <p:cNvSpPr/>
+            <p:nvPr>
+              <p:extLst>
+                <p:ext uri="{386F3935-93C4-4BCD-93E2-E3B085C9AB24}">
+                  <p16:designElem xmlns:p16="http://schemas.microsoft.com/office/powerpoint/2015/main" val="1"/>
+                </p:ext>
+              </p:extLst>
+            </p:nvPr>
+          </p:nvSpPr>
+          <p:spPr bwMode="auto">
+            <a:xfrm>
+              <a:off x="7439026" y="5053013"/>
+              <a:ext cx="357188" cy="820738"/>
+            </a:xfrm>
+            <a:custGeom>
+              <a:avLst/>
+              <a:gdLst/>
+              <a:ahLst/>
+              <a:cxnLst/>
+              <a:rect l="0" t="0" r="r" b="b"/>
+              <a:pathLst>
+                <a:path w="90" h="207">
+                  <a:moveTo>
+                    <a:pt x="6" y="15"/>
+                  </a:moveTo>
+                  <a:cubicBezTo>
+                    <a:pt x="4" y="10"/>
+                    <a:pt x="2" y="5"/>
+                    <a:pt x="0" y="0"/>
+                  </a:cubicBezTo>
+                  <a:cubicBezTo>
+                    <a:pt x="0" y="9"/>
+                    <a:pt x="0" y="19"/>
+                    <a:pt x="1" y="29"/>
+                  </a:cubicBezTo>
+                  <a:cubicBezTo>
+                    <a:pt x="14" y="62"/>
+                    <a:pt x="27" y="95"/>
+                    <a:pt x="42" y="127"/>
+                  </a:cubicBezTo>
+                  <a:cubicBezTo>
+                    <a:pt x="54" y="154"/>
+                    <a:pt x="67" y="181"/>
+                    <a:pt x="80" y="207"/>
+                  </a:cubicBezTo>
+                  <a:cubicBezTo>
+                    <a:pt x="90" y="207"/>
+                    <a:pt x="90" y="207"/>
+                    <a:pt x="90" y="207"/>
+                  </a:cubicBezTo>
+                  <a:cubicBezTo>
+                    <a:pt x="76" y="180"/>
+                    <a:pt x="63" y="152"/>
+                    <a:pt x="50" y="123"/>
+                  </a:cubicBezTo>
+                  <a:cubicBezTo>
+                    <a:pt x="34" y="88"/>
+                    <a:pt x="20" y="51"/>
+                    <a:pt x="6" y="15"/>
+                  </a:cubicBezTo>
+                  <a:close/>
+                </a:path>
+              </a:pathLst>
+            </a:custGeom>
+            <a:solidFill>
+              <a:schemeClr val="tx2"/>
+            </a:solidFill>
+            <a:ln>
+              <a:noFill/>
+            </a:ln>
+          </p:spPr>
+        </p:sp>
+        <p:sp>
+          <p:nvSpPr>
+            <p:cNvPr id="32" name="Freeform 30">
+              <a:extLst>
+                <a:ext uri="{FF2B5EF4-FFF2-40B4-BE49-F238E27FC236}">
+                  <a16:creationId xmlns:a16="http://schemas.microsoft.com/office/drawing/2014/main" id="{E5D5BB28-15EC-4D32-9C05-C2206AF9E28C}"/>
+                </a:ext>
+                <a:ext uri="{C183D7F6-B498-43B3-948B-1728B52AA6E4}">
+                  <adec:decorative xmlns:adec="http://schemas.microsoft.com/office/drawing/2017/decorative" val="1"/>
+                </a:ext>
+              </a:extLst>
+            </p:cNvPr>
+            <p:cNvSpPr/>
+            <p:nvPr>
+              <p:extLst>
+                <p:ext uri="{386F3935-93C4-4BCD-93E2-E3B085C9AB24}">
+                  <p16:designElem xmlns:p16="http://schemas.microsoft.com/office/powerpoint/2015/main" val="1"/>
+                </p:ext>
+              </p:extLst>
+            </p:nvPr>
+          </p:nvSpPr>
+          <p:spPr bwMode="auto">
+            <a:xfrm>
+              <a:off x="7037388" y="3811588"/>
+              <a:ext cx="457200" cy="1852613"/>
+            </a:xfrm>
+            <a:custGeom>
+              <a:avLst/>
+              <a:gdLst/>
+              <a:ahLst/>
+              <a:cxnLst/>
+              <a:rect l="0" t="0" r="r" b="b"/>
+              <a:pathLst>
+                <a:path w="115" h="467">
+                  <a:moveTo>
+                    <a:pt x="101" y="409"/>
+                  </a:moveTo>
+                  <a:cubicBezTo>
+                    <a:pt x="93" y="388"/>
+                    <a:pt x="85" y="366"/>
+                    <a:pt x="78" y="344"/>
+                  </a:cubicBezTo>
+                  <a:cubicBezTo>
+                    <a:pt x="57" y="281"/>
+                    <a:pt x="41" y="216"/>
+                    <a:pt x="29" y="151"/>
+                  </a:cubicBezTo>
+                  <a:cubicBezTo>
+                    <a:pt x="22" y="119"/>
+                    <a:pt x="17" y="86"/>
+                    <a:pt x="13" y="53"/>
+                  </a:cubicBezTo>
+                  <a:cubicBezTo>
+                    <a:pt x="9" y="35"/>
+                    <a:pt x="4" y="18"/>
+                    <a:pt x="0" y="0"/>
+                  </a:cubicBezTo>
+                  <a:cubicBezTo>
+                    <a:pt x="5" y="51"/>
+                    <a:pt x="12" y="102"/>
+                    <a:pt x="21" y="152"/>
+                  </a:cubicBezTo>
+                  <a:cubicBezTo>
+                    <a:pt x="33" y="218"/>
+                    <a:pt x="49" y="283"/>
+                    <a:pt x="69" y="347"/>
+                  </a:cubicBezTo>
+                  <a:cubicBezTo>
+                    <a:pt x="79" y="378"/>
+                    <a:pt x="90" y="410"/>
+                    <a:pt x="103" y="441"/>
+                  </a:cubicBezTo>
+                  <a:cubicBezTo>
+                    <a:pt x="107" y="449"/>
+                    <a:pt x="111" y="458"/>
+                    <a:pt x="115" y="467"/>
+                  </a:cubicBezTo>
+                  <a:cubicBezTo>
+                    <a:pt x="114" y="464"/>
+                    <a:pt x="113" y="461"/>
+                    <a:pt x="112" y="458"/>
+                  </a:cubicBezTo>
+                  <a:cubicBezTo>
+                    <a:pt x="108" y="442"/>
+                    <a:pt x="104" y="425"/>
+                    <a:pt x="101" y="409"/>
+                  </a:cubicBezTo>
+                  <a:close/>
+                </a:path>
+              </a:pathLst>
+            </a:custGeom>
+            <a:solidFill>
+              <a:schemeClr val="tx2"/>
+            </a:solidFill>
+            <a:ln>
+              <a:noFill/>
+            </a:ln>
+          </p:spPr>
+        </p:sp>
+        <p:sp>
+          <p:nvSpPr>
+            <p:cNvPr id="33" name="Freeform 31">
+              <a:extLst>
+                <a:ext uri="{FF2B5EF4-FFF2-40B4-BE49-F238E27FC236}">
+                  <a16:creationId xmlns:a16="http://schemas.microsoft.com/office/drawing/2014/main" id="{06210E9D-4080-4566-B32A-3A8BE356F899}"/>
+                </a:ext>
+                <a:ext uri="{C183D7F6-B498-43B3-948B-1728B52AA6E4}">
+                  <adec:decorative xmlns:adec="http://schemas.microsoft.com/office/drawing/2017/decorative" val="1"/>
+                </a:ext>
+              </a:extLst>
+            </p:cNvPr>
+            <p:cNvSpPr/>
+            <p:nvPr>
+              <p:extLst>
+                <p:ext uri="{386F3935-93C4-4BCD-93E2-E3B085C9AB24}">
+                  <p16:designElem xmlns:p16="http://schemas.microsoft.com/office/powerpoint/2015/main" val="1"/>
+                </p:ext>
+              </p:extLst>
+            </p:nvPr>
+          </p:nvSpPr>
+          <p:spPr bwMode="auto">
+            <a:xfrm>
+              <a:off x="6992938" y="1263650"/>
+              <a:ext cx="144463" cy="2508250"/>
+            </a:xfrm>
+            <a:custGeom>
+              <a:avLst/>
+              <a:gdLst/>
+              <a:ahLst/>
+              <a:cxnLst/>
+              <a:rect l="0" t="0" r="r" b="b"/>
+              <a:pathLst>
+                <a:path w="36" h="633">
+                  <a:moveTo>
+                    <a:pt x="17" y="633"/>
+                  </a:moveTo>
+                  <a:cubicBezTo>
+                    <a:pt x="15" y="621"/>
+                    <a:pt x="14" y="609"/>
+                    <a:pt x="13" y="597"/>
+                  </a:cubicBezTo>
+                  <a:cubicBezTo>
+                    <a:pt x="8" y="530"/>
+                    <a:pt x="5" y="464"/>
+                    <a:pt x="5" y="398"/>
+                  </a:cubicBezTo>
+                  <a:cubicBezTo>
+                    <a:pt x="5" y="331"/>
+                    <a:pt x="8" y="265"/>
+                    <a:pt x="13" y="198"/>
+                  </a:cubicBezTo>
+                  <a:cubicBezTo>
+                    <a:pt x="15" y="165"/>
+                    <a:pt x="18" y="132"/>
+                    <a:pt x="22" y="99"/>
+                  </a:cubicBezTo>
+                  <a:cubicBezTo>
+                    <a:pt x="26" y="66"/>
+                    <a:pt x="30" y="33"/>
+                    <a:pt x="36" y="0"/>
+                  </a:cubicBezTo>
+                  <a:cubicBezTo>
+                    <a:pt x="35" y="0"/>
+                    <a:pt x="35" y="0"/>
+                    <a:pt x="35" y="0"/>
+                  </a:cubicBezTo>
+                  <a:cubicBezTo>
+                    <a:pt x="29" y="33"/>
+                    <a:pt x="24" y="66"/>
+                    <a:pt x="20" y="99"/>
+                  </a:cubicBezTo>
+                  <a:cubicBezTo>
+                    <a:pt x="16" y="132"/>
+                    <a:pt x="13" y="165"/>
+                    <a:pt x="10" y="198"/>
+                  </a:cubicBezTo>
+                  <a:cubicBezTo>
+                    <a:pt x="4" y="264"/>
+                    <a:pt x="1" y="331"/>
+                    <a:pt x="1" y="398"/>
+                  </a:cubicBezTo>
+                  <a:cubicBezTo>
+                    <a:pt x="0" y="461"/>
+                    <a:pt x="2" y="525"/>
+                    <a:pt x="7" y="589"/>
+                  </a:cubicBezTo>
+                  <a:cubicBezTo>
+                    <a:pt x="10" y="603"/>
+                    <a:pt x="13" y="618"/>
+                    <a:pt x="16" y="632"/>
+                  </a:cubicBezTo>
+                  <a:cubicBezTo>
+                    <a:pt x="16" y="632"/>
+                    <a:pt x="17" y="633"/>
+                    <a:pt x="17" y="633"/>
+                  </a:cubicBezTo>
+                  <a:close/>
+                </a:path>
+              </a:pathLst>
+            </a:custGeom>
+            <a:solidFill>
+              <a:schemeClr val="tx2"/>
+            </a:solidFill>
+            <a:ln>
+              <a:noFill/>
+            </a:ln>
+          </p:spPr>
+        </p:sp>
+        <p:sp>
+          <p:nvSpPr>
+            <p:cNvPr id="34" name="Freeform 32">
+              <a:extLst>
+                <a:ext uri="{FF2B5EF4-FFF2-40B4-BE49-F238E27FC236}">
+                  <a16:creationId xmlns:a16="http://schemas.microsoft.com/office/drawing/2014/main" id="{894D3505-0982-40B2-8131-1B6BFF2736C8}"/>
+                </a:ext>
+                <a:ext uri="{C183D7F6-B498-43B3-948B-1728B52AA6E4}">
+                  <adec:decorative xmlns:adec="http://schemas.microsoft.com/office/drawing/2017/decorative" val="1"/>
+                </a:ext>
+              </a:extLst>
+            </p:cNvPr>
+            <p:cNvSpPr/>
+            <p:nvPr>
+              <p:extLst>
+                <p:ext uri="{386F3935-93C4-4BCD-93E2-E3B085C9AB24}">
+                  <p16:designElem xmlns:p16="http://schemas.microsoft.com/office/powerpoint/2015/main" val="1"/>
+                </p:ext>
+              </p:extLst>
+            </p:nvPr>
+          </p:nvSpPr>
+          <p:spPr bwMode="auto">
+            <a:xfrm>
+              <a:off x="7526338" y="5640388"/>
+              <a:ext cx="111125" cy="233363"/>
+            </a:xfrm>
+            <a:custGeom>
+              <a:avLst/>
+              <a:gdLst/>
+              <a:ahLst/>
+              <a:cxnLst/>
+              <a:rect l="0" t="0" r="r" b="b"/>
+              <a:pathLst>
+                <a:path w="28" h="59">
+                  <a:moveTo>
+                    <a:pt x="22" y="59"/>
+                  </a:moveTo>
+                  <a:cubicBezTo>
+                    <a:pt x="28" y="59"/>
+                    <a:pt x="28" y="59"/>
+                    <a:pt x="28" y="59"/>
+                  </a:cubicBezTo>
+                  <a:cubicBezTo>
+                    <a:pt x="18" y="40"/>
+                    <a:pt x="9" y="20"/>
+                    <a:pt x="0" y="0"/>
+                  </a:cubicBezTo>
+                  <a:cubicBezTo>
+                    <a:pt x="6" y="20"/>
+                    <a:pt x="13" y="40"/>
+                    <a:pt x="22" y="59"/>
+                  </a:cubicBezTo>
+                  <a:close/>
+                </a:path>
+              </a:pathLst>
+            </a:custGeom>
+            <a:solidFill>
+              <a:schemeClr val="tx2"/>
+            </a:solidFill>
+            <a:ln>
+              <a:noFill/>
+            </a:ln>
+          </p:spPr>
+        </p:sp>
+        <p:sp>
+          <p:nvSpPr>
+            <p:cNvPr id="35" name="Freeform 33">
+              <a:extLst>
+                <a:ext uri="{FF2B5EF4-FFF2-40B4-BE49-F238E27FC236}">
+                  <a16:creationId xmlns:a16="http://schemas.microsoft.com/office/drawing/2014/main" id="{11598CAB-0965-48D6-999C-91450C50DEB1}"/>
+                </a:ext>
+                <a:ext uri="{C183D7F6-B498-43B3-948B-1728B52AA6E4}">
+                  <adec:decorative xmlns:adec="http://schemas.microsoft.com/office/drawing/2017/decorative" val="1"/>
+                </a:ext>
+              </a:extLst>
+            </p:cNvPr>
+            <p:cNvSpPr/>
+            <p:nvPr>
+              <p:extLst>
+                <p:ext uri="{386F3935-93C4-4BCD-93E2-E3B085C9AB24}">
+                  <p16:designElem xmlns:p16="http://schemas.microsoft.com/office/powerpoint/2015/main" val="1"/>
+                </p:ext>
+              </p:extLst>
+            </p:nvPr>
+          </p:nvSpPr>
+          <p:spPr bwMode="auto">
+            <a:xfrm>
+              <a:off x="7021513" y="3598863"/>
+              <a:ext cx="68263" cy="423863"/>
+            </a:xfrm>
+            <a:custGeom>
+              <a:avLst/>
+              <a:gdLst/>
+              <a:ahLst/>
+              <a:cxnLst/>
+              <a:rect l="0" t="0" r="r" b="b"/>
+              <a:pathLst>
+                <a:path w="17" h="107">
+                  <a:moveTo>
+                    <a:pt x="4" y="54"/>
+                  </a:moveTo>
+                  <a:cubicBezTo>
+                    <a:pt x="8" y="72"/>
+                    <a:pt x="13" y="89"/>
+                    <a:pt x="17" y="107"/>
+                  </a:cubicBezTo>
+                  <a:cubicBezTo>
+                    <a:pt x="14" y="86"/>
+                    <a:pt x="12" y="65"/>
+                    <a:pt x="10" y="44"/>
+                  </a:cubicBezTo>
+                  <a:cubicBezTo>
+                    <a:pt x="10" y="44"/>
+                    <a:pt x="9" y="43"/>
+                    <a:pt x="9" y="43"/>
+                  </a:cubicBezTo>
+                  <a:cubicBezTo>
+                    <a:pt x="6" y="29"/>
+                    <a:pt x="3" y="14"/>
+                    <a:pt x="0" y="0"/>
+                  </a:cubicBezTo>
+                  <a:cubicBezTo>
+                    <a:pt x="0" y="2"/>
+                    <a:pt x="0" y="5"/>
+                    <a:pt x="0" y="8"/>
+                  </a:cubicBezTo>
+                  <a:cubicBezTo>
+                    <a:pt x="1" y="23"/>
+                    <a:pt x="3" y="39"/>
+                    <a:pt x="4" y="54"/>
+                  </a:cubicBezTo>
+                  <a:close/>
+                </a:path>
+              </a:pathLst>
+            </a:custGeom>
+            <a:solidFill>
+              <a:schemeClr val="tx2"/>
+            </a:solidFill>
+            <a:ln>
+              <a:noFill/>
+            </a:ln>
+          </p:spPr>
+        </p:sp>
+        <p:sp>
+          <p:nvSpPr>
+            <p:cNvPr id="36" name="Freeform 34">
+              <a:extLst>
+                <a:ext uri="{FF2B5EF4-FFF2-40B4-BE49-F238E27FC236}">
+                  <a16:creationId xmlns:a16="http://schemas.microsoft.com/office/drawing/2014/main" id="{29E94126-468A-4060-BCBC-DC3806A46F9D}"/>
+                </a:ext>
+                <a:ext uri="{C183D7F6-B498-43B3-948B-1728B52AA6E4}">
+                  <adec:decorative xmlns:adec="http://schemas.microsoft.com/office/drawing/2017/decorative" val="1"/>
+                </a:ext>
+              </a:extLst>
+            </p:cNvPr>
+            <p:cNvSpPr/>
+            <p:nvPr>
+              <p:extLst>
+                <p:ext uri="{386F3935-93C4-4BCD-93E2-E3B085C9AB24}">
+                  <p16:designElem xmlns:p16="http://schemas.microsoft.com/office/powerpoint/2015/main" val="1"/>
+                </p:ext>
+              </p:extLst>
+            </p:nvPr>
+          </p:nvSpPr>
+          <p:spPr bwMode="auto">
+            <a:xfrm>
+              <a:off x="7412038" y="2801938"/>
+              <a:ext cx="1168400" cy="2251075"/>
+            </a:xfrm>
+            <a:custGeom>
+              <a:avLst/>
+              <a:gdLst/>
+              <a:ahLst/>
+              <a:cxnLst/>
+              <a:rect l="0" t="0" r="r" b="b"/>
+              <a:pathLst>
+                <a:path w="294" h="568">
+                  <a:moveTo>
+                    <a:pt x="8" y="553"/>
+                  </a:moveTo>
+                  <a:cubicBezTo>
+                    <a:pt x="9" y="501"/>
+                    <a:pt x="19" y="448"/>
+                    <a:pt x="35" y="397"/>
+                  </a:cubicBezTo>
+                  <a:cubicBezTo>
+                    <a:pt x="51" y="347"/>
+                    <a:pt x="73" y="298"/>
+                    <a:pt x="99" y="252"/>
+                  </a:cubicBezTo>
+                  <a:cubicBezTo>
+                    <a:pt x="124" y="205"/>
+                    <a:pt x="154" y="161"/>
+                    <a:pt x="187" y="119"/>
+                  </a:cubicBezTo>
+                  <a:cubicBezTo>
+                    <a:pt x="203" y="98"/>
+                    <a:pt x="220" y="77"/>
+                    <a:pt x="238" y="58"/>
+                  </a:cubicBezTo>
+                  <a:cubicBezTo>
+                    <a:pt x="247" y="48"/>
+                    <a:pt x="256" y="38"/>
+                    <a:pt x="265" y="28"/>
+                  </a:cubicBezTo>
+                  <a:cubicBezTo>
+                    <a:pt x="274" y="19"/>
+                    <a:pt x="284" y="9"/>
+                    <a:pt x="294" y="0"/>
+                  </a:cubicBezTo>
+                  <a:cubicBezTo>
+                    <a:pt x="293" y="0"/>
+                    <a:pt x="293" y="0"/>
+                    <a:pt x="293" y="0"/>
+                  </a:cubicBezTo>
+                  <a:cubicBezTo>
+                    <a:pt x="283" y="9"/>
+                    <a:pt x="273" y="18"/>
+                    <a:pt x="264" y="27"/>
+                  </a:cubicBezTo>
+                  <a:cubicBezTo>
+                    <a:pt x="255" y="37"/>
+                    <a:pt x="246" y="47"/>
+                    <a:pt x="237" y="56"/>
+                  </a:cubicBezTo>
+                  <a:cubicBezTo>
+                    <a:pt x="218" y="76"/>
+                    <a:pt x="201" y="96"/>
+                    <a:pt x="185" y="117"/>
+                  </a:cubicBezTo>
+                  <a:cubicBezTo>
+                    <a:pt x="151" y="159"/>
+                    <a:pt x="121" y="203"/>
+                    <a:pt x="95" y="249"/>
+                  </a:cubicBezTo>
+                  <a:cubicBezTo>
+                    <a:pt x="68" y="296"/>
+                    <a:pt x="46" y="345"/>
+                    <a:pt x="30" y="396"/>
+                  </a:cubicBezTo>
+                  <a:cubicBezTo>
+                    <a:pt x="13" y="445"/>
+                    <a:pt x="3" y="497"/>
+                    <a:pt x="0" y="549"/>
+                  </a:cubicBezTo>
+                  <a:cubicBezTo>
+                    <a:pt x="3" y="555"/>
+                    <a:pt x="5" y="561"/>
+                    <a:pt x="7" y="568"/>
+                  </a:cubicBezTo>
+                  <a:cubicBezTo>
+                    <a:pt x="7" y="563"/>
+                    <a:pt x="7" y="558"/>
+                    <a:pt x="8" y="553"/>
+                  </a:cubicBezTo>
+                  <a:close/>
+                </a:path>
+              </a:pathLst>
+            </a:custGeom>
+            <a:solidFill>
+              <a:schemeClr val="tx2"/>
+            </a:solidFill>
+            <a:ln>
+              <a:noFill/>
+            </a:ln>
+          </p:spPr>
+        </p:sp>
+        <p:sp>
+          <p:nvSpPr>
+            <p:cNvPr id="37" name="Freeform 35">
+              <a:extLst>
+                <a:ext uri="{FF2B5EF4-FFF2-40B4-BE49-F238E27FC236}">
+                  <a16:creationId xmlns:a16="http://schemas.microsoft.com/office/drawing/2014/main" id="{438F3422-C112-405B-B955-7B169072142D}"/>
+                </a:ext>
+                <a:ext uri="{C183D7F6-B498-43B3-948B-1728B52AA6E4}">
+                  <adec:decorative xmlns:adec="http://schemas.microsoft.com/office/drawing/2017/decorative" val="1"/>
+                </a:ext>
+              </a:extLst>
+            </p:cNvPr>
+            <p:cNvSpPr/>
+            <p:nvPr>
+              <p:extLst>
+                <p:ext uri="{386F3935-93C4-4BCD-93E2-E3B085C9AB24}">
+                  <p16:designElem xmlns:p16="http://schemas.microsoft.com/office/powerpoint/2015/main" val="1"/>
+                </p:ext>
+              </p:extLst>
+            </p:nvPr>
+          </p:nvSpPr>
+          <p:spPr bwMode="auto">
+            <a:xfrm>
+              <a:off x="7494588" y="5664200"/>
+              <a:ext cx="100013" cy="209550"/>
+            </a:xfrm>
+            <a:custGeom>
+              <a:avLst/>
+              <a:gdLst/>
+              <a:ahLst/>
+              <a:cxnLst/>
+              <a:rect l="0" t="0" r="r" b="b"/>
+              <a:pathLst>
+                <a:path w="25" h="53">
+                  <a:moveTo>
+                    <a:pt x="0" y="0"/>
+                  </a:moveTo>
+                  <a:cubicBezTo>
+                    <a:pt x="5" y="18"/>
+                    <a:pt x="12" y="36"/>
+                    <a:pt x="19" y="53"/>
+                  </a:cubicBezTo>
+                  <a:cubicBezTo>
+                    <a:pt x="25" y="53"/>
+                    <a:pt x="25" y="53"/>
+                    <a:pt x="25" y="53"/>
+                  </a:cubicBezTo>
+                  <a:cubicBezTo>
+                    <a:pt x="16" y="36"/>
+                    <a:pt x="8" y="18"/>
+                    <a:pt x="0" y="0"/>
+                  </a:cubicBezTo>
+                  <a:close/>
+                </a:path>
+              </a:pathLst>
+            </a:custGeom>
+            <a:solidFill>
+              <a:schemeClr val="tx2"/>
+            </a:solidFill>
+            <a:ln>
+              <a:noFill/>
+            </a:ln>
+          </p:spPr>
+        </p:sp>
+        <p:sp>
+          <p:nvSpPr>
+            <p:cNvPr id="38" name="Freeform 36">
+              <a:extLst>
+                <a:ext uri="{FF2B5EF4-FFF2-40B4-BE49-F238E27FC236}">
+                  <a16:creationId xmlns:a16="http://schemas.microsoft.com/office/drawing/2014/main" id="{C99C65FC-23C1-4B1D-A385-29B46619D204}"/>
+                </a:ext>
+                <a:ext uri="{C183D7F6-B498-43B3-948B-1728B52AA6E4}">
+                  <adec:decorative xmlns:adec="http://schemas.microsoft.com/office/drawing/2017/decorative" val="1"/>
+                </a:ext>
+              </a:extLst>
+            </p:cNvPr>
+            <p:cNvSpPr/>
+            <p:nvPr>
+              <p:extLst>
+                <p:ext uri="{386F3935-93C4-4BCD-93E2-E3B085C9AB24}">
+                  <p16:designElem xmlns:p16="http://schemas.microsoft.com/office/powerpoint/2015/main" val="1"/>
+                </p:ext>
+              </p:extLst>
+            </p:nvPr>
+          </p:nvSpPr>
+          <p:spPr bwMode="auto">
+            <a:xfrm>
+              <a:off x="7412038" y="5081588"/>
+              <a:ext cx="114300" cy="558800"/>
+            </a:xfrm>
+            <a:custGeom>
+              <a:avLst/>
+              <a:gdLst/>
+              <a:ahLst/>
+              <a:cxnLst/>
+              <a:rect l="0" t="0" r="r" b="b"/>
+              <a:pathLst>
+                <a:path w="29" h="141">
+                  <a:moveTo>
+                    <a:pt x="0" y="0"/>
+                  </a:moveTo>
+                  <a:cubicBezTo>
+                    <a:pt x="0" y="30"/>
+                    <a:pt x="2" y="60"/>
+                    <a:pt x="7" y="89"/>
+                  </a:cubicBezTo>
+                  <a:cubicBezTo>
+                    <a:pt x="11" y="98"/>
+                    <a:pt x="14" y="108"/>
+                    <a:pt x="18" y="117"/>
+                  </a:cubicBezTo>
+                  <a:cubicBezTo>
+                    <a:pt x="22" y="125"/>
+                    <a:pt x="25" y="133"/>
+                    <a:pt x="29" y="141"/>
+                  </a:cubicBezTo>
+                  <a:cubicBezTo>
+                    <a:pt x="28" y="139"/>
+                    <a:pt x="28" y="137"/>
+                    <a:pt x="27" y="135"/>
+                  </a:cubicBezTo>
+                  <a:cubicBezTo>
+                    <a:pt x="16" y="98"/>
+                    <a:pt x="10" y="60"/>
+                    <a:pt x="8" y="22"/>
+                  </a:cubicBezTo>
+                  <a:cubicBezTo>
+                    <a:pt x="7" y="18"/>
+                    <a:pt x="5" y="15"/>
+                    <a:pt x="4" y="11"/>
+                  </a:cubicBezTo>
+                  <a:cubicBezTo>
+                    <a:pt x="2" y="7"/>
+                    <a:pt x="1" y="3"/>
+                    <a:pt x="0" y="0"/>
+                  </a:cubicBezTo>
+                  <a:close/>
+                </a:path>
+              </a:pathLst>
+            </a:custGeom>
+            <a:solidFill>
+              <a:schemeClr val="tx2"/>
+            </a:solidFill>
+            <a:ln>
+              <a:noFill/>
+            </a:ln>
+          </p:spPr>
+        </p:sp>
+        <p:sp>
+          <p:nvSpPr>
+            <p:cNvPr id="39" name="Freeform 37">
+              <a:extLst>
+                <a:ext uri="{FF2B5EF4-FFF2-40B4-BE49-F238E27FC236}">
+                  <a16:creationId xmlns:a16="http://schemas.microsoft.com/office/drawing/2014/main" id="{53D192C3-5E79-4B85-98D0-8F6C681CDC17}"/>
+                </a:ext>
+                <a:ext uri="{C183D7F6-B498-43B3-948B-1728B52AA6E4}">
+                  <adec:decorative xmlns:adec="http://schemas.microsoft.com/office/drawing/2017/decorative" val="1"/>
+                </a:ext>
+              </a:extLst>
+            </p:cNvPr>
+            <p:cNvSpPr/>
+            <p:nvPr>
+              <p:extLst>
+                <p:ext uri="{386F3935-93C4-4BCD-93E2-E3B085C9AB24}">
+                  <p16:designElem xmlns:p16="http://schemas.microsoft.com/office/powerpoint/2015/main" val="1"/>
+                </p:ext>
+              </p:extLst>
+            </p:nvPr>
+          </p:nvSpPr>
+          <p:spPr bwMode="auto">
+            <a:xfrm>
+              <a:off x="7412038" y="4978400"/>
+              <a:ext cx="31750" cy="188913"/>
+            </a:xfrm>
+            <a:custGeom>
+              <a:avLst/>
+              <a:gdLst/>
+              <a:ahLst/>
+              <a:cxnLst/>
+              <a:rect l="0" t="0" r="r" b="b"/>
+              <a:pathLst>
+                <a:path w="8" h="48">
+                  <a:moveTo>
+                    <a:pt x="0" y="26"/>
+                  </a:moveTo>
+                  <a:cubicBezTo>
+                    <a:pt x="1" y="29"/>
+                    <a:pt x="2" y="33"/>
+                    <a:pt x="4" y="37"/>
+                  </a:cubicBezTo>
+                  <a:cubicBezTo>
+                    <a:pt x="5" y="41"/>
+                    <a:pt x="7" y="44"/>
+                    <a:pt x="8" y="48"/>
+                  </a:cubicBezTo>
+                  <a:cubicBezTo>
+                    <a:pt x="7" y="38"/>
+                    <a:pt x="7" y="28"/>
+                    <a:pt x="7" y="19"/>
+                  </a:cubicBezTo>
+                  <a:cubicBezTo>
+                    <a:pt x="5" y="12"/>
+                    <a:pt x="3" y="6"/>
+                    <a:pt x="0" y="0"/>
+                  </a:cubicBezTo>
+                  <a:cubicBezTo>
+                    <a:pt x="0" y="1"/>
+                    <a:pt x="0" y="3"/>
+                    <a:pt x="0" y="4"/>
+                  </a:cubicBezTo>
+                  <a:cubicBezTo>
+                    <a:pt x="0" y="11"/>
+                    <a:pt x="0" y="19"/>
+                    <a:pt x="0" y="26"/>
+                  </a:cubicBezTo>
+                  <a:close/>
+                </a:path>
+              </a:pathLst>
+            </a:custGeom>
+            <a:solidFill>
+              <a:schemeClr val="tx2"/>
+            </a:solidFill>
+            <a:ln>
+              <a:noFill/>
+            </a:ln>
+          </p:spPr>
+        </p:sp>
+        <p:sp>
+          <p:nvSpPr>
+            <p:cNvPr id="40" name="Freeform 38">
+              <a:extLst>
+                <a:ext uri="{FF2B5EF4-FFF2-40B4-BE49-F238E27FC236}">
+                  <a16:creationId xmlns:a16="http://schemas.microsoft.com/office/drawing/2014/main" id="{8709C0CF-D42A-4EE0-9C30-B0B72C69AD45}"/>
+                </a:ext>
+                <a:ext uri="{C183D7F6-B498-43B3-948B-1728B52AA6E4}">
+                  <adec:decorative xmlns:adec="http://schemas.microsoft.com/office/drawing/2017/decorative" val="1"/>
+                </a:ext>
+              </a:extLst>
+            </p:cNvPr>
+            <p:cNvSpPr/>
+            <p:nvPr>
+              <p:extLst>
+                <p:ext uri="{386F3935-93C4-4BCD-93E2-E3B085C9AB24}">
+                  <p16:designElem xmlns:p16="http://schemas.microsoft.com/office/powerpoint/2015/main" val="1"/>
+                </p:ext>
+              </p:extLst>
+            </p:nvPr>
+          </p:nvSpPr>
+          <p:spPr bwMode="auto">
+            <a:xfrm>
+              <a:off x="7439026" y="5434013"/>
+              <a:ext cx="174625" cy="439738"/>
+            </a:xfrm>
+            <a:custGeom>
+              <a:avLst/>
+              <a:gdLst/>
+              <a:ahLst/>
+              <a:cxnLst/>
+              <a:rect l="0" t="0" r="r" b="b"/>
+              <a:pathLst>
+                <a:path w="44" h="111">
+                  <a:moveTo>
+                    <a:pt x="11" y="28"/>
+                  </a:moveTo>
+                  <a:cubicBezTo>
+                    <a:pt x="7" y="19"/>
+                    <a:pt x="4" y="9"/>
+                    <a:pt x="0" y="0"/>
+                  </a:cubicBezTo>
+                  <a:cubicBezTo>
+                    <a:pt x="3" y="16"/>
+                    <a:pt x="7" y="33"/>
+                    <a:pt x="11" y="49"/>
+                  </a:cubicBezTo>
+                  <a:cubicBezTo>
+                    <a:pt x="12" y="52"/>
+                    <a:pt x="13" y="55"/>
+                    <a:pt x="14" y="58"/>
+                  </a:cubicBezTo>
+                  <a:cubicBezTo>
+                    <a:pt x="22" y="76"/>
+                    <a:pt x="30" y="94"/>
+                    <a:pt x="39" y="111"/>
+                  </a:cubicBezTo>
+                  <a:cubicBezTo>
+                    <a:pt x="44" y="111"/>
+                    <a:pt x="44" y="111"/>
+                    <a:pt x="44" y="111"/>
+                  </a:cubicBezTo>
+                  <a:cubicBezTo>
+                    <a:pt x="35" y="92"/>
+                    <a:pt x="28" y="72"/>
+                    <a:pt x="22" y="52"/>
+                  </a:cubicBezTo>
+                  <a:cubicBezTo>
+                    <a:pt x="18" y="44"/>
+                    <a:pt x="15" y="36"/>
+                    <a:pt x="11" y="28"/>
+                  </a:cubicBezTo>
+                  <a:close/>
+                </a:path>
+              </a:pathLst>
+            </a:custGeom>
+            <a:solidFill>
+              <a:schemeClr val="tx2"/>
+            </a:solidFill>
+            <a:ln>
+              <a:noFill/>
+            </a:ln>
+          </p:spPr>
+        </p:sp>
+      </p:grpSp>
+      <p:sp>
+        <p:nvSpPr>
+          <p:cNvPr id="42" name="Rectangle 41">
+            <a:extLst>
+              <a:ext uri="{FF2B5EF4-FFF2-40B4-BE49-F238E27FC236}">
+                <a16:creationId xmlns:a16="http://schemas.microsoft.com/office/drawing/2014/main" id="{B8FE8EF1-7AF2-4864-A8DE-7EE3481DA1D4}"/>
+              </a:ext>
+              <a:ext uri="{C183D7F6-B498-43B3-948B-1728B52AA6E4}">
+                <adec:decorative xmlns:adec="http://schemas.microsoft.com/office/drawing/2017/decorative" val="1"/>
+              </a:ext>
+            </a:extLst>
+          </p:cNvPr>
+          <p:cNvSpPr>
+            <a:spLocks noGrp="1" noRot="1" noChangeAspect="1" noMove="1" noResize="1" noEditPoints="1" noAdjustHandles="1" noChangeArrowheads="1" noChangeShapeType="1" noTextEdit="1"/>
+          </p:cNvSpPr>
+          <p:nvPr>
+            <p:extLst>
+              <p:ext uri="{386F3935-93C4-4BCD-93E2-E3B085C9AB24}">
+                <p16:designElem xmlns:p16="http://schemas.microsoft.com/office/powerpoint/2015/main" val="1"/>
+              </p:ext>
+            </p:extLst>
+          </p:nvPr>
+        </p:nvSpPr>
+        <p:spPr>
+          <a:xfrm>
+            <a:off x="0" y="0"/>
+            <a:ext cx="182880" cy="6858000"/>
+          </a:xfrm>
+          <a:prstGeom prst="rect">
+            <a:avLst/>
+          </a:prstGeom>
+          <a:solidFill>
+            <a:schemeClr val="tx2"/>
+          </a:solidFill>
+          <a:ln>
+            <a:noFill/>
+          </a:ln>
+          <a:effectLst/>
+        </p:spPr>
+        <p:style>
+          <a:lnRef idx="1">
+            <a:schemeClr val="accent1"/>
+          </a:lnRef>
+          <a:fillRef idx="3">
+            <a:schemeClr val="accent1"/>
+          </a:fillRef>
+          <a:effectRef idx="2">
+            <a:schemeClr val="accent1"/>
+          </a:effectRef>
+          <a:fontRef idx="minor">
+            <a:schemeClr val="lt1"/>
+          </a:fontRef>
+        </p:style>
+      </p:sp>
+      <p:sp>
+        <p:nvSpPr>
+          <p:cNvPr id="44" name="Freeform 6">
+            <a:extLst>
+              <a:ext uri="{FF2B5EF4-FFF2-40B4-BE49-F238E27FC236}">
+                <a16:creationId xmlns:a16="http://schemas.microsoft.com/office/drawing/2014/main" id="{76CB6AE4-A444-41E5-A744-47F048A15E7D}"/>
+              </a:ext>
+              <a:ext uri="{C183D7F6-B498-43B3-948B-1728B52AA6E4}">
+                <adec:decorative xmlns:adec="http://schemas.microsoft.com/office/drawing/2017/decorative" val="1"/>
+              </a:ext>
+            </a:extLst>
+          </p:cNvPr>
+          <p:cNvSpPr>
+            <a:spLocks noGrp="1" noRot="1" noChangeAspect="1" noMove="1" noResize="1" noEditPoints="1" noAdjustHandles="1" noChangeArrowheads="1" noChangeShapeType="1" noTextEdit="1"/>
+          </p:cNvSpPr>
+          <p:nvPr>
+            <p:extLst>
+              <p:ext uri="{386F3935-93C4-4BCD-93E2-E3B085C9AB24}">
+                <p16:designElem xmlns:p16="http://schemas.microsoft.com/office/powerpoint/2015/main" val="1"/>
+              </p:ext>
+            </p:extLst>
+          </p:nvPr>
+        </p:nvSpPr>
+        <p:spPr bwMode="auto">
+          <a:xfrm>
+            <a:off x="0" y="4323810"/>
+            <a:ext cx="1744652" cy="778589"/>
+          </a:xfrm>
+          <a:custGeom>
+            <a:avLst/>
+            <a:gdLst/>
+            <a:ahLst/>
+            <a:cxnLst/>
+            <a:rect l="0" t="0" r="r" b="b"/>
+            <a:pathLst>
+              <a:path w="372" h="166">
+                <a:moveTo>
+                  <a:pt x="287" y="166"/>
+                </a:moveTo>
+                <a:cubicBezTo>
+                  <a:pt x="290" y="166"/>
+                  <a:pt x="292" y="165"/>
+                  <a:pt x="293" y="164"/>
+                </a:cubicBezTo>
+                <a:cubicBezTo>
+                  <a:pt x="293" y="163"/>
+                  <a:pt x="294" y="163"/>
+                  <a:pt x="294" y="163"/>
+                </a:cubicBezTo>
+                <a:cubicBezTo>
+                  <a:pt x="370" y="87"/>
+                  <a:pt x="370" y="87"/>
+                  <a:pt x="370" y="87"/>
+                </a:cubicBezTo>
+                <a:cubicBezTo>
+                  <a:pt x="372" y="85"/>
+                  <a:pt x="372" y="81"/>
+                  <a:pt x="370" y="78"/>
+                </a:cubicBezTo>
+                <a:cubicBezTo>
+                  <a:pt x="294" y="3"/>
+                  <a:pt x="294" y="3"/>
+                  <a:pt x="294" y="3"/>
+                </a:cubicBezTo>
+                <a:cubicBezTo>
+                  <a:pt x="294" y="2"/>
+                  <a:pt x="293" y="2"/>
+                  <a:pt x="293" y="2"/>
+                </a:cubicBezTo>
+                <a:cubicBezTo>
+                  <a:pt x="292" y="1"/>
+                  <a:pt x="290" y="0"/>
+                  <a:pt x="287" y="0"/>
+                </a:cubicBezTo>
+                <a:cubicBezTo>
+                  <a:pt x="0" y="0"/>
+                  <a:pt x="0" y="0"/>
+                  <a:pt x="0" y="0"/>
+                </a:cubicBezTo>
+                <a:cubicBezTo>
+                  <a:pt x="0" y="166"/>
+                  <a:pt x="0" y="166"/>
+                  <a:pt x="0" y="166"/>
+                </a:cubicBezTo>
+                <a:lnTo>
+                  <a:pt x="287" y="166"/>
+                </a:lnTo>
+                <a:close/>
+              </a:path>
+            </a:pathLst>
+          </a:custGeom>
+          <a:solidFill>
+            <a:schemeClr val="accent1"/>
+          </a:solidFill>
+          <a:ln>
+            <a:noFill/>
+          </a:ln>
+        </p:spPr>
+      </p:sp>
+      <p:sp useBgFill="1">
+        <p:nvSpPr>
+          <p:cNvPr id="46" name="Rectangle 45">
+            <a:extLst>
+              <a:ext uri="{FF2B5EF4-FFF2-40B4-BE49-F238E27FC236}">
+                <a16:creationId xmlns:a16="http://schemas.microsoft.com/office/drawing/2014/main" id="{25F129D9-8F3D-4302-AB5D-DE987A6B127A}"/>
+              </a:ext>
+              <a:ext uri="{C183D7F6-B498-43B3-948B-1728B52AA6E4}">
+                <adec:decorative xmlns:adec="http://schemas.microsoft.com/office/drawing/2017/decorative" val="1"/>
+              </a:ext>
+            </a:extLst>
+          </p:cNvPr>
+          <p:cNvSpPr>
+            <a:spLocks noGrp="1" noRot="1" noChangeAspect="1" noMove="1" noResize="1" noEditPoints="1" noAdjustHandles="1" noChangeArrowheads="1" noChangeShapeType="1" noTextEdit="1"/>
+          </p:cNvSpPr>
+          <p:nvPr>
+            <p:extLst>
+              <p:ext uri="{386F3935-93C4-4BCD-93E2-E3B085C9AB24}">
+                <p16:designElem xmlns:p16="http://schemas.microsoft.com/office/powerpoint/2015/main" val="1"/>
+              </p:ext>
+            </p:extLst>
+          </p:nvPr>
+        </p:nvSpPr>
+        <p:spPr>
+          <a:xfrm>
+            <a:off x="0" y="-1"/>
+            <a:ext cx="12188952" cy="6858001"/>
+          </a:xfrm>
+          <a:prstGeom prst="rect">
+            <a:avLst/>
+          </a:prstGeom>
+          <a:ln>
+            <a:noFill/>
+          </a:ln>
+        </p:spPr>
+        <p:style>
+          <a:lnRef idx="2">
+            <a:schemeClr val="accent1">
+              <a:shade val="50000"/>
+            </a:schemeClr>
+          </a:lnRef>
+          <a:fillRef idx="1">
+            <a:schemeClr val="accent1"/>
+          </a:fillRef>
+          <a:effectRef idx="0">
+            <a:schemeClr val="accent1"/>
+          </a:effectRef>
+          <a:fontRef idx="minor">
+            <a:schemeClr val="lt1"/>
+          </a:fontRef>
+        </p:style>
+        <p:txBody>
+          <a:bodyPr rot="0" spcFirstLastPara="0" vert="horz" wrap="square" lIns="91440" tIns="45720" rIns="91440" bIns="45720" numCol="1" spcCol="0" rtlCol="0" fromWordArt="0" anchor="ctr" anchorCtr="0" forceAA="0" compatLnSpc="1">
+            <a:prstTxWarp prst="textNoShape">
+              <a:avLst/>
+            </a:prstTxWarp>
+            <a:noAutofit/>
+          </a:bodyPr>
+          <a:lstStyle>
+            <a:defPPr>
+              <a:defRPr lang="en-US"/>
+            </a:defPPr>
+            <a:lvl1pPr marL="0" algn="l" defTabSz="914400" rtl="0" eaLnBrk="1" latinLnBrk="0" hangingPunct="1">
+              <a:defRPr sz="1800" kern="1200">
+                <a:solidFill>
+                  <a:schemeClr val="lt1"/>
+                </a:solidFill>
+                <a:latin typeface="+mn-lt"/>
+                <a:ea typeface="+mn-ea"/>
+                <a:cs typeface="+mn-cs"/>
+              </a:defRPr>
+            </a:lvl1pPr>
+            <a:lvl2pPr marL="457200" algn="l" defTabSz="914400" rtl="0" eaLnBrk="1" latinLnBrk="0" hangingPunct="1">
+              <a:defRPr sz="1800" kern="1200">
+                <a:solidFill>
+                  <a:schemeClr val="lt1"/>
+                </a:solidFill>
+                <a:latin typeface="+mn-lt"/>
+                <a:ea typeface="+mn-ea"/>
+                <a:cs typeface="+mn-cs"/>
+              </a:defRPr>
+            </a:lvl2pPr>
+            <a:lvl3pPr marL="914400" algn="l" defTabSz="914400" rtl="0" eaLnBrk="1" latinLnBrk="0" hangingPunct="1">
+              <a:defRPr sz="1800" kern="1200">
+                <a:solidFill>
+                  <a:schemeClr val="lt1"/>
+                </a:solidFill>
+                <a:latin typeface="+mn-lt"/>
+                <a:ea typeface="+mn-ea"/>
+                <a:cs typeface="+mn-cs"/>
+              </a:defRPr>
+            </a:lvl3pPr>
+            <a:lvl4pPr marL="1371600" algn="l" defTabSz="914400" rtl="0" eaLnBrk="1" latinLnBrk="0" hangingPunct="1">
+              <a:defRPr sz="1800" kern="1200">
+                <a:solidFill>
+                  <a:schemeClr val="lt1"/>
+                </a:solidFill>
+                <a:latin typeface="+mn-lt"/>
+                <a:ea typeface="+mn-ea"/>
+                <a:cs typeface="+mn-cs"/>
+              </a:defRPr>
+            </a:lvl4pPr>
+            <a:lvl5pPr marL="1828800" algn="l" defTabSz="914400" rtl="0" eaLnBrk="1" latinLnBrk="0" hangingPunct="1">
+              <a:defRPr sz="1800" kern="1200">
+                <a:solidFill>
+                  <a:schemeClr val="lt1"/>
+                </a:solidFill>
+                <a:latin typeface="+mn-lt"/>
+                <a:ea typeface="+mn-ea"/>
+                <a:cs typeface="+mn-cs"/>
+              </a:defRPr>
+            </a:lvl5pPr>
+            <a:lvl6pPr marL="2286000" algn="l" defTabSz="914400" rtl="0" eaLnBrk="1" latinLnBrk="0" hangingPunct="1">
+              <a:defRPr sz="1800" kern="1200">
+                <a:solidFill>
+                  <a:schemeClr val="lt1"/>
+                </a:solidFill>
+                <a:latin typeface="+mn-lt"/>
+                <a:ea typeface="+mn-ea"/>
+                <a:cs typeface="+mn-cs"/>
+              </a:defRPr>
+            </a:lvl6pPr>
+            <a:lvl7pPr marL="2743200" algn="l" defTabSz="914400" rtl="0" eaLnBrk="1" latinLnBrk="0" hangingPunct="1">
+              <a:defRPr sz="1800" kern="1200">
+                <a:solidFill>
+                  <a:schemeClr val="lt1"/>
+                </a:solidFill>
+                <a:latin typeface="+mn-lt"/>
+                <a:ea typeface="+mn-ea"/>
+                <a:cs typeface="+mn-cs"/>
+              </a:defRPr>
+            </a:lvl7pPr>
+            <a:lvl8pPr marL="3200400" algn="l" defTabSz="914400" rtl="0" eaLnBrk="1" latinLnBrk="0" hangingPunct="1">
+              <a:defRPr sz="1800" kern="1200">
+                <a:solidFill>
+                  <a:schemeClr val="lt1"/>
+                </a:solidFill>
+                <a:latin typeface="+mn-lt"/>
+                <a:ea typeface="+mn-ea"/>
+                <a:cs typeface="+mn-cs"/>
+              </a:defRPr>
+            </a:lvl8pPr>
+            <a:lvl9pPr marL="3657600" algn="l" defTabSz="914400" rtl="0" eaLnBrk="1" latinLnBrk="0" hangingPunct="1">
+              <a:defRPr sz="1800" kern="1200">
+                <a:solidFill>
+                  <a:schemeClr val="lt1"/>
+                </a:solidFill>
+                <a:latin typeface="+mn-lt"/>
+                <a:ea typeface="+mn-ea"/>
+                <a:cs typeface="+mn-cs"/>
+              </a:defRPr>
+            </a:lvl9pPr>
+          </a:lstStyle>
+          <a:p>
+            <a:pPr algn="ctr"/>
+            <a:endParaRPr lang="en-US"/>
+          </a:p>
+        </p:txBody>
+      </p:sp>
+      <p:sp>
+        <p:nvSpPr>
+          <p:cNvPr id="48" name="Rectangle 47">
+            <a:extLst>
+              <a:ext uri="{FF2B5EF4-FFF2-40B4-BE49-F238E27FC236}">
+                <a16:creationId xmlns:a16="http://schemas.microsoft.com/office/drawing/2014/main" id="{1F4A57F6-BEF1-4CA6-A0F1-3A01F6AB48EE}"/>
+              </a:ext>
+              <a:ext uri="{C183D7F6-B498-43B3-948B-1728B52AA6E4}">
+                <adec:decorative xmlns:adec="http://schemas.microsoft.com/office/drawing/2017/decorative" val="1"/>
+              </a:ext>
+            </a:extLst>
+          </p:cNvPr>
+          <p:cNvSpPr>
+            <a:spLocks noGrp="1" noRot="1" noChangeAspect="1" noMove="1" noResize="1" noEditPoints="1" noAdjustHandles="1" noChangeArrowheads="1" noChangeShapeType="1" noTextEdit="1"/>
+          </p:cNvSpPr>
+          <p:nvPr>
+            <p:extLst>
+              <p:ext uri="{386F3935-93C4-4BCD-93E2-E3B085C9AB24}">
+                <p16:designElem xmlns:p16="http://schemas.microsoft.com/office/powerpoint/2015/main" val="1"/>
+              </p:ext>
+            </p:extLst>
+          </p:nvPr>
+        </p:nvSpPr>
+        <p:spPr bwMode="white">
+          <a:xfrm>
+            <a:off x="-1" y="0"/>
+            <a:ext cx="4639734" cy="6858000"/>
+          </a:xfrm>
+          <a:prstGeom prst="rect">
+            <a:avLst/>
+          </a:prstGeom>
+          <a:solidFill>
+            <a:schemeClr val="tx2">
+              <a:lumMod val="50000"/>
+              <a:alpha val="90000"/>
+            </a:schemeClr>
+          </a:solidFill>
+          <a:ln>
+            <a:noFill/>
+          </a:ln>
+          <a:effectLst/>
+        </p:spPr>
+        <p:style>
+          <a:lnRef idx="1">
+            <a:schemeClr val="accent1"/>
+          </a:lnRef>
+          <a:fillRef idx="3">
+            <a:schemeClr val="accent1"/>
+          </a:fillRef>
+          <a:effectRef idx="2">
+            <a:schemeClr val="accent1"/>
+          </a:effectRef>
+          <a:fontRef idx="minor">
+            <a:schemeClr val="lt1"/>
+          </a:fontRef>
+        </p:style>
+      </p:sp>
       <p:sp>
         <p:nvSpPr>
           <p:cNvPr id="2" name="Title 1">
@@ -10286,19 +12855,273 @@
         </p:nvSpPr>
         <p:spPr>
           <a:xfrm>
-            <a:off x="2592924" y="624110"/>
-            <a:ext cx="8911687" cy="1280890"/>
+            <a:off x="540279" y="967417"/>
+            <a:ext cx="3778870" cy="3943250"/>
           </a:xfrm>
         </p:spPr>
         <p:txBody>
-          <a:bodyPr/>
+          <a:bodyPr vert="horz" lIns="91440" tIns="45720" rIns="91440" bIns="45720" rtlCol="0" anchor="b">
+            <a:normAutofit/>
+          </a:bodyPr>
           <a:lstStyle/>
           <a:p>
             <a:r>
-              <a:rPr lang="en-CA"/>
+              <a:rPr lang="en-US" sz="4000">
+                <a:solidFill>
+                  <a:srgbClr val="FEFFFF"/>
+                </a:solidFill>
+              </a:rPr>
               <a:t>Data Exploration</a:t>
             </a:r>
-            <a:endParaRPr lang="en-CA" dirty="0"/>
+          </a:p>
+        </p:txBody>
+      </p:sp>
+      <p:sp>
+        <p:nvSpPr>
+          <p:cNvPr id="50" name="Freeform 5">
+            <a:extLst>
+              <a:ext uri="{FF2B5EF4-FFF2-40B4-BE49-F238E27FC236}">
+                <a16:creationId xmlns:a16="http://schemas.microsoft.com/office/drawing/2014/main" id="{E3336A73-1C9B-4BAA-A893-AD3C79E66607}"/>
+              </a:ext>
+              <a:ext uri="{C183D7F6-B498-43B3-948B-1728B52AA6E4}">
+                <adec:decorative xmlns:adec="http://schemas.microsoft.com/office/drawing/2017/decorative" val="1"/>
+              </a:ext>
+            </a:extLst>
+          </p:cNvPr>
+          <p:cNvSpPr>
+            <a:spLocks noGrp="1" noRot="1" noChangeAspect="1" noMove="1" noResize="1" noEditPoints="1" noAdjustHandles="1" noChangeArrowheads="1" noChangeShapeType="1" noTextEdit="1"/>
+          </p:cNvSpPr>
+          <p:nvPr>
+            <p:extLst>
+              <p:ext uri="{386F3935-93C4-4BCD-93E2-E3B085C9AB24}">
+                <p16:designElem xmlns:p16="http://schemas.microsoft.com/office/powerpoint/2015/main" val="1"/>
+              </p:ext>
+            </p:extLst>
+          </p:nvPr>
+        </p:nvSpPr>
+        <p:spPr bwMode="grayWhite">
+          <a:xfrm>
+            <a:off x="0" y="5033007"/>
+            <a:ext cx="5404022" cy="857047"/>
+          </a:xfrm>
+          <a:custGeom>
+            <a:avLst/>
+            <a:gdLst>
+              <a:gd name="T0" fmla="*/ 1114 w 1117"/>
+              <a:gd name="T1" fmla="*/ 77 h 163"/>
+              <a:gd name="T2" fmla="*/ 1040 w 1117"/>
+              <a:gd name="T3" fmla="*/ 3 h 163"/>
+              <a:gd name="T4" fmla="*/ 1039 w 1117"/>
+              <a:gd name="T5" fmla="*/ 2 h 163"/>
+              <a:gd name="T6" fmla="*/ 1034 w 1117"/>
+              <a:gd name="T7" fmla="*/ 0 h 163"/>
+              <a:gd name="T8" fmla="*/ 578 w 1117"/>
+              <a:gd name="T9" fmla="*/ 0 h 163"/>
+              <a:gd name="T10" fmla="*/ 562 w 1117"/>
+              <a:gd name="T11" fmla="*/ 0 h 163"/>
+              <a:gd name="T12" fmla="*/ 440 w 1117"/>
+              <a:gd name="T13" fmla="*/ 0 h 163"/>
+              <a:gd name="T14" fmla="*/ 106 w 1117"/>
+              <a:gd name="T15" fmla="*/ 0 h 163"/>
+              <a:gd name="T16" fmla="*/ 0 w 1117"/>
+              <a:gd name="T17" fmla="*/ 0 h 163"/>
+              <a:gd name="T18" fmla="*/ 0 w 1117"/>
+              <a:gd name="T19" fmla="*/ 163 h 163"/>
+              <a:gd name="T20" fmla="*/ 106 w 1117"/>
+              <a:gd name="T21" fmla="*/ 163 h 163"/>
+              <a:gd name="T22" fmla="*/ 440 w 1117"/>
+              <a:gd name="T23" fmla="*/ 163 h 163"/>
+              <a:gd name="T24" fmla="*/ 562 w 1117"/>
+              <a:gd name="T25" fmla="*/ 163 h 163"/>
+              <a:gd name="T26" fmla="*/ 578 w 1117"/>
+              <a:gd name="T27" fmla="*/ 163 h 163"/>
+              <a:gd name="T28" fmla="*/ 1034 w 1117"/>
+              <a:gd name="T29" fmla="*/ 163 h 163"/>
+              <a:gd name="T30" fmla="*/ 1039 w 1117"/>
+              <a:gd name="T31" fmla="*/ 161 h 163"/>
+              <a:gd name="T32" fmla="*/ 1040 w 1117"/>
+              <a:gd name="T33" fmla="*/ 160 h 163"/>
+              <a:gd name="T34" fmla="*/ 1114 w 1117"/>
+              <a:gd name="T35" fmla="*/ 86 h 163"/>
+              <a:gd name="T36" fmla="*/ 1114 w 1117"/>
+              <a:gd name="T37" fmla="*/ 77 h 163"/>
+            </a:gdLst>
+            <a:ahLst/>
+            <a:cxnLst>
+              <a:cxn ang="0">
+                <a:pos x="T0" y="T1"/>
+              </a:cxn>
+              <a:cxn ang="0">
+                <a:pos x="T2" y="T3"/>
+              </a:cxn>
+              <a:cxn ang="0">
+                <a:pos x="T4" y="T5"/>
+              </a:cxn>
+              <a:cxn ang="0">
+                <a:pos x="T6" y="T7"/>
+              </a:cxn>
+              <a:cxn ang="0">
+                <a:pos x="T8" y="T9"/>
+              </a:cxn>
+              <a:cxn ang="0">
+                <a:pos x="T10" y="T11"/>
+              </a:cxn>
+              <a:cxn ang="0">
+                <a:pos x="T12" y="T13"/>
+              </a:cxn>
+              <a:cxn ang="0">
+                <a:pos x="T14" y="T15"/>
+              </a:cxn>
+              <a:cxn ang="0">
+                <a:pos x="T16" y="T17"/>
+              </a:cxn>
+              <a:cxn ang="0">
+                <a:pos x="T18" y="T19"/>
+              </a:cxn>
+              <a:cxn ang="0">
+                <a:pos x="T20" y="T21"/>
+              </a:cxn>
+              <a:cxn ang="0">
+                <a:pos x="T22" y="T23"/>
+              </a:cxn>
+              <a:cxn ang="0">
+                <a:pos x="T24" y="T25"/>
+              </a:cxn>
+              <a:cxn ang="0">
+                <a:pos x="T26" y="T27"/>
+              </a:cxn>
+              <a:cxn ang="0">
+                <a:pos x="T28" y="T29"/>
+              </a:cxn>
+              <a:cxn ang="0">
+                <a:pos x="T30" y="T31"/>
+              </a:cxn>
+              <a:cxn ang="0">
+                <a:pos x="T32" y="T33"/>
+              </a:cxn>
+              <a:cxn ang="0">
+                <a:pos x="T34" y="T35"/>
+              </a:cxn>
+              <a:cxn ang="0">
+                <a:pos x="T36" y="T37"/>
+              </a:cxn>
+            </a:cxnLst>
+            <a:rect l="0" t="0" r="r" b="b"/>
+            <a:pathLst>
+              <a:path w="1117" h="163">
+                <a:moveTo>
+                  <a:pt x="1114" y="77"/>
+                </a:moveTo>
+                <a:cubicBezTo>
+                  <a:pt x="1040" y="3"/>
+                  <a:pt x="1040" y="3"/>
+                  <a:pt x="1040" y="3"/>
+                </a:cubicBezTo>
+                <a:cubicBezTo>
+                  <a:pt x="1040" y="2"/>
+                  <a:pt x="1039" y="2"/>
+                  <a:pt x="1039" y="2"/>
+                </a:cubicBezTo>
+                <a:cubicBezTo>
+                  <a:pt x="1038" y="1"/>
+                  <a:pt x="1036" y="0"/>
+                  <a:pt x="1034" y="0"/>
+                </a:cubicBezTo>
+                <a:cubicBezTo>
+                  <a:pt x="578" y="0"/>
+                  <a:pt x="578" y="0"/>
+                  <a:pt x="578" y="0"/>
+                </a:cubicBezTo>
+                <a:cubicBezTo>
+                  <a:pt x="562" y="0"/>
+                  <a:pt x="562" y="0"/>
+                  <a:pt x="562" y="0"/>
+                </a:cubicBezTo>
+                <a:cubicBezTo>
+                  <a:pt x="440" y="0"/>
+                  <a:pt x="440" y="0"/>
+                  <a:pt x="440" y="0"/>
+                </a:cubicBezTo>
+                <a:cubicBezTo>
+                  <a:pt x="106" y="0"/>
+                  <a:pt x="106" y="0"/>
+                  <a:pt x="106" y="0"/>
+                </a:cubicBezTo>
+                <a:cubicBezTo>
+                  <a:pt x="0" y="0"/>
+                  <a:pt x="0" y="0"/>
+                  <a:pt x="0" y="0"/>
+                </a:cubicBezTo>
+                <a:cubicBezTo>
+                  <a:pt x="0" y="163"/>
+                  <a:pt x="0" y="163"/>
+                  <a:pt x="0" y="163"/>
+                </a:cubicBezTo>
+                <a:cubicBezTo>
+                  <a:pt x="106" y="163"/>
+                  <a:pt x="106" y="163"/>
+                  <a:pt x="106" y="163"/>
+                </a:cubicBezTo>
+                <a:cubicBezTo>
+                  <a:pt x="440" y="163"/>
+                  <a:pt x="440" y="163"/>
+                  <a:pt x="440" y="163"/>
+                </a:cubicBezTo>
+                <a:cubicBezTo>
+                  <a:pt x="562" y="163"/>
+                  <a:pt x="562" y="163"/>
+                  <a:pt x="562" y="163"/>
+                </a:cubicBezTo>
+                <a:cubicBezTo>
+                  <a:pt x="578" y="163"/>
+                  <a:pt x="578" y="163"/>
+                  <a:pt x="578" y="163"/>
+                </a:cubicBezTo>
+                <a:cubicBezTo>
+                  <a:pt x="1034" y="163"/>
+                  <a:pt x="1034" y="163"/>
+                  <a:pt x="1034" y="163"/>
+                </a:cubicBezTo>
+                <a:cubicBezTo>
+                  <a:pt x="1036" y="163"/>
+                  <a:pt x="1038" y="162"/>
+                  <a:pt x="1039" y="161"/>
+                </a:cubicBezTo>
+                <a:cubicBezTo>
+                  <a:pt x="1039" y="160"/>
+                  <a:pt x="1040" y="160"/>
+                  <a:pt x="1040" y="160"/>
+                </a:cubicBezTo>
+                <a:cubicBezTo>
+                  <a:pt x="1114" y="86"/>
+                  <a:pt x="1114" y="86"/>
+                  <a:pt x="1114" y="86"/>
+                </a:cubicBezTo>
+                <a:cubicBezTo>
+                  <a:pt x="1117" y="83"/>
+                  <a:pt x="1117" y="79"/>
+                  <a:pt x="1114" y="77"/>
+                </a:cubicBezTo>
+                <a:close/>
+              </a:path>
+            </a:pathLst>
+          </a:custGeom>
+          <a:solidFill>
+            <a:schemeClr val="accent1"/>
+          </a:solidFill>
+          <a:ln>
+            <a:noFill/>
+          </a:ln>
+        </p:spPr>
+        <p:txBody>
+          <a:bodyPr vert="horz" wrap="square" lIns="91440" tIns="45720" rIns="91440" bIns="45720" numCol="1" anchor="t" anchorCtr="0" compatLnSpc="1">
+            <a:prstTxWarp prst="textNoShape">
+              <a:avLst/>
+            </a:prstTxWarp>
+          </a:bodyPr>
+          <a:lstStyle/>
+          <a:p>
+            <a:endParaRPr lang="en-US"/>
           </a:p>
         </p:txBody>
       </p:sp>
@@ -10320,22 +13143,57 @@
         </p:nvSpPr>
         <p:spPr>
           <a:xfrm>
-            <a:off x="2939373" y="1972703"/>
-            <a:ext cx="3992732" cy="576262"/>
+            <a:off x="540279" y="5189400"/>
+            <a:ext cx="3778870" cy="544260"/>
           </a:xfrm>
         </p:spPr>
         <p:txBody>
-          <a:bodyPr/>
+          <a:bodyPr vert="horz" lIns="91440" tIns="45720" rIns="91440" bIns="45720" rtlCol="0" anchor="ctr">
+            <a:normAutofit/>
+          </a:bodyPr>
           <a:lstStyle/>
           <a:p>
             <a:r>
-              <a:rPr lang="en-CA"/>
+              <a:rPr lang="en-US" sz="1600">
+                <a:solidFill>
+                  <a:srgbClr val="FEFFFF"/>
+                </a:solidFill>
+              </a:rPr>
               <a:t>Weather Data</a:t>
             </a:r>
-            <a:endParaRPr lang="en-CA" dirty="0"/>
           </a:p>
         </p:txBody>
       </p:sp>
+      <p:pic>
+        <p:nvPicPr>
+          <p:cNvPr id="9" name="Picture 8">
+            <a:extLst>
+              <a:ext uri="{FF2B5EF4-FFF2-40B4-BE49-F238E27FC236}">
+                <a16:creationId xmlns:a16="http://schemas.microsoft.com/office/drawing/2014/main" id="{EFD765D1-902B-4D1F-AB86-636D3988D1B1}"/>
+              </a:ext>
+            </a:extLst>
+          </p:cNvPr>
+          <p:cNvPicPr>
+            <a:picLocks noChangeAspect="1"/>
+          </p:cNvPicPr>
+          <p:nvPr/>
+        </p:nvPicPr>
+        <p:blipFill>
+          <a:blip r:embed="rId3"/>
+          <a:stretch>
+            <a:fillRect/>
+          </a:stretch>
+        </p:blipFill>
+        <p:spPr>
+          <a:xfrm>
+            <a:off x="5353281" y="377687"/>
+            <a:ext cx="6317168" cy="6317168"/>
+          </a:xfrm>
+          <a:prstGeom prst="rect">
+            <a:avLst/>
+          </a:prstGeom>
+        </p:spPr>
+      </p:pic>
       <p:sp>
         <p:nvSpPr>
           <p:cNvPr id="8" name="Content Placeholder 3">
@@ -10586,36 +13444,6 @@
           </a:p>
         </p:txBody>
       </p:sp>
-      <p:pic>
-        <p:nvPicPr>
-          <p:cNvPr id="7" name="Picture 6">
-            <a:extLst>
-              <a:ext uri="{FF2B5EF4-FFF2-40B4-BE49-F238E27FC236}">
-                <a16:creationId xmlns:a16="http://schemas.microsoft.com/office/drawing/2014/main" id="{6AB29101-426A-41D5-9147-60AA2ECA22E9}"/>
-              </a:ext>
-            </a:extLst>
-          </p:cNvPr>
-          <p:cNvPicPr>
-            <a:picLocks noChangeAspect="1"/>
-          </p:cNvPicPr>
-          <p:nvPr/>
-        </p:nvPicPr>
-        <p:blipFill>
-          <a:blip r:embed="rId3"/>
-          <a:stretch>
-            <a:fillRect/>
-          </a:stretch>
-        </p:blipFill>
-        <p:spPr>
-          <a:xfrm>
-            <a:off x="320197" y="3226894"/>
-            <a:ext cx="11782425" cy="2943225"/>
-          </a:xfrm>
-          <a:prstGeom prst="rect">
-            <a:avLst/>
-          </a:prstGeom>
-        </p:spPr>
-      </p:pic>
     </p:spTree>
     <p:extLst>
       <p:ext uri="{BB962C8B-B14F-4D97-AF65-F5344CB8AC3E}">
@@ -20805,7 +23633,12 @@
             <p:ph type="title"/>
           </p:nvPr>
         </p:nvSpPr>
-        <p:spPr/>
+        <p:spPr>
+          <a:xfrm>
+            <a:off x="1942473" y="624110"/>
+            <a:ext cx="8911687" cy="1280890"/>
+          </a:xfrm>
+        </p:spPr>
         <p:txBody>
           <a:bodyPr/>
           <a:lstStyle/>
@@ -21128,37 +23961,41 @@
           </a:p>
         </p:txBody>
       </p:sp>
-      <p:sp>
-        <p:nvSpPr>
-          <p:cNvPr id="14" name="Content Placeholder 13">
+      <p:pic>
+        <p:nvPicPr>
+          <p:cNvPr id="6" name="Content Placeholder 5">
             <a:extLst>
               <a:ext uri="{FF2B5EF4-FFF2-40B4-BE49-F238E27FC236}">
-                <a16:creationId xmlns:a16="http://schemas.microsoft.com/office/drawing/2014/main" id="{F28E7DFA-37E2-4C5C-B33C-A2E38A80D564}"/>
+                <a16:creationId xmlns:a16="http://schemas.microsoft.com/office/drawing/2014/main" id="{F86F8CEA-17BD-4B63-99A9-1E8A37049EFB}"/>
               </a:ext>
             </a:extLst>
           </p:cNvPr>
-          <p:cNvSpPr>
-            <a:spLocks noGrp="1"/>
-          </p:cNvSpPr>
+          <p:cNvPicPr>
+            <a:picLocks noGrp="1" noChangeAspect="1"/>
+          </p:cNvPicPr>
           <p:nvPr>
             <p:ph sz="quarter" idx="4"/>
           </p:nvPr>
-        </p:nvSpPr>
-        <p:spPr/>
-        <p:txBody>
-          <a:bodyPr/>
-          <a:lstStyle/>
-          <a:p>
-            <a:endParaRPr lang="en-CA"/>
-          </a:p>
-        </p:txBody>
-      </p:sp>
+        </p:nvPicPr>
+        <p:blipFill>
+          <a:blip r:embed="rId3"/>
+          <a:stretch>
+            <a:fillRect/>
+          </a:stretch>
+        </p:blipFill>
+        <p:spPr>
+          <a:xfrm>
+            <a:off x="197959" y="3360271"/>
+            <a:ext cx="6130196" cy="3352800"/>
+          </a:xfrm>
+        </p:spPr>
+      </p:pic>
       <p:pic>
         <p:nvPicPr>
-          <p:cNvPr id="15" name="Picture 14">
+          <p:cNvPr id="9" name="Picture 8">
             <a:extLst>
               <a:ext uri="{FF2B5EF4-FFF2-40B4-BE49-F238E27FC236}">
-                <a16:creationId xmlns:a16="http://schemas.microsoft.com/office/drawing/2014/main" id="{C01569FD-5C3D-4528-9F66-6FE28354FD4D}"/>
+                <a16:creationId xmlns:a16="http://schemas.microsoft.com/office/drawing/2014/main" id="{8B39AB2A-FE60-41AE-A6A9-07B2569EEAB9}"/>
               </a:ext>
             </a:extLst>
           </p:cNvPr>
@@ -21168,15 +24005,15 @@
           <p:nvPr/>
         </p:nvPicPr>
         <p:blipFill>
-          <a:blip r:embed="rId3"/>
+          <a:blip r:embed="rId4"/>
           <a:stretch>
             <a:fillRect/>
           </a:stretch>
         </p:blipFill>
         <p:spPr>
           <a:xfrm>
-            <a:off x="2796466" y="3323872"/>
-            <a:ext cx="7633455" cy="2546516"/>
+            <a:off x="6287395" y="680498"/>
+            <a:ext cx="6032573" cy="6032573"/>
           </a:xfrm>
           <a:prstGeom prst="rect">
             <a:avLst/>

</xml_diff>

<commit_message>
Update Project 1 - Group 6 Presentation.pptx
</commit_message>
<xml_diff>
--- a/Project 1 - Group 6 Presentation.pptx
+++ b/Project 1 - Group 6 Presentation.pptx
@@ -10228,12 +10228,23 @@
         </p:nvSpPr>
         <p:spPr/>
         <p:txBody>
-          <a:bodyPr/>
+          <a:bodyPr>
+            <a:normAutofit lnSpcReduction="10000"/>
+          </a:bodyPr>
           <a:lstStyle/>
           <a:p>
             <a:r>
               <a:rPr lang="en-CA" dirty="0"/>
               <a:t>Does Bad Weather make it worse?</a:t>
+            </a:r>
+          </a:p>
+          <a:p>
+            <a:endParaRPr lang="en-CA" dirty="0"/>
+          </a:p>
+          <a:p>
+            <a:r>
+              <a:rPr lang="en-CA" dirty="0"/>
+              <a:t>Amit, Christy, MJ, Shruti</a:t>
             </a:r>
           </a:p>
         </p:txBody>
@@ -10259,23 +10270,20 @@
         <a:gradFill rotWithShape="1">
           <a:gsLst>
             <a:gs pos="0">
-              <a:schemeClr val="bg1">
+              <a:schemeClr val="bg2">
                 <a:tint val="90000"/>
-                <a:satMod val="92000"/>
                 <a:lumMod val="120000"/>
               </a:schemeClr>
             </a:gs>
             <a:gs pos="100000">
-              <a:schemeClr val="bg1">
+              <a:schemeClr val="bg2">
                 <a:shade val="98000"/>
                 <a:satMod val="120000"/>
                 <a:lumMod val="98000"/>
               </a:schemeClr>
             </a:gs>
           </a:gsLst>
-          <a:path path="circle">
-            <a:fillToRect l="50000" t="50000" r="100000" b="100000"/>
-          </a:path>
+          <a:lin ang="5400000" scaled="0"/>
         </a:gradFill>
         <a:effectLst/>
       </p:bgPr>
@@ -10296,10 +10304,10 @@
       </p:grpSpPr>
       <p:grpSp>
         <p:nvGrpSpPr>
-          <p:cNvPr id="14" name="Group 13">
+          <p:cNvPr id="55" name="Group 54">
             <a:extLst>
               <a:ext uri="{FF2B5EF4-FFF2-40B4-BE49-F238E27FC236}">
-                <a16:creationId xmlns:a16="http://schemas.microsoft.com/office/drawing/2014/main" id="{7B7EFD05-5F12-420E-8AEF-74D5EF9D58BC}"/>
+                <a16:creationId xmlns:a16="http://schemas.microsoft.com/office/drawing/2014/main" id="{6884825E-EC03-4722-8283-74EC8EECC457}"/>
               </a:ext>
               <a:ext uri="{C183D7F6-B498-43B3-948B-1728B52AA6E4}">
                 <adec:decorative xmlns:adec="http://schemas.microsoft.com/office/drawing/2017/decorative" val="1"/>
@@ -10327,10 +10335,10 @@
         </p:grpSpPr>
         <p:sp>
           <p:nvSpPr>
-            <p:cNvPr id="15" name="Freeform 11">
+            <p:cNvPr id="56" name="Freeform 11">
               <a:extLst>
                 <a:ext uri="{FF2B5EF4-FFF2-40B4-BE49-F238E27FC236}">
-                  <a16:creationId xmlns:a16="http://schemas.microsoft.com/office/drawing/2014/main" id="{6B6786B7-9BA0-488B-8C6B-1C5BB4E2A5A4}"/>
+                  <a16:creationId xmlns:a16="http://schemas.microsoft.com/office/drawing/2014/main" id="{C04A4164-FDD3-4AE9-8129-4E1B921E25C0}"/>
                 </a:ext>
                 <a:ext uri="{C183D7F6-B498-43B3-948B-1728B52AA6E4}">
                   <adec:decorative xmlns:adec="http://schemas.microsoft.com/office/drawing/2017/decorative" val="1"/>
@@ -10403,10 +10411,10 @@
         </p:sp>
         <p:sp>
           <p:nvSpPr>
-            <p:cNvPr id="16" name="Freeform 12">
+            <p:cNvPr id="57" name="Freeform 12">
               <a:extLst>
                 <a:ext uri="{FF2B5EF4-FFF2-40B4-BE49-F238E27FC236}">
-                  <a16:creationId xmlns:a16="http://schemas.microsoft.com/office/drawing/2014/main" id="{ACF6C842-D596-43D3-B584-5672E0D33134}"/>
+                  <a16:creationId xmlns:a16="http://schemas.microsoft.com/office/drawing/2014/main" id="{242BA971-550B-4D73-A876-FA172A0CD360}"/>
                 </a:ext>
                 <a:ext uri="{C183D7F6-B498-43B3-948B-1728B52AA6E4}">
                   <adec:decorative xmlns:adec="http://schemas.microsoft.com/office/drawing/2017/decorative" val="1"/>
@@ -10484,10 +10492,10 @@
         </p:sp>
         <p:sp>
           <p:nvSpPr>
-            <p:cNvPr id="17" name="Freeform 13">
+            <p:cNvPr id="58" name="Freeform 13">
               <a:extLst>
                 <a:ext uri="{FF2B5EF4-FFF2-40B4-BE49-F238E27FC236}">
-                  <a16:creationId xmlns:a16="http://schemas.microsoft.com/office/drawing/2014/main" id="{6DF84F3E-35FA-497B-B6FA-F453E82F325D}"/>
+                  <a16:creationId xmlns:a16="http://schemas.microsoft.com/office/drawing/2014/main" id="{F52F4EE2-AD57-433A-87C2-B1418FE22D7D}"/>
                 </a:ext>
                 <a:ext uri="{C183D7F6-B498-43B3-948B-1728B52AA6E4}">
                   <adec:decorative xmlns:adec="http://schemas.microsoft.com/office/drawing/2017/decorative" val="1"/>
@@ -10570,10 +10578,10 @@
         </p:sp>
         <p:sp>
           <p:nvSpPr>
-            <p:cNvPr id="18" name="Freeform 14">
+            <p:cNvPr id="59" name="Freeform 14">
               <a:extLst>
                 <a:ext uri="{FF2B5EF4-FFF2-40B4-BE49-F238E27FC236}">
-                  <a16:creationId xmlns:a16="http://schemas.microsoft.com/office/drawing/2014/main" id="{2846D7FA-E05C-448E-B156-F77C205A14B4}"/>
+                  <a16:creationId xmlns:a16="http://schemas.microsoft.com/office/drawing/2014/main" id="{418466F3-BDB0-4394-BA4A-CF39BF69001B}"/>
                 </a:ext>
                 <a:ext uri="{C183D7F6-B498-43B3-948B-1728B52AA6E4}">
                   <adec:decorative xmlns:adec="http://schemas.microsoft.com/office/drawing/2017/decorative" val="1"/>
@@ -10636,10 +10644,10 @@
         </p:sp>
         <p:sp>
           <p:nvSpPr>
-            <p:cNvPr id="19" name="Freeform 15">
+            <p:cNvPr id="60" name="Freeform 15">
               <a:extLst>
                 <a:ext uri="{FF2B5EF4-FFF2-40B4-BE49-F238E27FC236}">
-                  <a16:creationId xmlns:a16="http://schemas.microsoft.com/office/drawing/2014/main" id="{E269AD3A-E6B6-4322-A013-276CBC1B084D}"/>
+                  <a16:creationId xmlns:a16="http://schemas.microsoft.com/office/drawing/2014/main" id="{9B5012CA-30F7-4EAF-9345-0EC48D013C06}"/>
                 </a:ext>
                 <a:ext uri="{C183D7F6-B498-43B3-948B-1728B52AA6E4}">
                   <adec:decorative xmlns:adec="http://schemas.microsoft.com/office/drawing/2017/decorative" val="1"/>
@@ -10737,10 +10745,10 @@
         </p:sp>
         <p:sp>
           <p:nvSpPr>
-            <p:cNvPr id="20" name="Freeform 16">
+            <p:cNvPr id="61" name="Freeform 16">
               <a:extLst>
                 <a:ext uri="{FF2B5EF4-FFF2-40B4-BE49-F238E27FC236}">
-                  <a16:creationId xmlns:a16="http://schemas.microsoft.com/office/drawing/2014/main" id="{CEFB9F00-6239-4BF6-B439-D16231B240A9}"/>
+                  <a16:creationId xmlns:a16="http://schemas.microsoft.com/office/drawing/2014/main" id="{F1CEB021-8D0F-48F1-947A-7F206BE2DCF1}"/>
                 </a:ext>
                 <a:ext uri="{C183D7F6-B498-43B3-948B-1728B52AA6E4}">
                   <adec:decorative xmlns:adec="http://schemas.microsoft.com/office/drawing/2017/decorative" val="1"/>
@@ -10833,10 +10841,10 @@
         </p:sp>
         <p:sp>
           <p:nvSpPr>
-            <p:cNvPr id="21" name="Freeform 17">
+            <p:cNvPr id="62" name="Freeform 17">
               <a:extLst>
                 <a:ext uri="{FF2B5EF4-FFF2-40B4-BE49-F238E27FC236}">
-                  <a16:creationId xmlns:a16="http://schemas.microsoft.com/office/drawing/2014/main" id="{74D1DDDB-FC85-40C5-9225-06312C4515FA}"/>
+                  <a16:creationId xmlns:a16="http://schemas.microsoft.com/office/drawing/2014/main" id="{03D5F265-52CB-44C4-AC6C-690E2BAFF9C7}"/>
                 </a:ext>
                 <a:ext uri="{C183D7F6-B498-43B3-948B-1728B52AA6E4}">
                   <adec:decorative xmlns:adec="http://schemas.microsoft.com/office/drawing/2017/decorative" val="1"/>
@@ -10909,10 +10917,10 @@
         </p:sp>
         <p:sp>
           <p:nvSpPr>
-            <p:cNvPr id="22" name="Freeform 18">
+            <p:cNvPr id="63" name="Freeform 18">
               <a:extLst>
                 <a:ext uri="{FF2B5EF4-FFF2-40B4-BE49-F238E27FC236}">
-                  <a16:creationId xmlns:a16="http://schemas.microsoft.com/office/drawing/2014/main" id="{E9217709-40C1-4F4A-AB69-8A693608ABA3}"/>
+                  <a16:creationId xmlns:a16="http://schemas.microsoft.com/office/drawing/2014/main" id="{AC865DC3-14CF-426B-B727-540299B5F888}"/>
                 </a:ext>
                 <a:ext uri="{C183D7F6-B498-43B3-948B-1728B52AA6E4}">
                   <adec:decorative xmlns:adec="http://schemas.microsoft.com/office/drawing/2017/decorative" val="1"/>
@@ -11005,10 +11013,10 @@
         </p:sp>
         <p:sp>
           <p:nvSpPr>
-            <p:cNvPr id="23" name="Freeform 19">
+            <p:cNvPr id="64" name="Freeform 19">
               <a:extLst>
                 <a:ext uri="{FF2B5EF4-FFF2-40B4-BE49-F238E27FC236}">
-                  <a16:creationId xmlns:a16="http://schemas.microsoft.com/office/drawing/2014/main" id="{ACCD26D6-BC97-43F5-B803-5838985FCCEF}"/>
+                  <a16:creationId xmlns:a16="http://schemas.microsoft.com/office/drawing/2014/main" id="{28D0689D-31AE-4EAE-8B89-90DCD47F1BE1}"/>
                 </a:ext>
                 <a:ext uri="{C183D7F6-B498-43B3-948B-1728B52AA6E4}">
                   <adec:decorative xmlns:adec="http://schemas.microsoft.com/office/drawing/2017/decorative" val="1"/>
@@ -11136,10 +11144,10 @@
         </p:sp>
         <p:sp>
           <p:nvSpPr>
-            <p:cNvPr id="24" name="Freeform 20">
+            <p:cNvPr id="65" name="Freeform 20">
               <a:extLst>
                 <a:ext uri="{FF2B5EF4-FFF2-40B4-BE49-F238E27FC236}">
-                  <a16:creationId xmlns:a16="http://schemas.microsoft.com/office/drawing/2014/main" id="{8136022F-2988-42E2-90E1-617D189FF18C}"/>
+                  <a16:creationId xmlns:a16="http://schemas.microsoft.com/office/drawing/2014/main" id="{17172BB3-0B74-4B5A-B1FC-09313DAC3CBA}"/>
                 </a:ext>
                 <a:ext uri="{C183D7F6-B498-43B3-948B-1728B52AA6E4}">
                   <adec:decorative xmlns:adec="http://schemas.microsoft.com/office/drawing/2017/decorative" val="1"/>
@@ -11202,10 +11210,10 @@
         </p:sp>
         <p:sp>
           <p:nvSpPr>
-            <p:cNvPr id="25" name="Freeform 21">
+            <p:cNvPr id="66" name="Freeform 21">
               <a:extLst>
                 <a:ext uri="{FF2B5EF4-FFF2-40B4-BE49-F238E27FC236}">
-                  <a16:creationId xmlns:a16="http://schemas.microsoft.com/office/drawing/2014/main" id="{03859925-85FA-4D69-A0AB-6F827E3B5CBB}"/>
+                  <a16:creationId xmlns:a16="http://schemas.microsoft.com/office/drawing/2014/main" id="{24BF584C-D8EA-4C47-98AB-CDD5EB007A09}"/>
                 </a:ext>
                 <a:ext uri="{C183D7F6-B498-43B3-948B-1728B52AA6E4}">
                   <adec:decorative xmlns:adec="http://schemas.microsoft.com/office/drawing/2017/decorative" val="1"/>
@@ -11278,10 +11286,10 @@
         </p:sp>
         <p:sp>
           <p:nvSpPr>
-            <p:cNvPr id="26" name="Freeform 22">
+            <p:cNvPr id="67" name="Freeform 22">
               <a:extLst>
                 <a:ext uri="{FF2B5EF4-FFF2-40B4-BE49-F238E27FC236}">
-                  <a16:creationId xmlns:a16="http://schemas.microsoft.com/office/drawing/2014/main" id="{BAE65FC7-970A-4DCC-9FB4-CF0F7496A9E8}"/>
+                  <a16:creationId xmlns:a16="http://schemas.microsoft.com/office/drawing/2014/main" id="{124EB1F1-5E4E-4599-A171-9D7792022050}"/>
                 </a:ext>
                 <a:ext uri="{C183D7F6-B498-43B3-948B-1728B52AA6E4}">
                   <adec:decorative xmlns:adec="http://schemas.microsoft.com/office/drawing/2017/decorative" val="1"/>
@@ -11365,10 +11373,10 @@
       </p:grpSp>
       <p:grpSp>
         <p:nvGrpSpPr>
-          <p:cNvPr id="28" name="Group 27">
+          <p:cNvPr id="69" name="Group 68">
             <a:extLst>
               <a:ext uri="{FF2B5EF4-FFF2-40B4-BE49-F238E27FC236}">
-                <a16:creationId xmlns:a16="http://schemas.microsoft.com/office/drawing/2014/main" id="{B64F33C7-E158-4057-87E7-6F42AA6D034A}"/>
+                <a16:creationId xmlns:a16="http://schemas.microsoft.com/office/drawing/2014/main" id="{2209368F-1AD1-453A-8026-F04870973703}"/>
               </a:ext>
               <a:ext uri="{C183D7F6-B498-43B3-948B-1728B52AA6E4}">
                 <adec:decorative xmlns:adec="http://schemas.microsoft.com/office/drawing/2017/decorative" val="1"/>
@@ -11396,10 +11404,10 @@
         </p:grpSpPr>
         <p:sp>
           <p:nvSpPr>
-            <p:cNvPr id="29" name="Freeform 27">
+            <p:cNvPr id="70" name="Freeform 27">
               <a:extLst>
                 <a:ext uri="{FF2B5EF4-FFF2-40B4-BE49-F238E27FC236}">
-                  <a16:creationId xmlns:a16="http://schemas.microsoft.com/office/drawing/2014/main" id="{26714E66-FCC0-42F6-B127-0F91203BC527}"/>
+                  <a16:creationId xmlns:a16="http://schemas.microsoft.com/office/drawing/2014/main" id="{0E69BFA4-17AB-4ABA-8D3C-631A60BE02EB}"/>
                 </a:ext>
                 <a:ext uri="{C183D7F6-B498-43B3-948B-1728B52AA6E4}">
                   <adec:decorative xmlns:adec="http://schemas.microsoft.com/office/drawing/2017/decorative" val="1"/>
@@ -11515,10 +11523,10 @@
         </p:sp>
         <p:sp>
           <p:nvSpPr>
-            <p:cNvPr id="30" name="Freeform 28">
+            <p:cNvPr id="71" name="Freeform 28">
               <a:extLst>
                 <a:ext uri="{FF2B5EF4-FFF2-40B4-BE49-F238E27FC236}">
-                  <a16:creationId xmlns:a16="http://schemas.microsoft.com/office/drawing/2014/main" id="{7E0BD3C9-F0D9-4A53-87DF-71D17D328DA8}"/>
+                  <a16:creationId xmlns:a16="http://schemas.microsoft.com/office/drawing/2014/main" id="{4292D11E-0C01-4D2E-B100-948220935C7B}"/>
                 </a:ext>
                 <a:ext uri="{C183D7F6-B498-43B3-948B-1728B52AA6E4}">
                   <adec:decorative xmlns:adec="http://schemas.microsoft.com/office/drawing/2017/decorative" val="1"/>
@@ -11599,10 +11607,10 @@
         </p:sp>
         <p:sp>
           <p:nvSpPr>
-            <p:cNvPr id="31" name="Freeform 29">
+            <p:cNvPr id="72" name="Freeform 29">
               <a:extLst>
                 <a:ext uri="{FF2B5EF4-FFF2-40B4-BE49-F238E27FC236}">
-                  <a16:creationId xmlns:a16="http://schemas.microsoft.com/office/drawing/2014/main" id="{DFA9FE4C-FCED-4A9A-9E43-358EB75011ED}"/>
+                  <a16:creationId xmlns:a16="http://schemas.microsoft.com/office/drawing/2014/main" id="{A3A4E547-348A-4729-AC00-1E84D8AD929E}"/>
                 </a:ext>
                 <a:ext uri="{C183D7F6-B498-43B3-948B-1728B52AA6E4}">
                   <adec:decorative xmlns:adec="http://schemas.microsoft.com/office/drawing/2017/decorative" val="1"/>
@@ -11683,10 +11691,10 @@
         </p:sp>
         <p:sp>
           <p:nvSpPr>
-            <p:cNvPr id="32" name="Freeform 30">
+            <p:cNvPr id="73" name="Freeform 30">
               <a:extLst>
                 <a:ext uri="{FF2B5EF4-FFF2-40B4-BE49-F238E27FC236}">
-                  <a16:creationId xmlns:a16="http://schemas.microsoft.com/office/drawing/2014/main" id="{E5D5BB28-15EC-4D32-9C05-C2206AF9E28C}"/>
+                  <a16:creationId xmlns:a16="http://schemas.microsoft.com/office/drawing/2014/main" id="{AE8EC33A-BF4E-4E28-A2F7-033DBBC9DF35}"/>
                 </a:ext>
                 <a:ext uri="{C183D7F6-B498-43B3-948B-1728B52AA6E4}">
                   <adec:decorative xmlns:adec="http://schemas.microsoft.com/office/drawing/2017/decorative" val="1"/>
@@ -11782,10 +11790,10 @@
         </p:sp>
         <p:sp>
           <p:nvSpPr>
-            <p:cNvPr id="33" name="Freeform 31">
+            <p:cNvPr id="74" name="Freeform 31">
               <a:extLst>
                 <a:ext uri="{FF2B5EF4-FFF2-40B4-BE49-F238E27FC236}">
-                  <a16:creationId xmlns:a16="http://schemas.microsoft.com/office/drawing/2014/main" id="{06210E9D-4080-4566-B32A-3A8BE356F899}"/>
+                  <a16:creationId xmlns:a16="http://schemas.microsoft.com/office/drawing/2014/main" id="{38008CFA-8ADB-4AAB-8B54-AB4FE356C673}"/>
                 </a:ext>
                 <a:ext uri="{C183D7F6-B498-43B3-948B-1728B52AA6E4}">
                   <adec:decorative xmlns:adec="http://schemas.microsoft.com/office/drawing/2017/decorative" val="1"/>
@@ -11891,10 +11899,10 @@
         </p:sp>
         <p:sp>
           <p:nvSpPr>
-            <p:cNvPr id="34" name="Freeform 32">
+            <p:cNvPr id="75" name="Freeform 32">
               <a:extLst>
                 <a:ext uri="{FF2B5EF4-FFF2-40B4-BE49-F238E27FC236}">
-                  <a16:creationId xmlns:a16="http://schemas.microsoft.com/office/drawing/2014/main" id="{894D3505-0982-40B2-8131-1B6BFF2736C8}"/>
+                  <a16:creationId xmlns:a16="http://schemas.microsoft.com/office/drawing/2014/main" id="{F204F925-C7EB-4729-AB29-7487C8ED831E}"/>
                 </a:ext>
                 <a:ext uri="{C183D7F6-B498-43B3-948B-1728B52AA6E4}">
                   <adec:decorative xmlns:adec="http://schemas.microsoft.com/office/drawing/2017/decorative" val="1"/>
@@ -11955,10 +11963,10 @@
         </p:sp>
         <p:sp>
           <p:nvSpPr>
-            <p:cNvPr id="35" name="Freeform 33">
+            <p:cNvPr id="76" name="Freeform 33">
               <a:extLst>
                 <a:ext uri="{FF2B5EF4-FFF2-40B4-BE49-F238E27FC236}">
-                  <a16:creationId xmlns:a16="http://schemas.microsoft.com/office/drawing/2014/main" id="{11598CAB-0965-48D6-999C-91450C50DEB1}"/>
+                  <a16:creationId xmlns:a16="http://schemas.microsoft.com/office/drawing/2014/main" id="{1B850771-3B79-4C27-9CC3-3CBFA90C0F93}"/>
                 </a:ext>
                 <a:ext uri="{C183D7F6-B498-43B3-948B-1728B52AA6E4}">
                   <adec:decorative xmlns:adec="http://schemas.microsoft.com/office/drawing/2017/decorative" val="1"/>
@@ -12034,10 +12042,10 @@
         </p:sp>
         <p:sp>
           <p:nvSpPr>
-            <p:cNvPr id="36" name="Freeform 34">
+            <p:cNvPr id="77" name="Freeform 34">
               <a:extLst>
                 <a:ext uri="{FF2B5EF4-FFF2-40B4-BE49-F238E27FC236}">
-                  <a16:creationId xmlns:a16="http://schemas.microsoft.com/office/drawing/2014/main" id="{29E94126-468A-4060-BCBC-DC3806A46F9D}"/>
+                  <a16:creationId xmlns:a16="http://schemas.microsoft.com/office/drawing/2014/main" id="{565B2F18-C5EF-495D-AF6F-226B7CA9D776}"/>
                 </a:ext>
                 <a:ext uri="{C183D7F6-B498-43B3-948B-1728B52AA6E4}">
                   <adec:decorative xmlns:adec="http://schemas.microsoft.com/office/drawing/2017/decorative" val="1"/>
@@ -12158,10 +12166,10 @@
         </p:sp>
         <p:sp>
           <p:nvSpPr>
-            <p:cNvPr id="37" name="Freeform 35">
+            <p:cNvPr id="78" name="Freeform 35">
               <a:extLst>
                 <a:ext uri="{FF2B5EF4-FFF2-40B4-BE49-F238E27FC236}">
-                  <a16:creationId xmlns:a16="http://schemas.microsoft.com/office/drawing/2014/main" id="{438F3422-C112-405B-B955-7B169072142D}"/>
+                  <a16:creationId xmlns:a16="http://schemas.microsoft.com/office/drawing/2014/main" id="{BCA4A062-5E82-4F21-BEBB-7E3C4405CFFB}"/>
                 </a:ext>
                 <a:ext uri="{C183D7F6-B498-43B3-948B-1728B52AA6E4}">
                   <adec:decorative xmlns:adec="http://schemas.microsoft.com/office/drawing/2017/decorative" val="1"/>
@@ -12222,10 +12230,10 @@
         </p:sp>
         <p:sp>
           <p:nvSpPr>
-            <p:cNvPr id="38" name="Freeform 36">
+            <p:cNvPr id="79" name="Freeform 36">
               <a:extLst>
                 <a:ext uri="{FF2B5EF4-FFF2-40B4-BE49-F238E27FC236}">
-                  <a16:creationId xmlns:a16="http://schemas.microsoft.com/office/drawing/2014/main" id="{C99C65FC-23C1-4B1D-A385-29B46619D204}"/>
+                  <a16:creationId xmlns:a16="http://schemas.microsoft.com/office/drawing/2014/main" id="{85F9DBD7-D46E-42F2-96B1-B9EE4469188B}"/>
                 </a:ext>
                 <a:ext uri="{C183D7F6-B498-43B3-948B-1728B52AA6E4}">
                   <adec:decorative xmlns:adec="http://schemas.microsoft.com/office/drawing/2017/decorative" val="1"/>
@@ -12306,10 +12314,10 @@
         </p:sp>
         <p:sp>
           <p:nvSpPr>
-            <p:cNvPr id="39" name="Freeform 37">
+            <p:cNvPr id="80" name="Freeform 37">
               <a:extLst>
                 <a:ext uri="{FF2B5EF4-FFF2-40B4-BE49-F238E27FC236}">
-                  <a16:creationId xmlns:a16="http://schemas.microsoft.com/office/drawing/2014/main" id="{53D192C3-5E79-4B85-98D0-8F6C681CDC17}"/>
+                  <a16:creationId xmlns:a16="http://schemas.microsoft.com/office/drawing/2014/main" id="{098B143F-4C52-4FCA-AC4A-E9BEA91C730B}"/>
                 </a:ext>
                 <a:ext uri="{C183D7F6-B498-43B3-948B-1728B52AA6E4}">
                   <adec:decorative xmlns:adec="http://schemas.microsoft.com/office/drawing/2017/decorative" val="1"/>
@@ -12385,10 +12393,10 @@
         </p:sp>
         <p:sp>
           <p:nvSpPr>
-            <p:cNvPr id="40" name="Freeform 38">
+            <p:cNvPr id="81" name="Freeform 38">
               <a:extLst>
                 <a:ext uri="{FF2B5EF4-FFF2-40B4-BE49-F238E27FC236}">
-                  <a16:creationId xmlns:a16="http://schemas.microsoft.com/office/drawing/2014/main" id="{8709C0CF-D42A-4EE0-9C30-B0B72C69AD45}"/>
+                  <a16:creationId xmlns:a16="http://schemas.microsoft.com/office/drawing/2014/main" id="{A3617AF3-1F02-4D51-9908-2C09CAAB05F9}"/>
                 </a:ext>
                 <a:ext uri="{C183D7F6-B498-43B3-948B-1728B52AA6E4}">
                   <adec:decorative xmlns:adec="http://schemas.microsoft.com/office/drawing/2017/decorative" val="1"/>
@@ -12470,10 +12478,10 @@
       </p:grpSp>
       <p:sp>
         <p:nvSpPr>
-          <p:cNvPr id="42" name="Rectangle 41">
+          <p:cNvPr id="83" name="Rectangle 82">
             <a:extLst>
               <a:ext uri="{FF2B5EF4-FFF2-40B4-BE49-F238E27FC236}">
-                <a16:creationId xmlns:a16="http://schemas.microsoft.com/office/drawing/2014/main" id="{B8FE8EF1-7AF2-4864-A8DE-7EE3481DA1D4}"/>
+                <a16:creationId xmlns:a16="http://schemas.microsoft.com/office/drawing/2014/main" id="{76CA6318-3044-4469-954D-B2AD9DE3B690}"/>
               </a:ext>
               <a:ext uri="{C183D7F6-B498-43B3-948B-1728B52AA6E4}">
                 <adec:decorative xmlns:adec="http://schemas.microsoft.com/office/drawing/2017/decorative" val="1"/>
@@ -12524,10 +12532,10 @@
       </p:sp>
       <p:sp>
         <p:nvSpPr>
-          <p:cNvPr id="44" name="Freeform 6">
+          <p:cNvPr id="85" name="Freeform 6">
             <a:extLst>
               <a:ext uri="{FF2B5EF4-FFF2-40B4-BE49-F238E27FC236}">
-                <a16:creationId xmlns:a16="http://schemas.microsoft.com/office/drawing/2014/main" id="{76CB6AE4-A444-41E5-A744-47F048A15E7D}"/>
+                <a16:creationId xmlns:a16="http://schemas.microsoft.com/office/drawing/2014/main" id="{56320D52-458E-414C-8DAD-A51E40CC4457}"/>
               </a:ext>
               <a:ext uri="{C183D7F6-B498-43B3-948B-1728B52AA6E4}">
                 <adec:decorative xmlns:adec="http://schemas.microsoft.com/office/drawing/2017/decorative" val="1"/>
@@ -12621,222 +12629,6 @@
           </a:ln>
         </p:spPr>
       </p:sp>
-      <p:sp useBgFill="1">
-        <p:nvSpPr>
-          <p:cNvPr id="46" name="Rectangle 45">
-            <a:extLst>
-              <a:ext uri="{FF2B5EF4-FFF2-40B4-BE49-F238E27FC236}">
-                <a16:creationId xmlns:a16="http://schemas.microsoft.com/office/drawing/2014/main" id="{25F129D9-8F3D-4302-AB5D-DE987A6B127A}"/>
-              </a:ext>
-              <a:ext uri="{C183D7F6-B498-43B3-948B-1728B52AA6E4}">
-                <adec:decorative xmlns:adec="http://schemas.microsoft.com/office/drawing/2017/decorative" val="1"/>
-              </a:ext>
-            </a:extLst>
-          </p:cNvPr>
-          <p:cNvSpPr>
-            <a:spLocks noGrp="1" noRot="1" noChangeAspect="1" noMove="1" noResize="1" noEditPoints="1" noAdjustHandles="1" noChangeArrowheads="1" noChangeShapeType="1" noTextEdit="1"/>
-          </p:cNvSpPr>
-          <p:nvPr>
-            <p:extLst>
-              <p:ext uri="{386F3935-93C4-4BCD-93E2-E3B085C9AB24}">
-                <p16:designElem xmlns:p16="http://schemas.microsoft.com/office/powerpoint/2015/main" val="1"/>
-              </p:ext>
-            </p:extLst>
-          </p:nvPr>
-        </p:nvSpPr>
-        <p:spPr>
-          <a:xfrm>
-            <a:off x="0" y="-1"/>
-            <a:ext cx="12188952" cy="6858001"/>
-          </a:xfrm>
-          <a:prstGeom prst="rect">
-            <a:avLst/>
-          </a:prstGeom>
-          <a:ln>
-            <a:noFill/>
-          </a:ln>
-        </p:spPr>
-        <p:style>
-          <a:lnRef idx="2">
-            <a:schemeClr val="accent1">
-              <a:shade val="50000"/>
-            </a:schemeClr>
-          </a:lnRef>
-          <a:fillRef idx="1">
-            <a:schemeClr val="accent1"/>
-          </a:fillRef>
-          <a:effectRef idx="0">
-            <a:schemeClr val="accent1"/>
-          </a:effectRef>
-          <a:fontRef idx="minor">
-            <a:schemeClr val="lt1"/>
-          </a:fontRef>
-        </p:style>
-        <p:txBody>
-          <a:bodyPr rot="0" spcFirstLastPara="0" vert="horz" wrap="square" lIns="91440" tIns="45720" rIns="91440" bIns="45720" numCol="1" spcCol="0" rtlCol="0" fromWordArt="0" anchor="ctr" anchorCtr="0" forceAA="0" compatLnSpc="1">
-            <a:prstTxWarp prst="textNoShape">
-              <a:avLst/>
-            </a:prstTxWarp>
-            <a:noAutofit/>
-          </a:bodyPr>
-          <a:lstStyle>
-            <a:defPPr>
-              <a:defRPr lang="en-US"/>
-            </a:defPPr>
-            <a:lvl1pPr marL="0" algn="l" defTabSz="914400" rtl="0" eaLnBrk="1" latinLnBrk="0" hangingPunct="1">
-              <a:defRPr sz="1800" kern="1200">
-                <a:solidFill>
-                  <a:schemeClr val="lt1"/>
-                </a:solidFill>
-                <a:latin typeface="+mn-lt"/>
-                <a:ea typeface="+mn-ea"/>
-                <a:cs typeface="+mn-cs"/>
-              </a:defRPr>
-            </a:lvl1pPr>
-            <a:lvl2pPr marL="457200" algn="l" defTabSz="914400" rtl="0" eaLnBrk="1" latinLnBrk="0" hangingPunct="1">
-              <a:defRPr sz="1800" kern="1200">
-                <a:solidFill>
-                  <a:schemeClr val="lt1"/>
-                </a:solidFill>
-                <a:latin typeface="+mn-lt"/>
-                <a:ea typeface="+mn-ea"/>
-                <a:cs typeface="+mn-cs"/>
-              </a:defRPr>
-            </a:lvl2pPr>
-            <a:lvl3pPr marL="914400" algn="l" defTabSz="914400" rtl="0" eaLnBrk="1" latinLnBrk="0" hangingPunct="1">
-              <a:defRPr sz="1800" kern="1200">
-                <a:solidFill>
-                  <a:schemeClr val="lt1"/>
-                </a:solidFill>
-                <a:latin typeface="+mn-lt"/>
-                <a:ea typeface="+mn-ea"/>
-                <a:cs typeface="+mn-cs"/>
-              </a:defRPr>
-            </a:lvl3pPr>
-            <a:lvl4pPr marL="1371600" algn="l" defTabSz="914400" rtl="0" eaLnBrk="1" latinLnBrk="0" hangingPunct="1">
-              <a:defRPr sz="1800" kern="1200">
-                <a:solidFill>
-                  <a:schemeClr val="lt1"/>
-                </a:solidFill>
-                <a:latin typeface="+mn-lt"/>
-                <a:ea typeface="+mn-ea"/>
-                <a:cs typeface="+mn-cs"/>
-              </a:defRPr>
-            </a:lvl4pPr>
-            <a:lvl5pPr marL="1828800" algn="l" defTabSz="914400" rtl="0" eaLnBrk="1" latinLnBrk="0" hangingPunct="1">
-              <a:defRPr sz="1800" kern="1200">
-                <a:solidFill>
-                  <a:schemeClr val="lt1"/>
-                </a:solidFill>
-                <a:latin typeface="+mn-lt"/>
-                <a:ea typeface="+mn-ea"/>
-                <a:cs typeface="+mn-cs"/>
-              </a:defRPr>
-            </a:lvl5pPr>
-            <a:lvl6pPr marL="2286000" algn="l" defTabSz="914400" rtl="0" eaLnBrk="1" latinLnBrk="0" hangingPunct="1">
-              <a:defRPr sz="1800" kern="1200">
-                <a:solidFill>
-                  <a:schemeClr val="lt1"/>
-                </a:solidFill>
-                <a:latin typeface="+mn-lt"/>
-                <a:ea typeface="+mn-ea"/>
-                <a:cs typeface="+mn-cs"/>
-              </a:defRPr>
-            </a:lvl6pPr>
-            <a:lvl7pPr marL="2743200" algn="l" defTabSz="914400" rtl="0" eaLnBrk="1" latinLnBrk="0" hangingPunct="1">
-              <a:defRPr sz="1800" kern="1200">
-                <a:solidFill>
-                  <a:schemeClr val="lt1"/>
-                </a:solidFill>
-                <a:latin typeface="+mn-lt"/>
-                <a:ea typeface="+mn-ea"/>
-                <a:cs typeface="+mn-cs"/>
-              </a:defRPr>
-            </a:lvl7pPr>
-            <a:lvl8pPr marL="3200400" algn="l" defTabSz="914400" rtl="0" eaLnBrk="1" latinLnBrk="0" hangingPunct="1">
-              <a:defRPr sz="1800" kern="1200">
-                <a:solidFill>
-                  <a:schemeClr val="lt1"/>
-                </a:solidFill>
-                <a:latin typeface="+mn-lt"/>
-                <a:ea typeface="+mn-ea"/>
-                <a:cs typeface="+mn-cs"/>
-              </a:defRPr>
-            </a:lvl8pPr>
-            <a:lvl9pPr marL="3657600" algn="l" defTabSz="914400" rtl="0" eaLnBrk="1" latinLnBrk="0" hangingPunct="1">
-              <a:defRPr sz="1800" kern="1200">
-                <a:solidFill>
-                  <a:schemeClr val="lt1"/>
-                </a:solidFill>
-                <a:latin typeface="+mn-lt"/>
-                <a:ea typeface="+mn-ea"/>
-                <a:cs typeface="+mn-cs"/>
-              </a:defRPr>
-            </a:lvl9pPr>
-          </a:lstStyle>
-          <a:p>
-            <a:pPr algn="ctr"/>
-            <a:endParaRPr lang="en-US"/>
-          </a:p>
-        </p:txBody>
-      </p:sp>
-      <p:sp>
-        <p:nvSpPr>
-          <p:cNvPr id="48" name="Rectangle 47">
-            <a:extLst>
-              <a:ext uri="{FF2B5EF4-FFF2-40B4-BE49-F238E27FC236}">
-                <a16:creationId xmlns:a16="http://schemas.microsoft.com/office/drawing/2014/main" id="{1F4A57F6-BEF1-4CA6-A0F1-3A01F6AB48EE}"/>
-              </a:ext>
-              <a:ext uri="{C183D7F6-B498-43B3-948B-1728B52AA6E4}">
-                <adec:decorative xmlns:adec="http://schemas.microsoft.com/office/drawing/2017/decorative" val="1"/>
-              </a:ext>
-            </a:extLst>
-          </p:cNvPr>
-          <p:cNvSpPr>
-            <a:spLocks noGrp="1" noRot="1" noChangeAspect="1" noMove="1" noResize="1" noEditPoints="1" noAdjustHandles="1" noChangeArrowheads="1" noChangeShapeType="1" noTextEdit="1"/>
-          </p:cNvSpPr>
-          <p:nvPr>
-            <p:extLst>
-              <p:ext uri="{386F3935-93C4-4BCD-93E2-E3B085C9AB24}">
-                <p16:designElem xmlns:p16="http://schemas.microsoft.com/office/powerpoint/2015/main" val="1"/>
-              </p:ext>
-            </p:extLst>
-          </p:nvPr>
-        </p:nvSpPr>
-        <p:spPr bwMode="white">
-          <a:xfrm>
-            <a:off x="-1" y="0"/>
-            <a:ext cx="4639734" cy="6858000"/>
-          </a:xfrm>
-          <a:prstGeom prst="rect">
-            <a:avLst/>
-          </a:prstGeom>
-          <a:solidFill>
-            <a:schemeClr val="tx2">
-              <a:lumMod val="50000"/>
-              <a:alpha val="90000"/>
-            </a:schemeClr>
-          </a:solidFill>
-          <a:ln>
-            <a:noFill/>
-          </a:ln>
-          <a:effectLst/>
-        </p:spPr>
-        <p:style>
-          <a:lnRef idx="1">
-            <a:schemeClr val="accent1"/>
-          </a:lnRef>
-          <a:fillRef idx="3">
-            <a:schemeClr val="accent1"/>
-          </a:fillRef>
-          <a:effectRef idx="2">
-            <a:schemeClr val="accent1"/>
-          </a:effectRef>
-          <a:fontRef idx="minor">
-            <a:schemeClr val="lt1"/>
-          </a:fontRef>
-        </p:style>
-      </p:sp>
       <p:sp>
         <p:nvSpPr>
           <p:cNvPr id="2" name="Title 1">
@@ -12855,8 +12647,8 @@
         </p:nvSpPr>
         <p:spPr>
           <a:xfrm>
-            <a:off x="540279" y="967417"/>
-            <a:ext cx="3778870" cy="3943250"/>
+            <a:off x="2589213" y="4775200"/>
+            <a:ext cx="8915399" cy="823448"/>
           </a:xfrm>
         </p:spPr>
         <p:txBody>
@@ -12866,262 +12658,9 @@
           <a:lstStyle/>
           <a:p>
             <a:r>
-              <a:rPr lang="en-US" sz="4000">
-                <a:solidFill>
-                  <a:srgbClr val="FEFFFF"/>
-                </a:solidFill>
-              </a:rPr>
+              <a:rPr lang="en-US" sz="4400"/>
               <a:t>Data Exploration</a:t>
             </a:r>
-          </a:p>
-        </p:txBody>
-      </p:sp>
-      <p:sp>
-        <p:nvSpPr>
-          <p:cNvPr id="50" name="Freeform 5">
-            <a:extLst>
-              <a:ext uri="{FF2B5EF4-FFF2-40B4-BE49-F238E27FC236}">
-                <a16:creationId xmlns:a16="http://schemas.microsoft.com/office/drawing/2014/main" id="{E3336A73-1C9B-4BAA-A893-AD3C79E66607}"/>
-              </a:ext>
-              <a:ext uri="{C183D7F6-B498-43B3-948B-1728B52AA6E4}">
-                <adec:decorative xmlns:adec="http://schemas.microsoft.com/office/drawing/2017/decorative" val="1"/>
-              </a:ext>
-            </a:extLst>
-          </p:cNvPr>
-          <p:cNvSpPr>
-            <a:spLocks noGrp="1" noRot="1" noChangeAspect="1" noMove="1" noResize="1" noEditPoints="1" noAdjustHandles="1" noChangeArrowheads="1" noChangeShapeType="1" noTextEdit="1"/>
-          </p:cNvSpPr>
-          <p:nvPr>
-            <p:extLst>
-              <p:ext uri="{386F3935-93C4-4BCD-93E2-E3B085C9AB24}">
-                <p16:designElem xmlns:p16="http://schemas.microsoft.com/office/powerpoint/2015/main" val="1"/>
-              </p:ext>
-            </p:extLst>
-          </p:nvPr>
-        </p:nvSpPr>
-        <p:spPr bwMode="grayWhite">
-          <a:xfrm>
-            <a:off x="0" y="5033007"/>
-            <a:ext cx="5404022" cy="857047"/>
-          </a:xfrm>
-          <a:custGeom>
-            <a:avLst/>
-            <a:gdLst>
-              <a:gd name="T0" fmla="*/ 1114 w 1117"/>
-              <a:gd name="T1" fmla="*/ 77 h 163"/>
-              <a:gd name="T2" fmla="*/ 1040 w 1117"/>
-              <a:gd name="T3" fmla="*/ 3 h 163"/>
-              <a:gd name="T4" fmla="*/ 1039 w 1117"/>
-              <a:gd name="T5" fmla="*/ 2 h 163"/>
-              <a:gd name="T6" fmla="*/ 1034 w 1117"/>
-              <a:gd name="T7" fmla="*/ 0 h 163"/>
-              <a:gd name="T8" fmla="*/ 578 w 1117"/>
-              <a:gd name="T9" fmla="*/ 0 h 163"/>
-              <a:gd name="T10" fmla="*/ 562 w 1117"/>
-              <a:gd name="T11" fmla="*/ 0 h 163"/>
-              <a:gd name="T12" fmla="*/ 440 w 1117"/>
-              <a:gd name="T13" fmla="*/ 0 h 163"/>
-              <a:gd name="T14" fmla="*/ 106 w 1117"/>
-              <a:gd name="T15" fmla="*/ 0 h 163"/>
-              <a:gd name="T16" fmla="*/ 0 w 1117"/>
-              <a:gd name="T17" fmla="*/ 0 h 163"/>
-              <a:gd name="T18" fmla="*/ 0 w 1117"/>
-              <a:gd name="T19" fmla="*/ 163 h 163"/>
-              <a:gd name="T20" fmla="*/ 106 w 1117"/>
-              <a:gd name="T21" fmla="*/ 163 h 163"/>
-              <a:gd name="T22" fmla="*/ 440 w 1117"/>
-              <a:gd name="T23" fmla="*/ 163 h 163"/>
-              <a:gd name="T24" fmla="*/ 562 w 1117"/>
-              <a:gd name="T25" fmla="*/ 163 h 163"/>
-              <a:gd name="T26" fmla="*/ 578 w 1117"/>
-              <a:gd name="T27" fmla="*/ 163 h 163"/>
-              <a:gd name="T28" fmla="*/ 1034 w 1117"/>
-              <a:gd name="T29" fmla="*/ 163 h 163"/>
-              <a:gd name="T30" fmla="*/ 1039 w 1117"/>
-              <a:gd name="T31" fmla="*/ 161 h 163"/>
-              <a:gd name="T32" fmla="*/ 1040 w 1117"/>
-              <a:gd name="T33" fmla="*/ 160 h 163"/>
-              <a:gd name="T34" fmla="*/ 1114 w 1117"/>
-              <a:gd name="T35" fmla="*/ 86 h 163"/>
-              <a:gd name="T36" fmla="*/ 1114 w 1117"/>
-              <a:gd name="T37" fmla="*/ 77 h 163"/>
-            </a:gdLst>
-            <a:ahLst/>
-            <a:cxnLst>
-              <a:cxn ang="0">
-                <a:pos x="T0" y="T1"/>
-              </a:cxn>
-              <a:cxn ang="0">
-                <a:pos x="T2" y="T3"/>
-              </a:cxn>
-              <a:cxn ang="0">
-                <a:pos x="T4" y="T5"/>
-              </a:cxn>
-              <a:cxn ang="0">
-                <a:pos x="T6" y="T7"/>
-              </a:cxn>
-              <a:cxn ang="0">
-                <a:pos x="T8" y="T9"/>
-              </a:cxn>
-              <a:cxn ang="0">
-                <a:pos x="T10" y="T11"/>
-              </a:cxn>
-              <a:cxn ang="0">
-                <a:pos x="T12" y="T13"/>
-              </a:cxn>
-              <a:cxn ang="0">
-                <a:pos x="T14" y="T15"/>
-              </a:cxn>
-              <a:cxn ang="0">
-                <a:pos x="T16" y="T17"/>
-              </a:cxn>
-              <a:cxn ang="0">
-                <a:pos x="T18" y="T19"/>
-              </a:cxn>
-              <a:cxn ang="0">
-                <a:pos x="T20" y="T21"/>
-              </a:cxn>
-              <a:cxn ang="0">
-                <a:pos x="T22" y="T23"/>
-              </a:cxn>
-              <a:cxn ang="0">
-                <a:pos x="T24" y="T25"/>
-              </a:cxn>
-              <a:cxn ang="0">
-                <a:pos x="T26" y="T27"/>
-              </a:cxn>
-              <a:cxn ang="0">
-                <a:pos x="T28" y="T29"/>
-              </a:cxn>
-              <a:cxn ang="0">
-                <a:pos x="T30" y="T31"/>
-              </a:cxn>
-              <a:cxn ang="0">
-                <a:pos x="T32" y="T33"/>
-              </a:cxn>
-              <a:cxn ang="0">
-                <a:pos x="T34" y="T35"/>
-              </a:cxn>
-              <a:cxn ang="0">
-                <a:pos x="T36" y="T37"/>
-              </a:cxn>
-            </a:cxnLst>
-            <a:rect l="0" t="0" r="r" b="b"/>
-            <a:pathLst>
-              <a:path w="1117" h="163">
-                <a:moveTo>
-                  <a:pt x="1114" y="77"/>
-                </a:moveTo>
-                <a:cubicBezTo>
-                  <a:pt x="1040" y="3"/>
-                  <a:pt x="1040" y="3"/>
-                  <a:pt x="1040" y="3"/>
-                </a:cubicBezTo>
-                <a:cubicBezTo>
-                  <a:pt x="1040" y="2"/>
-                  <a:pt x="1039" y="2"/>
-                  <a:pt x="1039" y="2"/>
-                </a:cubicBezTo>
-                <a:cubicBezTo>
-                  <a:pt x="1038" y="1"/>
-                  <a:pt x="1036" y="0"/>
-                  <a:pt x="1034" y="0"/>
-                </a:cubicBezTo>
-                <a:cubicBezTo>
-                  <a:pt x="578" y="0"/>
-                  <a:pt x="578" y="0"/>
-                  <a:pt x="578" y="0"/>
-                </a:cubicBezTo>
-                <a:cubicBezTo>
-                  <a:pt x="562" y="0"/>
-                  <a:pt x="562" y="0"/>
-                  <a:pt x="562" y="0"/>
-                </a:cubicBezTo>
-                <a:cubicBezTo>
-                  <a:pt x="440" y="0"/>
-                  <a:pt x="440" y="0"/>
-                  <a:pt x="440" y="0"/>
-                </a:cubicBezTo>
-                <a:cubicBezTo>
-                  <a:pt x="106" y="0"/>
-                  <a:pt x="106" y="0"/>
-                  <a:pt x="106" y="0"/>
-                </a:cubicBezTo>
-                <a:cubicBezTo>
-                  <a:pt x="0" y="0"/>
-                  <a:pt x="0" y="0"/>
-                  <a:pt x="0" y="0"/>
-                </a:cubicBezTo>
-                <a:cubicBezTo>
-                  <a:pt x="0" y="163"/>
-                  <a:pt x="0" y="163"/>
-                  <a:pt x="0" y="163"/>
-                </a:cubicBezTo>
-                <a:cubicBezTo>
-                  <a:pt x="106" y="163"/>
-                  <a:pt x="106" y="163"/>
-                  <a:pt x="106" y="163"/>
-                </a:cubicBezTo>
-                <a:cubicBezTo>
-                  <a:pt x="440" y="163"/>
-                  <a:pt x="440" y="163"/>
-                  <a:pt x="440" y="163"/>
-                </a:cubicBezTo>
-                <a:cubicBezTo>
-                  <a:pt x="562" y="163"/>
-                  <a:pt x="562" y="163"/>
-                  <a:pt x="562" y="163"/>
-                </a:cubicBezTo>
-                <a:cubicBezTo>
-                  <a:pt x="578" y="163"/>
-                  <a:pt x="578" y="163"/>
-                  <a:pt x="578" y="163"/>
-                </a:cubicBezTo>
-                <a:cubicBezTo>
-                  <a:pt x="1034" y="163"/>
-                  <a:pt x="1034" y="163"/>
-                  <a:pt x="1034" y="163"/>
-                </a:cubicBezTo>
-                <a:cubicBezTo>
-                  <a:pt x="1036" y="163"/>
-                  <a:pt x="1038" y="162"/>
-                  <a:pt x="1039" y="161"/>
-                </a:cubicBezTo>
-                <a:cubicBezTo>
-                  <a:pt x="1039" y="160"/>
-                  <a:pt x="1040" y="160"/>
-                  <a:pt x="1040" y="160"/>
-                </a:cubicBezTo>
-                <a:cubicBezTo>
-                  <a:pt x="1114" y="86"/>
-                  <a:pt x="1114" y="86"/>
-                  <a:pt x="1114" y="86"/>
-                </a:cubicBezTo>
-                <a:cubicBezTo>
-                  <a:pt x="1117" y="83"/>
-                  <a:pt x="1117" y="79"/>
-                  <a:pt x="1114" y="77"/>
-                </a:cubicBezTo>
-                <a:close/>
-              </a:path>
-            </a:pathLst>
-          </a:custGeom>
-          <a:solidFill>
-            <a:schemeClr val="accent1"/>
-          </a:solidFill>
-          <a:ln>
-            <a:noFill/>
-          </a:ln>
-        </p:spPr>
-        <p:txBody>
-          <a:bodyPr vert="horz" wrap="square" lIns="91440" tIns="45720" rIns="91440" bIns="45720" numCol="1" anchor="t" anchorCtr="0" compatLnSpc="1">
-            <a:prstTxWarp prst="textNoShape">
-              <a:avLst/>
-            </a:prstTxWarp>
-          </a:bodyPr>
-          <a:lstStyle/>
-          <a:p>
-            <a:endParaRPr lang="en-US"/>
           </a:p>
         </p:txBody>
       </p:sp>
@@ -13143,20 +12682,23 @@
         </p:nvSpPr>
         <p:spPr>
           <a:xfrm>
-            <a:off x="540279" y="5189400"/>
-            <a:ext cx="3778870" cy="544260"/>
+            <a:off x="2589213" y="5598647"/>
+            <a:ext cx="8915399" cy="522754"/>
           </a:xfrm>
         </p:spPr>
         <p:txBody>
-          <a:bodyPr vert="horz" lIns="91440" tIns="45720" rIns="91440" bIns="45720" rtlCol="0" anchor="ctr">
+          <a:bodyPr vert="horz" lIns="91440" tIns="45720" rIns="91440" bIns="45720" rtlCol="0" anchor="t">
             <a:normAutofit/>
           </a:bodyPr>
           <a:lstStyle/>
           <a:p>
             <a:r>
-              <a:rPr lang="en-US" sz="1600">
+              <a:rPr lang="en-US" sz="1800">
                 <a:solidFill>
-                  <a:srgbClr val="FEFFFF"/>
+                  <a:schemeClr val="tx1">
+                    <a:lumMod val="65000"/>
+                    <a:lumOff val="35000"/>
+                  </a:schemeClr>
                 </a:solidFill>
               </a:rPr>
               <a:t>Weather Data</a:t>
@@ -13166,7 +12708,7 @@
       </p:sp>
       <p:pic>
         <p:nvPicPr>
-          <p:cNvPr id="9" name="Picture 8">
+          <p:cNvPr id="9" name="Picture 8" descr="A close up of a map&#10;&#10;Description automatically generated">
             <a:extLst>
               <a:ext uri="{FF2B5EF4-FFF2-40B4-BE49-F238E27FC236}">
                 <a16:creationId xmlns:a16="http://schemas.microsoft.com/office/drawing/2014/main" id="{EFD765D1-902B-4D1F-AB86-636D3988D1B1}"/>
@@ -13186,8 +12728,38 @@
         </p:blipFill>
         <p:spPr>
           <a:xfrm>
-            <a:off x="5353281" y="377687"/>
-            <a:ext cx="6317168" cy="6317168"/>
+            <a:off x="2279084" y="425574"/>
+            <a:ext cx="4375837" cy="4375837"/>
+          </a:xfrm>
+          <a:prstGeom prst="rect">
+            <a:avLst/>
+          </a:prstGeom>
+        </p:spPr>
+      </p:pic>
+      <p:pic>
+        <p:nvPicPr>
+          <p:cNvPr id="4" name="Picture 3" descr="A screenshot of a cell phone&#10;&#10;Description automatically generated">
+            <a:extLst>
+              <a:ext uri="{FF2B5EF4-FFF2-40B4-BE49-F238E27FC236}">
+                <a16:creationId xmlns:a16="http://schemas.microsoft.com/office/drawing/2014/main" id="{94A7F315-1767-4520-902A-28F83969709C}"/>
+              </a:ext>
+            </a:extLst>
+          </p:cNvPr>
+          <p:cNvPicPr>
+            <a:picLocks noChangeAspect="1"/>
+          </p:cNvPicPr>
+          <p:nvPr/>
+        </p:nvPicPr>
+        <p:blipFill>
+          <a:blip r:embed="rId4"/>
+          <a:stretch>
+            <a:fillRect/>
+          </a:stretch>
+        </p:blipFill>
+        <p:spPr>
+          <a:xfrm>
+            <a:off x="7046912" y="2141676"/>
+            <a:ext cx="4830457" cy="1606126"/>
           </a:xfrm>
           <a:prstGeom prst="rect">
             <a:avLst/>
@@ -17429,10 +17001,10 @@
       </p:sp>
       <p:pic>
         <p:nvPicPr>
-          <p:cNvPr id="5" name="Picture 4">
+          <p:cNvPr id="2" name="Picture 1">
             <a:extLst>
               <a:ext uri="{FF2B5EF4-FFF2-40B4-BE49-F238E27FC236}">
-                <a16:creationId xmlns:a16="http://schemas.microsoft.com/office/drawing/2014/main" id="{E14C97E6-5C39-4176-B14F-9B32F215892E}"/>
+                <a16:creationId xmlns:a16="http://schemas.microsoft.com/office/drawing/2014/main" id="{AD6698C2-E049-476F-AB99-09576E45E140}"/>
               </a:ext>
             </a:extLst>
           </p:cNvPr>
@@ -17449,8 +17021,8 @@
         </p:blipFill>
         <p:spPr>
           <a:xfrm>
-            <a:off x="3323396" y="694623"/>
-            <a:ext cx="7649404" cy="3936392"/>
+            <a:off x="3249852" y="220002"/>
+            <a:ext cx="6858244" cy="4580598"/>
           </a:xfrm>
           <a:prstGeom prst="rect">
             <a:avLst/>
@@ -17552,10 +17124,10 @@
       </p:sp>
       <p:pic>
         <p:nvPicPr>
-          <p:cNvPr id="2" name="Picture 1">
+          <p:cNvPr id="3" name="Picture 2">
             <a:extLst>
               <a:ext uri="{FF2B5EF4-FFF2-40B4-BE49-F238E27FC236}">
-                <a16:creationId xmlns:a16="http://schemas.microsoft.com/office/drawing/2014/main" id="{07B119DC-EB56-4C09-8C28-1F6276361343}"/>
+                <a16:creationId xmlns:a16="http://schemas.microsoft.com/office/drawing/2014/main" id="{050DCDF8-1FA1-4D81-9284-A311D415433B}"/>
               </a:ext>
             </a:extLst>
           </p:cNvPr>
@@ -17572,8 +17144,8 @@
         </p:blipFill>
         <p:spPr>
           <a:xfrm>
-            <a:off x="3445980" y="776796"/>
-            <a:ext cx="5767594" cy="3887316"/>
+            <a:off x="3419267" y="521264"/>
+            <a:ext cx="6509924" cy="4279336"/>
           </a:xfrm>
           <a:prstGeom prst="rect">
             <a:avLst/>
@@ -22088,6 +21660,608 @@
   <p:clrMapOvr>
     <a:masterClrMapping/>
   </p:clrMapOvr>
+  <p:timing>
+    <p:tnLst>
+      <p:par>
+        <p:cTn id="1" dur="indefinite" restart="never" nodeType="tmRoot">
+          <p:childTnLst>
+            <p:seq concurrent="1" nextAc="seek">
+              <p:cTn id="2" dur="indefinite" nodeType="mainSeq">
+                <p:childTnLst>
+                  <p:par>
+                    <p:cTn id="3" fill="hold">
+                      <p:stCondLst>
+                        <p:cond delay="indefinite"/>
+                      </p:stCondLst>
+                      <p:childTnLst>
+                        <p:par>
+                          <p:cTn id="4" fill="hold">
+                            <p:stCondLst>
+                              <p:cond delay="0"/>
+                            </p:stCondLst>
+                            <p:childTnLst>
+                              <p:par>
+                                <p:cTn id="5" presetID="1" presetClass="entr" presetSubtype="0" fill="hold" grpId="0" nodeType="clickEffect">
+                                  <p:stCondLst>
+                                    <p:cond delay="0"/>
+                                  </p:stCondLst>
+                                  <p:childTnLst>
+                                    <p:set>
+                                      <p:cBhvr>
+                                        <p:cTn id="6" dur="1" fill="hold">
+                                          <p:stCondLst>
+                                            <p:cond delay="0"/>
+                                          </p:stCondLst>
+                                        </p:cTn>
+                                        <p:tgtEl>
+                                          <p:spTgt spid="5">
+                                            <p:txEl>
+                                              <p:pRg st="0" end="0"/>
+                                            </p:txEl>
+                                          </p:spTgt>
+                                        </p:tgtEl>
+                                        <p:attrNameLst>
+                                          <p:attrName>style.visibility</p:attrName>
+                                        </p:attrNameLst>
+                                      </p:cBhvr>
+                                      <p:to>
+                                        <p:strVal val="visible"/>
+                                      </p:to>
+                                    </p:set>
+                                  </p:childTnLst>
+                                </p:cTn>
+                              </p:par>
+                              <p:par>
+                                <p:cTn id="7" presetID="1" presetClass="entr" presetSubtype="0" fill="hold" grpId="0" nodeType="withEffect">
+                                  <p:stCondLst>
+                                    <p:cond delay="0"/>
+                                  </p:stCondLst>
+                                  <p:childTnLst>
+                                    <p:set>
+                                      <p:cBhvr>
+                                        <p:cTn id="8" dur="1" fill="hold">
+                                          <p:stCondLst>
+                                            <p:cond delay="0"/>
+                                          </p:stCondLst>
+                                        </p:cTn>
+                                        <p:tgtEl>
+                                          <p:spTgt spid="5">
+                                            <p:txEl>
+                                              <p:pRg st="1" end="1"/>
+                                            </p:txEl>
+                                          </p:spTgt>
+                                        </p:tgtEl>
+                                        <p:attrNameLst>
+                                          <p:attrName>style.visibility</p:attrName>
+                                        </p:attrNameLst>
+                                      </p:cBhvr>
+                                      <p:to>
+                                        <p:strVal val="visible"/>
+                                      </p:to>
+                                    </p:set>
+                                  </p:childTnLst>
+                                </p:cTn>
+                              </p:par>
+                              <p:par>
+                                <p:cTn id="9" presetID="1" presetClass="entr" presetSubtype="0" fill="hold" grpId="0" nodeType="withEffect">
+                                  <p:stCondLst>
+                                    <p:cond delay="0"/>
+                                  </p:stCondLst>
+                                  <p:childTnLst>
+                                    <p:set>
+                                      <p:cBhvr>
+                                        <p:cTn id="10" dur="1" fill="hold">
+                                          <p:stCondLst>
+                                            <p:cond delay="0"/>
+                                          </p:stCondLst>
+                                        </p:cTn>
+                                        <p:tgtEl>
+                                          <p:spTgt spid="5">
+                                            <p:txEl>
+                                              <p:pRg st="2" end="2"/>
+                                            </p:txEl>
+                                          </p:spTgt>
+                                        </p:tgtEl>
+                                        <p:attrNameLst>
+                                          <p:attrName>style.visibility</p:attrName>
+                                        </p:attrNameLst>
+                                      </p:cBhvr>
+                                      <p:to>
+                                        <p:strVal val="visible"/>
+                                      </p:to>
+                                    </p:set>
+                                  </p:childTnLst>
+                                </p:cTn>
+                              </p:par>
+                              <p:par>
+                                <p:cTn id="11" presetID="1" presetClass="entr" presetSubtype="0" fill="hold" grpId="0" nodeType="withEffect">
+                                  <p:stCondLst>
+                                    <p:cond delay="0"/>
+                                  </p:stCondLst>
+                                  <p:childTnLst>
+                                    <p:set>
+                                      <p:cBhvr>
+                                        <p:cTn id="12" dur="1" fill="hold">
+                                          <p:stCondLst>
+                                            <p:cond delay="0"/>
+                                          </p:stCondLst>
+                                        </p:cTn>
+                                        <p:tgtEl>
+                                          <p:spTgt spid="5">
+                                            <p:txEl>
+                                              <p:pRg st="3" end="3"/>
+                                            </p:txEl>
+                                          </p:spTgt>
+                                        </p:tgtEl>
+                                        <p:attrNameLst>
+                                          <p:attrName>style.visibility</p:attrName>
+                                        </p:attrNameLst>
+                                      </p:cBhvr>
+                                      <p:to>
+                                        <p:strVal val="visible"/>
+                                      </p:to>
+                                    </p:set>
+                                  </p:childTnLst>
+                                </p:cTn>
+                              </p:par>
+                            </p:childTnLst>
+                          </p:cTn>
+                        </p:par>
+                      </p:childTnLst>
+                    </p:cTn>
+                  </p:par>
+                  <p:par>
+                    <p:cTn id="13" fill="hold">
+                      <p:stCondLst>
+                        <p:cond delay="indefinite"/>
+                      </p:stCondLst>
+                      <p:childTnLst>
+                        <p:par>
+                          <p:cTn id="14" fill="hold">
+                            <p:stCondLst>
+                              <p:cond delay="0"/>
+                            </p:stCondLst>
+                            <p:childTnLst>
+                              <p:par>
+                                <p:cTn id="15" presetID="1" presetClass="entr" presetSubtype="0" fill="hold" grpId="0" nodeType="clickEffect">
+                                  <p:stCondLst>
+                                    <p:cond delay="0"/>
+                                  </p:stCondLst>
+                                  <p:childTnLst>
+                                    <p:set>
+                                      <p:cBhvr>
+                                        <p:cTn id="16" dur="1" fill="hold">
+                                          <p:stCondLst>
+                                            <p:cond delay="0"/>
+                                          </p:stCondLst>
+                                        </p:cTn>
+                                        <p:tgtEl>
+                                          <p:spTgt spid="5">
+                                            <p:txEl>
+                                              <p:pRg st="4" end="4"/>
+                                            </p:txEl>
+                                          </p:spTgt>
+                                        </p:tgtEl>
+                                        <p:attrNameLst>
+                                          <p:attrName>style.visibility</p:attrName>
+                                        </p:attrNameLst>
+                                      </p:cBhvr>
+                                      <p:to>
+                                        <p:strVal val="visible"/>
+                                      </p:to>
+                                    </p:set>
+                                  </p:childTnLst>
+                                </p:cTn>
+                              </p:par>
+                              <p:par>
+                                <p:cTn id="17" presetID="1" presetClass="entr" presetSubtype="0" fill="hold" grpId="0" nodeType="withEffect">
+                                  <p:stCondLst>
+                                    <p:cond delay="0"/>
+                                  </p:stCondLst>
+                                  <p:childTnLst>
+                                    <p:set>
+                                      <p:cBhvr>
+                                        <p:cTn id="18" dur="1" fill="hold">
+                                          <p:stCondLst>
+                                            <p:cond delay="0"/>
+                                          </p:stCondLst>
+                                        </p:cTn>
+                                        <p:tgtEl>
+                                          <p:spTgt spid="5">
+                                            <p:txEl>
+                                              <p:pRg st="5" end="5"/>
+                                            </p:txEl>
+                                          </p:spTgt>
+                                        </p:tgtEl>
+                                        <p:attrNameLst>
+                                          <p:attrName>style.visibility</p:attrName>
+                                        </p:attrNameLst>
+                                      </p:cBhvr>
+                                      <p:to>
+                                        <p:strVal val="visible"/>
+                                      </p:to>
+                                    </p:set>
+                                  </p:childTnLst>
+                                </p:cTn>
+                              </p:par>
+                              <p:par>
+                                <p:cTn id="19" presetID="1" presetClass="entr" presetSubtype="0" fill="hold" grpId="0" nodeType="withEffect">
+                                  <p:stCondLst>
+                                    <p:cond delay="0"/>
+                                  </p:stCondLst>
+                                  <p:childTnLst>
+                                    <p:set>
+                                      <p:cBhvr>
+                                        <p:cTn id="20" dur="1" fill="hold">
+                                          <p:stCondLst>
+                                            <p:cond delay="0"/>
+                                          </p:stCondLst>
+                                        </p:cTn>
+                                        <p:tgtEl>
+                                          <p:spTgt spid="5">
+                                            <p:txEl>
+                                              <p:pRg st="6" end="6"/>
+                                            </p:txEl>
+                                          </p:spTgt>
+                                        </p:tgtEl>
+                                        <p:attrNameLst>
+                                          <p:attrName>style.visibility</p:attrName>
+                                        </p:attrNameLst>
+                                      </p:cBhvr>
+                                      <p:to>
+                                        <p:strVal val="visible"/>
+                                      </p:to>
+                                    </p:set>
+                                  </p:childTnLst>
+                                </p:cTn>
+                              </p:par>
+                              <p:par>
+                                <p:cTn id="21" presetID="1" presetClass="entr" presetSubtype="0" fill="hold" grpId="0" nodeType="withEffect">
+                                  <p:stCondLst>
+                                    <p:cond delay="0"/>
+                                  </p:stCondLst>
+                                  <p:childTnLst>
+                                    <p:set>
+                                      <p:cBhvr>
+                                        <p:cTn id="22" dur="1" fill="hold">
+                                          <p:stCondLst>
+                                            <p:cond delay="0"/>
+                                          </p:stCondLst>
+                                        </p:cTn>
+                                        <p:tgtEl>
+                                          <p:spTgt spid="5">
+                                            <p:txEl>
+                                              <p:pRg st="7" end="7"/>
+                                            </p:txEl>
+                                          </p:spTgt>
+                                        </p:tgtEl>
+                                        <p:attrNameLst>
+                                          <p:attrName>style.visibility</p:attrName>
+                                        </p:attrNameLst>
+                                      </p:cBhvr>
+                                      <p:to>
+                                        <p:strVal val="visible"/>
+                                      </p:to>
+                                    </p:set>
+                                  </p:childTnLst>
+                                </p:cTn>
+                              </p:par>
+                            </p:childTnLst>
+                          </p:cTn>
+                        </p:par>
+                      </p:childTnLst>
+                    </p:cTn>
+                  </p:par>
+                  <p:par>
+                    <p:cTn id="23" fill="hold">
+                      <p:stCondLst>
+                        <p:cond delay="indefinite"/>
+                      </p:stCondLst>
+                      <p:childTnLst>
+                        <p:par>
+                          <p:cTn id="24" fill="hold">
+                            <p:stCondLst>
+                              <p:cond delay="0"/>
+                            </p:stCondLst>
+                            <p:childTnLst>
+                              <p:par>
+                                <p:cTn id="25" presetID="1" presetClass="entr" presetSubtype="0" fill="hold" grpId="0" nodeType="clickEffect">
+                                  <p:stCondLst>
+                                    <p:cond delay="0"/>
+                                  </p:stCondLst>
+                                  <p:childTnLst>
+                                    <p:set>
+                                      <p:cBhvr>
+                                        <p:cTn id="26" dur="1" fill="hold">
+                                          <p:stCondLst>
+                                            <p:cond delay="0"/>
+                                          </p:stCondLst>
+                                        </p:cTn>
+                                        <p:tgtEl>
+                                          <p:spTgt spid="6">
+                                            <p:txEl>
+                                              <p:pRg st="0" end="0"/>
+                                            </p:txEl>
+                                          </p:spTgt>
+                                        </p:tgtEl>
+                                        <p:attrNameLst>
+                                          <p:attrName>style.visibility</p:attrName>
+                                        </p:attrNameLst>
+                                      </p:cBhvr>
+                                      <p:to>
+                                        <p:strVal val="visible"/>
+                                      </p:to>
+                                    </p:set>
+                                  </p:childTnLst>
+                                </p:cTn>
+                              </p:par>
+                              <p:par>
+                                <p:cTn id="27" presetID="1" presetClass="entr" presetSubtype="0" fill="hold" grpId="0" nodeType="withEffect">
+                                  <p:stCondLst>
+                                    <p:cond delay="0"/>
+                                  </p:stCondLst>
+                                  <p:childTnLst>
+                                    <p:set>
+                                      <p:cBhvr>
+                                        <p:cTn id="28" dur="1" fill="hold">
+                                          <p:stCondLst>
+                                            <p:cond delay="0"/>
+                                          </p:stCondLst>
+                                        </p:cTn>
+                                        <p:tgtEl>
+                                          <p:spTgt spid="6">
+                                            <p:txEl>
+                                              <p:pRg st="1" end="1"/>
+                                            </p:txEl>
+                                          </p:spTgt>
+                                        </p:tgtEl>
+                                        <p:attrNameLst>
+                                          <p:attrName>style.visibility</p:attrName>
+                                        </p:attrNameLst>
+                                      </p:cBhvr>
+                                      <p:to>
+                                        <p:strVal val="visible"/>
+                                      </p:to>
+                                    </p:set>
+                                  </p:childTnLst>
+                                </p:cTn>
+                              </p:par>
+                              <p:par>
+                                <p:cTn id="29" presetID="1" presetClass="entr" presetSubtype="0" fill="hold" grpId="0" nodeType="withEffect">
+                                  <p:stCondLst>
+                                    <p:cond delay="0"/>
+                                  </p:stCondLst>
+                                  <p:childTnLst>
+                                    <p:set>
+                                      <p:cBhvr>
+                                        <p:cTn id="30" dur="1" fill="hold">
+                                          <p:stCondLst>
+                                            <p:cond delay="0"/>
+                                          </p:stCondLst>
+                                        </p:cTn>
+                                        <p:tgtEl>
+                                          <p:spTgt spid="6">
+                                            <p:txEl>
+                                              <p:pRg st="2" end="2"/>
+                                            </p:txEl>
+                                          </p:spTgt>
+                                        </p:tgtEl>
+                                        <p:attrNameLst>
+                                          <p:attrName>style.visibility</p:attrName>
+                                        </p:attrNameLst>
+                                      </p:cBhvr>
+                                      <p:to>
+                                        <p:strVal val="visible"/>
+                                      </p:to>
+                                    </p:set>
+                                  </p:childTnLst>
+                                </p:cTn>
+                              </p:par>
+                              <p:par>
+                                <p:cTn id="31" presetID="1" presetClass="entr" presetSubtype="0" fill="hold" grpId="0" nodeType="withEffect">
+                                  <p:stCondLst>
+                                    <p:cond delay="0"/>
+                                  </p:stCondLst>
+                                  <p:childTnLst>
+                                    <p:set>
+                                      <p:cBhvr>
+                                        <p:cTn id="32" dur="1" fill="hold">
+                                          <p:stCondLst>
+                                            <p:cond delay="0"/>
+                                          </p:stCondLst>
+                                        </p:cTn>
+                                        <p:tgtEl>
+                                          <p:spTgt spid="6">
+                                            <p:txEl>
+                                              <p:pRg st="3" end="3"/>
+                                            </p:txEl>
+                                          </p:spTgt>
+                                        </p:tgtEl>
+                                        <p:attrNameLst>
+                                          <p:attrName>style.visibility</p:attrName>
+                                        </p:attrNameLst>
+                                      </p:cBhvr>
+                                      <p:to>
+                                        <p:strVal val="visible"/>
+                                      </p:to>
+                                    </p:set>
+                                  </p:childTnLst>
+                                </p:cTn>
+                              </p:par>
+                            </p:childTnLst>
+                          </p:cTn>
+                        </p:par>
+                      </p:childTnLst>
+                    </p:cTn>
+                  </p:par>
+                  <p:par>
+                    <p:cTn id="33" fill="hold">
+                      <p:stCondLst>
+                        <p:cond delay="indefinite"/>
+                      </p:stCondLst>
+                      <p:childTnLst>
+                        <p:par>
+                          <p:cTn id="34" fill="hold">
+                            <p:stCondLst>
+                              <p:cond delay="0"/>
+                            </p:stCondLst>
+                            <p:childTnLst>
+                              <p:par>
+                                <p:cTn id="35" presetID="1" presetClass="entr" presetSubtype="0" fill="hold" grpId="0" nodeType="clickEffect">
+                                  <p:stCondLst>
+                                    <p:cond delay="0"/>
+                                  </p:stCondLst>
+                                  <p:childTnLst>
+                                    <p:set>
+                                      <p:cBhvr>
+                                        <p:cTn id="36" dur="1" fill="hold">
+                                          <p:stCondLst>
+                                            <p:cond delay="0"/>
+                                          </p:stCondLst>
+                                        </p:cTn>
+                                        <p:tgtEl>
+                                          <p:spTgt spid="6">
+                                            <p:txEl>
+                                              <p:pRg st="4" end="4"/>
+                                            </p:txEl>
+                                          </p:spTgt>
+                                        </p:tgtEl>
+                                        <p:attrNameLst>
+                                          <p:attrName>style.visibility</p:attrName>
+                                        </p:attrNameLst>
+                                      </p:cBhvr>
+                                      <p:to>
+                                        <p:strVal val="visible"/>
+                                      </p:to>
+                                    </p:set>
+                                  </p:childTnLst>
+                                </p:cTn>
+                              </p:par>
+                              <p:par>
+                                <p:cTn id="37" presetID="1" presetClass="entr" presetSubtype="0" fill="hold" grpId="0" nodeType="withEffect">
+                                  <p:stCondLst>
+                                    <p:cond delay="0"/>
+                                  </p:stCondLst>
+                                  <p:childTnLst>
+                                    <p:set>
+                                      <p:cBhvr>
+                                        <p:cTn id="38" dur="1" fill="hold">
+                                          <p:stCondLst>
+                                            <p:cond delay="0"/>
+                                          </p:stCondLst>
+                                        </p:cTn>
+                                        <p:tgtEl>
+                                          <p:spTgt spid="6">
+                                            <p:txEl>
+                                              <p:pRg st="5" end="5"/>
+                                            </p:txEl>
+                                          </p:spTgt>
+                                        </p:tgtEl>
+                                        <p:attrNameLst>
+                                          <p:attrName>style.visibility</p:attrName>
+                                        </p:attrNameLst>
+                                      </p:cBhvr>
+                                      <p:to>
+                                        <p:strVal val="visible"/>
+                                      </p:to>
+                                    </p:set>
+                                  </p:childTnLst>
+                                </p:cTn>
+                              </p:par>
+                              <p:par>
+                                <p:cTn id="39" presetID="1" presetClass="entr" presetSubtype="0" fill="hold" grpId="0" nodeType="withEffect">
+                                  <p:stCondLst>
+                                    <p:cond delay="0"/>
+                                  </p:stCondLst>
+                                  <p:childTnLst>
+                                    <p:set>
+                                      <p:cBhvr>
+                                        <p:cTn id="40" dur="1" fill="hold">
+                                          <p:stCondLst>
+                                            <p:cond delay="0"/>
+                                          </p:stCondLst>
+                                        </p:cTn>
+                                        <p:tgtEl>
+                                          <p:spTgt spid="6">
+                                            <p:txEl>
+                                              <p:pRg st="6" end="6"/>
+                                            </p:txEl>
+                                          </p:spTgt>
+                                        </p:tgtEl>
+                                        <p:attrNameLst>
+                                          <p:attrName>style.visibility</p:attrName>
+                                        </p:attrNameLst>
+                                      </p:cBhvr>
+                                      <p:to>
+                                        <p:strVal val="visible"/>
+                                      </p:to>
+                                    </p:set>
+                                  </p:childTnLst>
+                                </p:cTn>
+                              </p:par>
+                              <p:par>
+                                <p:cTn id="41" presetID="1" presetClass="entr" presetSubtype="0" fill="hold" grpId="0" nodeType="withEffect">
+                                  <p:stCondLst>
+                                    <p:cond delay="0"/>
+                                  </p:stCondLst>
+                                  <p:childTnLst>
+                                    <p:set>
+                                      <p:cBhvr>
+                                        <p:cTn id="42" dur="1" fill="hold">
+                                          <p:stCondLst>
+                                            <p:cond delay="0"/>
+                                          </p:stCondLst>
+                                        </p:cTn>
+                                        <p:tgtEl>
+                                          <p:spTgt spid="6">
+                                            <p:txEl>
+                                              <p:pRg st="7" end="7"/>
+                                            </p:txEl>
+                                          </p:spTgt>
+                                        </p:tgtEl>
+                                        <p:attrNameLst>
+                                          <p:attrName>style.visibility</p:attrName>
+                                        </p:attrNameLst>
+                                      </p:cBhvr>
+                                      <p:to>
+                                        <p:strVal val="visible"/>
+                                      </p:to>
+                                    </p:set>
+                                  </p:childTnLst>
+                                </p:cTn>
+                              </p:par>
+                            </p:childTnLst>
+                          </p:cTn>
+                        </p:par>
+                      </p:childTnLst>
+                    </p:cTn>
+                  </p:par>
+                </p:childTnLst>
+              </p:cTn>
+              <p:prevCondLst>
+                <p:cond evt="onPrev" delay="0">
+                  <p:tgtEl>
+                    <p:sldTgt/>
+                  </p:tgtEl>
+                </p:cond>
+              </p:prevCondLst>
+              <p:nextCondLst>
+                <p:cond evt="onNext" delay="0">
+                  <p:tgtEl>
+                    <p:sldTgt/>
+                  </p:tgtEl>
+                </p:cond>
+              </p:nextCondLst>
+            </p:seq>
+          </p:childTnLst>
+        </p:cTn>
+      </p:par>
+    </p:tnLst>
+    <p:bldLst>
+      <p:bldP spid="5" grpId="0" uiExpand="1" build="p"/>
+      <p:bldP spid="6" grpId="0" build="p"/>
+    </p:bldLst>
+  </p:timing>
 </p:sld>
 </file>
 
@@ -23038,13 +23212,8 @@
           <a:p>
             <a:r>
               <a:rPr lang="en-CA" dirty="0"/>
-              <a:t>**Collision Data </a:t>
+              <a:t>For 2016 alone – 300,000 incidents</a:t>
             </a:r>
-            <a:r>
-              <a:rPr lang="en-CA" dirty="0" err="1"/>
-              <a:t>DataFrame</a:t>
-            </a:r>
-            <a:endParaRPr lang="en-CA" dirty="0"/>
           </a:p>
         </p:txBody>
       </p:sp>
@@ -23329,264 +23498,36 @@
           </a:p>
         </p:txBody>
       </p:sp>
-      <p:sp>
-        <p:nvSpPr>
-          <p:cNvPr id="13" name="Content Placeholder 8">
+      <p:pic>
+        <p:nvPicPr>
+          <p:cNvPr id="5" name="Picture 4">
             <a:extLst>
               <a:ext uri="{FF2B5EF4-FFF2-40B4-BE49-F238E27FC236}">
-                <a16:creationId xmlns:a16="http://schemas.microsoft.com/office/drawing/2014/main" id="{689FB385-D809-40E9-B05D-6AE9438C9F4E}"/>
+                <a16:creationId xmlns:a16="http://schemas.microsoft.com/office/drawing/2014/main" id="{5CEC8695-C936-4738-B64F-DC49401ECFF3}"/>
               </a:ext>
             </a:extLst>
           </p:cNvPr>
-          <p:cNvSpPr txBox="1">
-            <a:spLocks/>
-          </p:cNvSpPr>
+          <p:cNvPicPr>
+            <a:picLocks noChangeAspect="1"/>
+          </p:cNvPicPr>
           <p:nvPr/>
-        </p:nvSpPr>
+        </p:nvPicPr>
+        <p:blipFill>
+          <a:blip r:embed="rId3"/>
+          <a:stretch>
+            <a:fillRect/>
+          </a:stretch>
+        </p:blipFill>
         <p:spPr>
           <a:xfrm>
-            <a:off x="7263614" y="4447039"/>
-            <a:ext cx="4338674" cy="1191761"/>
+            <a:off x="5139658" y="4707451"/>
+            <a:ext cx="6616744" cy="1590153"/>
           </a:xfrm>
           <a:prstGeom prst="rect">
             <a:avLst/>
           </a:prstGeom>
         </p:spPr>
-        <p:txBody>
-          <a:bodyPr vert="horz" lIns="91440" tIns="45720" rIns="91440" bIns="45720" rtlCol="0">
-            <a:normAutofit/>
-          </a:bodyPr>
-          <a:lstStyle>
-            <a:lvl1pPr marL="342900" indent="-342900" algn="l" defTabSz="457200" rtl="0" eaLnBrk="1" latinLnBrk="0" hangingPunct="1">
-              <a:spcBef>
-                <a:spcPts val="1000"/>
-              </a:spcBef>
-              <a:spcAft>
-                <a:spcPts val="0"/>
-              </a:spcAft>
-              <a:buClr>
-                <a:schemeClr val="accent1"/>
-              </a:buClr>
-              <a:buFont typeface="Wingdings 3" charset="2"/>
-              <a:buChar char=""/>
-              <a:defRPr sz="1800" kern="1200">
-                <a:solidFill>
-                  <a:schemeClr val="tx1">
-                    <a:lumMod val="75000"/>
-                    <a:lumOff val="25000"/>
-                  </a:schemeClr>
-                </a:solidFill>
-                <a:latin typeface="+mn-lt"/>
-                <a:ea typeface="+mn-ea"/>
-                <a:cs typeface="+mn-cs"/>
-              </a:defRPr>
-            </a:lvl1pPr>
-            <a:lvl2pPr marL="742950" indent="-285750" algn="l" defTabSz="457200" rtl="0" eaLnBrk="1" latinLnBrk="0" hangingPunct="1">
-              <a:spcBef>
-                <a:spcPts val="1000"/>
-              </a:spcBef>
-              <a:spcAft>
-                <a:spcPts val="0"/>
-              </a:spcAft>
-              <a:buClr>
-                <a:schemeClr val="accent1"/>
-              </a:buClr>
-              <a:buFont typeface="Wingdings 3" charset="2"/>
-              <a:buChar char=""/>
-              <a:defRPr sz="1600" kern="1200">
-                <a:solidFill>
-                  <a:schemeClr val="tx1">
-                    <a:lumMod val="75000"/>
-                    <a:lumOff val="25000"/>
-                  </a:schemeClr>
-                </a:solidFill>
-                <a:latin typeface="+mn-lt"/>
-                <a:ea typeface="+mn-ea"/>
-                <a:cs typeface="+mn-cs"/>
-              </a:defRPr>
-            </a:lvl2pPr>
-            <a:lvl3pPr marL="1143000" indent="-228600" algn="l" defTabSz="457200" rtl="0" eaLnBrk="1" latinLnBrk="0" hangingPunct="1">
-              <a:spcBef>
-                <a:spcPts val="1000"/>
-              </a:spcBef>
-              <a:spcAft>
-                <a:spcPts val="0"/>
-              </a:spcAft>
-              <a:buClr>
-                <a:schemeClr val="accent1"/>
-              </a:buClr>
-              <a:buFont typeface="Wingdings 3" charset="2"/>
-              <a:buChar char=""/>
-              <a:defRPr sz="1400" kern="1200">
-                <a:solidFill>
-                  <a:schemeClr val="tx1">
-                    <a:lumMod val="75000"/>
-                    <a:lumOff val="25000"/>
-                  </a:schemeClr>
-                </a:solidFill>
-                <a:latin typeface="+mn-lt"/>
-                <a:ea typeface="+mn-ea"/>
-                <a:cs typeface="+mn-cs"/>
-              </a:defRPr>
-            </a:lvl3pPr>
-            <a:lvl4pPr marL="1600200" indent="-228600" algn="l" defTabSz="457200" rtl="0" eaLnBrk="1" latinLnBrk="0" hangingPunct="1">
-              <a:spcBef>
-                <a:spcPts val="1000"/>
-              </a:spcBef>
-              <a:spcAft>
-                <a:spcPts val="0"/>
-              </a:spcAft>
-              <a:buClr>
-                <a:schemeClr val="accent1"/>
-              </a:buClr>
-              <a:buFont typeface="Wingdings 3" charset="2"/>
-              <a:buChar char=""/>
-              <a:defRPr sz="1200" kern="1200">
-                <a:solidFill>
-                  <a:schemeClr val="tx1">
-                    <a:lumMod val="75000"/>
-                    <a:lumOff val="25000"/>
-                  </a:schemeClr>
-                </a:solidFill>
-                <a:latin typeface="+mn-lt"/>
-                <a:ea typeface="+mn-ea"/>
-                <a:cs typeface="+mn-cs"/>
-              </a:defRPr>
-            </a:lvl4pPr>
-            <a:lvl5pPr marL="2057400" indent="-228600" algn="l" defTabSz="457200" rtl="0" eaLnBrk="1" latinLnBrk="0" hangingPunct="1">
-              <a:spcBef>
-                <a:spcPts val="1000"/>
-              </a:spcBef>
-              <a:spcAft>
-                <a:spcPts val="0"/>
-              </a:spcAft>
-              <a:buClr>
-                <a:schemeClr val="accent1"/>
-              </a:buClr>
-              <a:buFont typeface="Wingdings 3" charset="2"/>
-              <a:buChar char=""/>
-              <a:defRPr sz="1200" kern="1200">
-                <a:solidFill>
-                  <a:schemeClr val="tx1">
-                    <a:lumMod val="75000"/>
-                    <a:lumOff val="25000"/>
-                  </a:schemeClr>
-                </a:solidFill>
-                <a:latin typeface="+mn-lt"/>
-                <a:ea typeface="+mn-ea"/>
-                <a:cs typeface="+mn-cs"/>
-              </a:defRPr>
-            </a:lvl5pPr>
-            <a:lvl6pPr marL="2514600" indent="-228600" algn="l" defTabSz="457200" rtl="0" eaLnBrk="1" latinLnBrk="0" hangingPunct="1">
-              <a:spcBef>
-                <a:spcPts val="1000"/>
-              </a:spcBef>
-              <a:spcAft>
-                <a:spcPts val="0"/>
-              </a:spcAft>
-              <a:buClr>
-                <a:schemeClr val="accent1"/>
-              </a:buClr>
-              <a:buFont typeface="Wingdings 3" charset="2"/>
-              <a:buChar char=""/>
-              <a:defRPr sz="1200" kern="1200">
-                <a:solidFill>
-                  <a:schemeClr val="tx1">
-                    <a:lumMod val="75000"/>
-                    <a:lumOff val="25000"/>
-                  </a:schemeClr>
-                </a:solidFill>
-                <a:latin typeface="+mn-lt"/>
-                <a:ea typeface="+mn-ea"/>
-                <a:cs typeface="+mn-cs"/>
-              </a:defRPr>
-            </a:lvl6pPr>
-            <a:lvl7pPr marL="2971800" indent="-228600" algn="l" defTabSz="457200" rtl="0" eaLnBrk="1" latinLnBrk="0" hangingPunct="1">
-              <a:spcBef>
-                <a:spcPts val="1000"/>
-              </a:spcBef>
-              <a:spcAft>
-                <a:spcPts val="0"/>
-              </a:spcAft>
-              <a:buClr>
-                <a:schemeClr val="accent1"/>
-              </a:buClr>
-              <a:buFont typeface="Wingdings 3" charset="2"/>
-              <a:buChar char=""/>
-              <a:defRPr sz="1200" kern="1200">
-                <a:solidFill>
-                  <a:schemeClr val="tx1">
-                    <a:lumMod val="75000"/>
-                    <a:lumOff val="25000"/>
-                  </a:schemeClr>
-                </a:solidFill>
-                <a:latin typeface="+mn-lt"/>
-                <a:ea typeface="+mn-ea"/>
-                <a:cs typeface="+mn-cs"/>
-              </a:defRPr>
-            </a:lvl7pPr>
-            <a:lvl8pPr marL="3429000" indent="-228600" algn="l" defTabSz="457200" rtl="0" eaLnBrk="1" latinLnBrk="0" hangingPunct="1">
-              <a:spcBef>
-                <a:spcPts val="1000"/>
-              </a:spcBef>
-              <a:spcAft>
-                <a:spcPts val="0"/>
-              </a:spcAft>
-              <a:buClr>
-                <a:schemeClr val="accent1"/>
-              </a:buClr>
-              <a:buFont typeface="Wingdings 3" charset="2"/>
-              <a:buChar char=""/>
-              <a:defRPr sz="1200" kern="1200">
-                <a:solidFill>
-                  <a:schemeClr val="tx1">
-                    <a:lumMod val="75000"/>
-                    <a:lumOff val="25000"/>
-                  </a:schemeClr>
-                </a:solidFill>
-                <a:latin typeface="+mn-lt"/>
-                <a:ea typeface="+mn-ea"/>
-                <a:cs typeface="+mn-cs"/>
-              </a:defRPr>
-            </a:lvl8pPr>
-            <a:lvl9pPr marL="3886200" indent="-228600" algn="l" defTabSz="457200" rtl="0" eaLnBrk="1" latinLnBrk="0" hangingPunct="1">
-              <a:spcBef>
-                <a:spcPts val="1000"/>
-              </a:spcBef>
-              <a:spcAft>
-                <a:spcPts val="0"/>
-              </a:spcAft>
-              <a:buClr>
-                <a:schemeClr val="accent1"/>
-              </a:buClr>
-              <a:buFont typeface="Wingdings 3" charset="2"/>
-              <a:buChar char=""/>
-              <a:defRPr sz="1200" kern="1200">
-                <a:solidFill>
-                  <a:schemeClr val="tx1">
-                    <a:lumMod val="75000"/>
-                    <a:lumOff val="25000"/>
-                  </a:schemeClr>
-                </a:solidFill>
-                <a:latin typeface="+mn-lt"/>
-                <a:ea typeface="+mn-ea"/>
-                <a:cs typeface="+mn-cs"/>
-              </a:defRPr>
-            </a:lvl9pPr>
-          </a:lstStyle>
-          <a:p>
-            <a:r>
-              <a:rPr lang="en-CA" dirty="0"/>
-              <a:t>**Energy Data </a:t>
-            </a:r>
-            <a:r>
-              <a:rPr lang="en-CA" dirty="0" err="1"/>
-              <a:t>DataFrame</a:t>
-            </a:r>
-            <a:endParaRPr lang="en-CA" dirty="0"/>
-          </a:p>
-        </p:txBody>
-      </p:sp>
+      </p:pic>
     </p:spTree>
     <p:extLst>
       <p:ext uri="{BB962C8B-B14F-4D97-AF65-F5344CB8AC3E}">

</xml_diff>